<commit_message>
update_Lattice Network for Lightweight  Image Restoration
</commit_message>
<xml_diff>
--- a/论文插图.pptx
+++ b/论文插图.pptx
@@ -8,14 +8,17 @@
     <p:notesMasterId r:id="rId4"/>
   </p:notesMasterIdLst>
   <p:handoutMasterIdLst>
-    <p:handoutMasterId r:id="rId9"/>
+    <p:handoutMasterId r:id="rId12"/>
   </p:handoutMasterIdLst>
   <p:sldIdLst>
     <p:sldId id="256" r:id="rId3"/>
     <p:sldId id="259" r:id="rId5"/>
     <p:sldId id="257" r:id="rId6"/>
     <p:sldId id="260" r:id="rId7"/>
-    <p:sldId id="261" r:id="rId8"/>
+    <p:sldId id="262" r:id="rId8"/>
+    <p:sldId id="261" r:id="rId9"/>
+    <p:sldId id="264" r:id="rId10"/>
+    <p:sldId id="265" r:id="rId11"/>
   </p:sldIdLst>
   <p:sldSz cx="12192000" cy="6858000"/>
   <p:notesSz cx="7103745" cy="10234295"/>
@@ -117,7 +120,7 @@
   <p:extLst>
     <p:ext uri="{EFAFB233-063F-42B5-8137-9DF3F51BA10A}">
       <p15:sldGuideLst xmlns:p15="http://schemas.microsoft.com/office/powerpoint/2012/main">
-        <p15:guide id="1" orient="horz" pos="2160" userDrawn="1">
+        <p15:guide id="1" orient="horz" pos="2211" userDrawn="1">
           <p15:clr>
             <a:srgbClr val="A4A3A4"/>
           </p15:clr>
@@ -5120,70 +5123,191 @@
         </p:blipFill>
         <p:spPr>
           <a:xfrm>
-            <a:off x="2380615" y="2073910"/>
-            <a:ext cx="7098665" cy="2710815"/>
+            <a:off x="2241550" y="1563370"/>
+            <a:ext cx="7005955" cy="4337050"/>
           </a:xfrm>
           <a:prstGeom prst="rect">
             <a:avLst/>
           </a:prstGeom>
         </p:spPr>
       </p:pic>
-      <p:pic>
-        <p:nvPicPr>
-          <p:cNvPr id="5" name="图片 4"/>
-          <p:cNvPicPr>
-            <a:picLocks noChangeAspect="1"/>
-          </p:cNvPicPr>
+      <p:sp>
+        <p:nvSpPr>
+          <p:cNvPr id="5" name="文本框 4"/>
+          <p:cNvSpPr txBox="1"/>
           <p:nvPr>
             <p:custDataLst>
               <p:tags r:id="rId3"/>
             </p:custDataLst>
           </p:nvPr>
-        </p:nvPicPr>
-        <p:blipFill>
-          <a:blip r:embed="rId4"/>
-          <a:stretch>
-            <a:fillRect/>
-          </a:stretch>
-        </p:blipFill>
+        </p:nvSpPr>
         <p:spPr>
           <a:xfrm>
-            <a:off x="474345" y="276225"/>
-            <a:ext cx="4848860" cy="1676400"/>
+            <a:off x="918845" y="2092960"/>
+            <a:ext cx="3771900" cy="306705"/>
           </a:xfrm>
           <a:prstGeom prst="rect">
             <a:avLst/>
           </a:prstGeom>
-        </p:spPr>
-      </p:pic>
-      <p:pic>
-        <p:nvPicPr>
-          <p:cNvPr id="6" name="图片 5"/>
-          <p:cNvPicPr>
-            <a:picLocks noChangeAspect="1"/>
-          </p:cNvPicPr>
+          <a:noFill/>
+        </p:spPr>
+        <p:txBody>
+          <a:bodyPr wrap="square" rtlCol="0">
+            <a:spAutoFit/>
+          </a:bodyPr>
+          <a:p>
+            <a:r>
+              <a:rPr lang="zh-CN" altLang="en-US" sz="1400" b="1">
+                <a:latin typeface="微软雅黑" charset="0"/>
+                <a:ea typeface="微软雅黑" charset="0"/>
+              </a:rPr>
+              <a:t>将按照权重调整后的卷积核映射到频域</a:t>
+            </a:r>
+            <a:endParaRPr lang="zh-CN" altLang="en-US" sz="1400" b="1">
+              <a:latin typeface="微软雅黑" charset="0"/>
+              <a:ea typeface="微软雅黑" charset="0"/>
+            </a:endParaRPr>
+          </a:p>
+        </p:txBody>
+      </p:sp>
+      <p:sp>
+        <p:nvSpPr>
+          <p:cNvPr id="6" name="文本框 5"/>
+          <p:cNvSpPr txBox="1"/>
+          <p:nvPr>
+            <p:custDataLst>
+              <p:tags r:id="rId4"/>
+            </p:custDataLst>
+          </p:nvPr>
+        </p:nvSpPr>
+        <p:spPr>
+          <a:xfrm>
+            <a:off x="3014345" y="5900420"/>
+            <a:ext cx="3771900" cy="306705"/>
+          </a:xfrm>
+          <a:prstGeom prst="rect">
+            <a:avLst/>
+          </a:prstGeom>
+          <a:noFill/>
+        </p:spPr>
+        <p:txBody>
+          <a:bodyPr wrap="square" rtlCol="0">
+            <a:spAutoFit/>
+          </a:bodyPr>
+          <a:p>
+            <a:r>
+              <a:rPr lang="zh-CN" altLang="en-US" sz="1400" b="1">
+                <a:latin typeface="微软雅黑" charset="0"/>
+                <a:ea typeface="微软雅黑" charset="0"/>
+              </a:rPr>
+              <a:t>将</a:t>
+            </a:r>
+            <a:r>
+              <a:rPr lang="zh-CN" altLang="en-US" sz="1400" b="1">
+                <a:latin typeface="微软雅黑" charset="0"/>
+                <a:ea typeface="微软雅黑" charset="0"/>
+              </a:rPr>
+              <a:t>特征映射到频域</a:t>
+            </a:r>
+            <a:endParaRPr lang="zh-CN" altLang="en-US" sz="1400" b="1">
+              <a:latin typeface="微软雅黑" charset="0"/>
+              <a:ea typeface="微软雅黑" charset="0"/>
+            </a:endParaRPr>
+          </a:p>
+        </p:txBody>
+      </p:sp>
+      <p:sp>
+        <p:nvSpPr>
+          <p:cNvPr id="7" name="文本框 6"/>
+          <p:cNvSpPr txBox="1"/>
           <p:nvPr>
             <p:custDataLst>
               <p:tags r:id="rId5"/>
             </p:custDataLst>
           </p:nvPr>
-        </p:nvPicPr>
-        <p:blipFill>
-          <a:blip r:embed="rId6"/>
-          <a:stretch>
-            <a:fillRect/>
-          </a:stretch>
-        </p:blipFill>
+        </p:nvSpPr>
         <p:spPr>
           <a:xfrm>
-            <a:off x="3658870" y="5031740"/>
-            <a:ext cx="4228465" cy="1826260"/>
+            <a:off x="4371975" y="1372235"/>
+            <a:ext cx="2167890" cy="306705"/>
           </a:xfrm>
           <a:prstGeom prst="rect">
             <a:avLst/>
           </a:prstGeom>
-        </p:spPr>
-      </p:pic>
+          <a:noFill/>
+        </p:spPr>
+        <p:txBody>
+          <a:bodyPr wrap="square" rtlCol="0">
+            <a:spAutoFit/>
+          </a:bodyPr>
+          <a:p>
+            <a:r>
+              <a:rPr lang="zh-CN" altLang="en-US" sz="1400" b="1">
+                <a:latin typeface="微软雅黑" charset="0"/>
+                <a:ea typeface="微软雅黑" charset="0"/>
+              </a:rPr>
+              <a:t>将按照不同频段进行</a:t>
+            </a:r>
+            <a:r>
+              <a:rPr lang="zh-CN" altLang="en-US" sz="1400" b="1">
+                <a:latin typeface="微软雅黑" charset="0"/>
+                <a:ea typeface="微软雅黑" charset="0"/>
+              </a:rPr>
+              <a:t>拆分</a:t>
+            </a:r>
+            <a:endParaRPr lang="zh-CN" altLang="en-US" sz="1400" b="1">
+              <a:latin typeface="微软雅黑" charset="0"/>
+              <a:ea typeface="微软雅黑" charset="0"/>
+            </a:endParaRPr>
+          </a:p>
+        </p:txBody>
+      </p:sp>
+      <p:sp>
+        <p:nvSpPr>
+          <p:cNvPr id="8" name="文本框 7"/>
+          <p:cNvSpPr txBox="1"/>
+          <p:nvPr>
+            <p:custDataLst>
+              <p:tags r:id="rId6"/>
+            </p:custDataLst>
+          </p:nvPr>
+        </p:nvSpPr>
+        <p:spPr>
+          <a:xfrm>
+            <a:off x="5633085" y="2276475"/>
+            <a:ext cx="2167890" cy="306705"/>
+          </a:xfrm>
+          <a:prstGeom prst="rect">
+            <a:avLst/>
+          </a:prstGeom>
+          <a:noFill/>
+        </p:spPr>
+        <p:txBody>
+          <a:bodyPr wrap="square" rtlCol="0">
+            <a:spAutoFit/>
+          </a:bodyPr>
+          <a:p>
+            <a:r>
+              <a:rPr lang="zh-CN" altLang="en-US" sz="1400" b="1">
+                <a:latin typeface="微软雅黑" charset="0"/>
+                <a:ea typeface="微软雅黑" charset="0"/>
+              </a:rPr>
+              <a:t>映射回空间</a:t>
+            </a:r>
+            <a:r>
+              <a:rPr lang="zh-CN" altLang="en-US" sz="1400" b="1">
+                <a:latin typeface="微软雅黑" charset="0"/>
+                <a:ea typeface="微软雅黑" charset="0"/>
+              </a:rPr>
+              <a:t>域</a:t>
+            </a:r>
+            <a:endParaRPr lang="zh-CN" altLang="en-US" sz="1400" b="1">
+              <a:latin typeface="微软雅黑" charset="0"/>
+              <a:ea typeface="微软雅黑" charset="0"/>
+            </a:endParaRPr>
+          </a:p>
+        </p:txBody>
+      </p:sp>
       <p:sp>
         <p:nvSpPr>
           <p:cNvPr id="10" name="矩形: 圆角 36"/>
@@ -5196,8 +5320,8 @@
         </p:nvSpPr>
         <p:spPr>
           <a:xfrm rot="10800000" flipV="1">
-            <a:off x="2475865" y="2171065"/>
-            <a:ext cx="1835150" cy="1826260"/>
+            <a:off x="3131820" y="2399665"/>
+            <a:ext cx="663575" cy="888365"/>
           </a:xfrm>
           <a:prstGeom prst="roundRect">
             <a:avLst>
@@ -5242,7 +5366,7 @@
       </p:sp>
       <p:sp>
         <p:nvSpPr>
-          <p:cNvPr id="7" name="矩形: 圆角 36"/>
+          <p:cNvPr id="9" name="矩形: 圆角 36"/>
           <p:cNvSpPr/>
           <p:nvPr>
             <p:custDataLst>
@@ -5252,8 +5376,8 @@
         </p:nvSpPr>
         <p:spPr>
           <a:xfrm rot="10800000" flipV="1">
-            <a:off x="4944745" y="2274570"/>
-            <a:ext cx="805815" cy="2131060"/>
+            <a:off x="4027170" y="5126355"/>
+            <a:ext cx="663575" cy="619760"/>
           </a:xfrm>
           <a:prstGeom prst="roundRect">
             <a:avLst>
@@ -5296,58 +5420,345 @@
           </a:p>
         </p:txBody>
       </p:sp>
-      <p:cxnSp>
-        <p:nvCxnSpPr>
-          <p:cNvPr id="14" name="直接连接符 13"/>
-          <p:cNvCxnSpPr/>
+      <p:sp>
+        <p:nvSpPr>
+          <p:cNvPr id="11" name="矩形: 圆角 36"/>
+          <p:cNvSpPr/>
           <p:nvPr>
             <p:custDataLst>
               <p:tags r:id="rId9"/>
             </p:custDataLst>
           </p:nvPr>
-        </p:nvCxnSpPr>
-        <p:spPr>
-          <a:xfrm flipH="1">
-            <a:off x="4286885" y="1736090"/>
-            <a:ext cx="748665" cy="553085"/>
-          </a:xfrm>
-          <a:prstGeom prst="line">
-            <a:avLst/>
+        </p:nvSpPr>
+        <p:spPr>
+          <a:xfrm rot="10800000" flipV="1">
+            <a:off x="4817745" y="1985645"/>
+            <a:ext cx="815340" cy="3032760"/>
+          </a:xfrm>
+          <a:prstGeom prst="roundRect">
+            <a:avLst>
+              <a:gd name="adj" fmla="val 10039"/>
+            </a:avLst>
           </a:prstGeom>
+          <a:noFill/>
           <a:ln w="38100">
             <a:solidFill>
               <a:schemeClr val="tx1"/>
             </a:solidFill>
+            <a:prstDash val="lgDash"/>
           </a:ln>
         </p:spPr>
         <p:style>
           <a:lnRef idx="2">
+            <a:schemeClr val="accent1">
+              <a:shade val="15000"/>
+            </a:schemeClr>
+          </a:lnRef>
+          <a:fillRef idx="1">
             <a:schemeClr val="accent1"/>
-          </a:lnRef>
-          <a:fillRef idx="0">
-            <a:srgbClr val="FFFFFF"/>
           </a:fillRef>
           <a:effectRef idx="0">
-            <a:srgbClr val="FFFFFF"/>
+            <a:schemeClr val="accent1"/>
           </a:effectRef>
           <a:fontRef idx="minor">
-            <a:schemeClr val="tx1"/>
+            <a:schemeClr val="lt1"/>
           </a:fontRef>
         </p:style>
-      </p:cxnSp>
+        <p:txBody>
+          <a:bodyPr rtlCol="0" anchor="ctr"/>
+          <a:p>
+            <a:pPr algn="ctr"/>
+            <a:endParaRPr lang="zh-CN" altLang="en-US">
+              <a:solidFill>
+                <a:srgbClr val="C00000"/>
+              </a:solidFill>
+            </a:endParaRPr>
+          </a:p>
+        </p:txBody>
+      </p:sp>
+      <p:sp>
+        <p:nvSpPr>
+          <p:cNvPr id="12" name="矩形: 圆角 36"/>
+          <p:cNvSpPr/>
+          <p:nvPr>
+            <p:custDataLst>
+              <p:tags r:id="rId10"/>
+            </p:custDataLst>
+          </p:nvPr>
+        </p:nvSpPr>
+        <p:spPr>
+          <a:xfrm rot="10800000" flipV="1">
+            <a:off x="5799455" y="2654300"/>
+            <a:ext cx="815340" cy="889000"/>
+          </a:xfrm>
+          <a:prstGeom prst="roundRect">
+            <a:avLst>
+              <a:gd name="adj" fmla="val 10039"/>
+            </a:avLst>
+          </a:prstGeom>
+          <a:noFill/>
+          <a:ln w="38100">
+            <a:solidFill>
+              <a:schemeClr val="tx1"/>
+            </a:solidFill>
+            <a:prstDash val="lgDash"/>
+          </a:ln>
+        </p:spPr>
+        <p:style>
+          <a:lnRef idx="2">
+            <a:schemeClr val="accent1">
+              <a:shade val="15000"/>
+            </a:schemeClr>
+          </a:lnRef>
+          <a:fillRef idx="1">
+            <a:schemeClr val="accent1"/>
+          </a:fillRef>
+          <a:effectRef idx="0">
+            <a:schemeClr val="accent1"/>
+          </a:effectRef>
+          <a:fontRef idx="minor">
+            <a:schemeClr val="lt1"/>
+          </a:fontRef>
+        </p:style>
+        <p:txBody>
+          <a:bodyPr rtlCol="0" anchor="ctr"/>
+          <a:p>
+            <a:pPr algn="ctr"/>
+            <a:endParaRPr lang="zh-CN" altLang="en-US">
+              <a:solidFill>
+                <a:srgbClr val="C00000"/>
+              </a:solidFill>
+            </a:endParaRPr>
+          </a:p>
+        </p:txBody>
+      </p:sp>
+    </p:spTree>
+  </p:cSld>
+  <p:clrMapOvr>
+    <a:masterClrMapping/>
+  </p:clrMapOvr>
+</p:sld>
+</file>
+
+<file path=ppt/slides/slide6.xml><?xml version="1.0" encoding="utf-8"?>
+<p:sld xmlns:a="http://schemas.openxmlformats.org/drawingml/2006/main" xmlns:r="http://schemas.openxmlformats.org/officeDocument/2006/relationships" xmlns:p="http://schemas.openxmlformats.org/presentationml/2006/main">
+  <p:cSld>
+    <p:spTree>
+      <p:nvGrpSpPr>
+        <p:cNvPr id="1" name=""/>
+        <p:cNvGrpSpPr/>
+        <p:nvPr/>
+      </p:nvGrpSpPr>
+      <p:grpSpPr/>
+      <p:pic>
+        <p:nvPicPr>
+          <p:cNvPr id="4" name="图片 3"/>
+          <p:cNvPicPr>
+            <a:picLocks noChangeAspect="1"/>
+          </p:cNvPicPr>
+          <p:nvPr>
+            <p:custDataLst>
+              <p:tags r:id="rId1"/>
+            </p:custDataLst>
+          </p:nvPr>
+        </p:nvPicPr>
+        <p:blipFill>
+          <a:blip r:embed="rId2"/>
+          <a:stretch>
+            <a:fillRect/>
+          </a:stretch>
+        </p:blipFill>
+        <p:spPr>
+          <a:xfrm>
+            <a:off x="2380615" y="2200910"/>
+            <a:ext cx="7098665" cy="2710815"/>
+          </a:xfrm>
+          <a:prstGeom prst="rect">
+            <a:avLst/>
+          </a:prstGeom>
+        </p:spPr>
+      </p:pic>
+      <p:pic>
+        <p:nvPicPr>
+          <p:cNvPr id="5" name="图片 4"/>
+          <p:cNvPicPr>
+            <a:picLocks noChangeAspect="1"/>
+          </p:cNvPicPr>
+          <p:nvPr>
+            <p:custDataLst>
+              <p:tags r:id="rId3"/>
+            </p:custDataLst>
+          </p:nvPr>
+        </p:nvPicPr>
+        <p:blipFill>
+          <a:blip r:embed="rId4"/>
+          <a:stretch>
+            <a:fillRect/>
+          </a:stretch>
+        </p:blipFill>
+        <p:spPr>
+          <a:xfrm>
+            <a:off x="474345" y="403225"/>
+            <a:ext cx="4848860" cy="1676400"/>
+          </a:xfrm>
+          <a:prstGeom prst="rect">
+            <a:avLst/>
+          </a:prstGeom>
+        </p:spPr>
+      </p:pic>
+      <p:pic>
+        <p:nvPicPr>
+          <p:cNvPr id="6" name="图片 5"/>
+          <p:cNvPicPr>
+            <a:picLocks noChangeAspect="1"/>
+          </p:cNvPicPr>
+          <p:nvPr>
+            <p:custDataLst>
+              <p:tags r:id="rId5"/>
+            </p:custDataLst>
+          </p:nvPr>
+        </p:nvPicPr>
+        <p:blipFill>
+          <a:blip r:embed="rId6"/>
+          <a:stretch>
+            <a:fillRect/>
+          </a:stretch>
+        </p:blipFill>
+        <p:spPr>
+          <a:xfrm>
+            <a:off x="3658870" y="5033010"/>
+            <a:ext cx="4228465" cy="1826260"/>
+          </a:xfrm>
+          <a:prstGeom prst="rect">
+            <a:avLst/>
+          </a:prstGeom>
+        </p:spPr>
+      </p:pic>
+      <p:sp>
+        <p:nvSpPr>
+          <p:cNvPr id="10" name="矩形: 圆角 36"/>
+          <p:cNvSpPr/>
+          <p:nvPr>
+            <p:custDataLst>
+              <p:tags r:id="rId7"/>
+            </p:custDataLst>
+          </p:nvPr>
+        </p:nvSpPr>
+        <p:spPr>
+          <a:xfrm rot="10800000" flipV="1">
+            <a:off x="2475865" y="2298065"/>
+            <a:ext cx="1835150" cy="1826260"/>
+          </a:xfrm>
+          <a:prstGeom prst="roundRect">
+            <a:avLst>
+              <a:gd name="adj" fmla="val 10039"/>
+            </a:avLst>
+          </a:prstGeom>
+          <a:noFill/>
+          <a:ln w="38100">
+            <a:solidFill>
+              <a:schemeClr val="tx1"/>
+            </a:solidFill>
+            <a:prstDash val="lgDash"/>
+          </a:ln>
+        </p:spPr>
+        <p:style>
+          <a:lnRef idx="2">
+            <a:schemeClr val="accent1">
+              <a:shade val="15000"/>
+            </a:schemeClr>
+          </a:lnRef>
+          <a:fillRef idx="1">
+            <a:schemeClr val="accent1"/>
+          </a:fillRef>
+          <a:effectRef idx="0">
+            <a:schemeClr val="accent1"/>
+          </a:effectRef>
+          <a:fontRef idx="minor">
+            <a:schemeClr val="lt1"/>
+          </a:fontRef>
+        </p:style>
+        <p:txBody>
+          <a:bodyPr rtlCol="0" anchor="ctr"/>
+          <a:p>
+            <a:pPr algn="ctr"/>
+            <a:endParaRPr lang="zh-CN" altLang="en-US">
+              <a:solidFill>
+                <a:srgbClr val="C00000"/>
+              </a:solidFill>
+            </a:endParaRPr>
+          </a:p>
+        </p:txBody>
+      </p:sp>
+      <p:sp>
+        <p:nvSpPr>
+          <p:cNvPr id="7" name="矩形: 圆角 36"/>
+          <p:cNvSpPr/>
+          <p:nvPr>
+            <p:custDataLst>
+              <p:tags r:id="rId8"/>
+            </p:custDataLst>
+          </p:nvPr>
+        </p:nvSpPr>
+        <p:spPr>
+          <a:xfrm rot="10800000" flipV="1">
+            <a:off x="4944745" y="2401570"/>
+            <a:ext cx="805815" cy="2131060"/>
+          </a:xfrm>
+          <a:prstGeom prst="roundRect">
+            <a:avLst>
+              <a:gd name="adj" fmla="val 10039"/>
+            </a:avLst>
+          </a:prstGeom>
+          <a:noFill/>
+          <a:ln w="38100">
+            <a:solidFill>
+              <a:schemeClr val="tx1"/>
+            </a:solidFill>
+            <a:prstDash val="lgDash"/>
+          </a:ln>
+        </p:spPr>
+        <p:style>
+          <a:lnRef idx="2">
+            <a:schemeClr val="accent1">
+              <a:shade val="15000"/>
+            </a:schemeClr>
+          </a:lnRef>
+          <a:fillRef idx="1">
+            <a:schemeClr val="accent1"/>
+          </a:fillRef>
+          <a:effectRef idx="0">
+            <a:schemeClr val="accent1"/>
+          </a:effectRef>
+          <a:fontRef idx="minor">
+            <a:schemeClr val="lt1"/>
+          </a:fontRef>
+        </p:style>
+        <p:txBody>
+          <a:bodyPr rtlCol="0" anchor="ctr"/>
+          <a:p>
+            <a:pPr algn="ctr"/>
+            <a:endParaRPr lang="zh-CN" altLang="en-US">
+              <a:solidFill>
+                <a:srgbClr val="C00000"/>
+              </a:solidFill>
+            </a:endParaRPr>
+          </a:p>
+        </p:txBody>
+      </p:sp>
       <p:cxnSp>
         <p:nvCxnSpPr>
           <p:cNvPr id="8" name="直接连接符 7"/>
           <p:cNvCxnSpPr/>
           <p:nvPr>
             <p:custDataLst>
-              <p:tags r:id="rId10"/>
+              <p:tags r:id="rId9"/>
             </p:custDataLst>
           </p:nvPr>
         </p:nvCxnSpPr>
         <p:spPr>
           <a:xfrm>
-            <a:off x="666750" y="1888490"/>
+            <a:off x="666750" y="2015490"/>
             <a:ext cx="1809115" cy="282575"/>
           </a:xfrm>
           <a:prstGeom prst="line">
@@ -5380,13 +5791,13 @@
           <p:cNvCxnSpPr/>
           <p:nvPr>
             <p:custDataLst>
-              <p:tags r:id="rId11"/>
+              <p:tags r:id="rId10"/>
             </p:custDataLst>
           </p:nvPr>
         </p:nvCxnSpPr>
         <p:spPr>
           <a:xfrm flipV="1">
-            <a:off x="3735705" y="4405630"/>
+            <a:off x="3735705" y="4532630"/>
             <a:ext cx="1209040" cy="773430"/>
           </a:xfrm>
           <a:prstGeom prst="line">
@@ -5419,14 +5830,53 @@
           <p:cNvCxnSpPr/>
           <p:nvPr>
             <p:custDataLst>
+              <p:tags r:id="rId11"/>
+            </p:custDataLst>
+          </p:nvPr>
+        </p:nvCxnSpPr>
+        <p:spPr>
+          <a:xfrm flipH="1" flipV="1">
+            <a:off x="5750560" y="4532630"/>
+            <a:ext cx="2025650" cy="832485"/>
+          </a:xfrm>
+          <a:prstGeom prst="line">
+            <a:avLst/>
+          </a:prstGeom>
+          <a:ln w="38100">
+            <a:solidFill>
+              <a:schemeClr val="tx1"/>
+            </a:solidFill>
+          </a:ln>
+        </p:spPr>
+        <p:style>
+          <a:lnRef idx="2">
+            <a:schemeClr val="accent1"/>
+          </a:lnRef>
+          <a:fillRef idx="0">
+            <a:srgbClr val="FFFFFF"/>
+          </a:fillRef>
+          <a:effectRef idx="0">
+            <a:srgbClr val="FFFFFF"/>
+          </a:effectRef>
+          <a:fontRef idx="minor">
+            <a:schemeClr val="tx1"/>
+          </a:fontRef>
+        </p:style>
+      </p:cxnSp>
+      <p:cxnSp>
+        <p:nvCxnSpPr>
+          <p:cNvPr id="20" name="直接连接符 19"/>
+          <p:cNvCxnSpPr/>
+          <p:nvPr>
+            <p:custDataLst>
               <p:tags r:id="rId12"/>
             </p:custDataLst>
           </p:nvPr>
         </p:nvCxnSpPr>
         <p:spPr>
-          <a:xfrm flipH="1" flipV="1">
-            <a:off x="5750560" y="4405630"/>
-            <a:ext cx="2025650" cy="832485"/>
+          <a:xfrm flipH="1">
+            <a:off x="4413885" y="1990090"/>
+            <a:ext cx="748665" cy="553085"/>
           </a:xfrm>
           <a:prstGeom prst="line">
             <a:avLst/>
@@ -5460,6 +5910,228 @@
 </p:sld>
 </file>
 
+<file path=ppt/slides/slide7.xml><?xml version="1.0" encoding="utf-8"?>
+<p:sld xmlns:a="http://schemas.openxmlformats.org/drawingml/2006/main" xmlns:r="http://schemas.openxmlformats.org/officeDocument/2006/relationships" xmlns:p="http://schemas.openxmlformats.org/presentationml/2006/main">
+  <p:cSld>
+    <p:spTree>
+      <p:nvGrpSpPr>
+        <p:cNvPr id="1" name=""/>
+        <p:cNvGrpSpPr/>
+        <p:nvPr/>
+      </p:nvGrpSpPr>
+      <p:grpSpPr/>
+      <p:sp>
+        <p:nvSpPr>
+          <p:cNvPr id="2" name="标题 1"/>
+          <p:cNvSpPr>
+            <a:spLocks noGrp="1"/>
+          </p:cNvSpPr>
+          <p:nvPr>
+            <p:ph type="ctrTitle"/>
+          </p:nvPr>
+        </p:nvSpPr>
+        <p:spPr/>
+        <p:txBody>
+          <a:bodyPr/>
+          <a:p>
+            <a:r>
+              <a:rPr lang="zh-CN" altLang="en-US"/>
+              <a:t>LatticeNets</a:t>
+            </a:r>
+            <a:endParaRPr lang="zh-CN" altLang="en-US"/>
+          </a:p>
+        </p:txBody>
+      </p:sp>
+      <p:sp>
+        <p:nvSpPr>
+          <p:cNvPr id="3" name="副标题 2"/>
+          <p:cNvSpPr>
+            <a:spLocks noGrp="1"/>
+          </p:cNvSpPr>
+          <p:nvPr>
+            <p:ph type="subTitle" idx="1"/>
+          </p:nvPr>
+        </p:nvSpPr>
+        <p:spPr/>
+        <p:txBody>
+          <a:bodyPr/>
+          <a:p>
+            <a:endParaRPr lang="zh-CN" altLang="en-US"/>
+          </a:p>
+        </p:txBody>
+      </p:sp>
+    </p:spTree>
+  </p:cSld>
+  <p:clrMapOvr>
+    <a:masterClrMapping/>
+  </p:clrMapOvr>
+</p:sld>
+</file>
+
+<file path=ppt/slides/slide8.xml><?xml version="1.0" encoding="utf-8"?>
+<p:sld xmlns:a="http://schemas.openxmlformats.org/drawingml/2006/main" xmlns:r="http://schemas.openxmlformats.org/officeDocument/2006/relationships" xmlns:p="http://schemas.openxmlformats.org/presentationml/2006/main">
+  <p:cSld>
+    <p:spTree>
+      <p:nvGrpSpPr>
+        <p:cNvPr id="1" name=""/>
+        <p:cNvGrpSpPr/>
+        <p:nvPr/>
+      </p:nvGrpSpPr>
+      <p:grpSpPr/>
+      <p:pic>
+        <p:nvPicPr>
+          <p:cNvPr id="4" name="图片 3"/>
+          <p:cNvPicPr>
+            <a:picLocks noChangeAspect="1"/>
+          </p:cNvPicPr>
+          <p:nvPr>
+            <p:custDataLst>
+              <p:tags r:id="rId1"/>
+            </p:custDataLst>
+          </p:nvPr>
+        </p:nvPicPr>
+        <p:blipFill>
+          <a:blip r:embed="rId2"/>
+          <a:stretch>
+            <a:fillRect/>
+          </a:stretch>
+        </p:blipFill>
+        <p:spPr>
+          <a:xfrm>
+            <a:off x="1169035" y="866140"/>
+            <a:ext cx="9620250" cy="5460365"/>
+          </a:xfrm>
+          <a:prstGeom prst="rect">
+            <a:avLst/>
+          </a:prstGeom>
+        </p:spPr>
+      </p:pic>
+      <p:sp>
+        <p:nvSpPr>
+          <p:cNvPr id="5" name="文本框 4"/>
+          <p:cNvSpPr txBox="1"/>
+          <p:nvPr>
+            <p:custDataLst>
+              <p:tags r:id="rId3"/>
+            </p:custDataLst>
+          </p:nvPr>
+        </p:nvSpPr>
+        <p:spPr>
+          <a:xfrm>
+            <a:off x="1169035" y="382905"/>
+            <a:ext cx="4204970" cy="521970"/>
+          </a:xfrm>
+          <a:prstGeom prst="rect">
+            <a:avLst/>
+          </a:prstGeom>
+          <a:noFill/>
+        </p:spPr>
+        <p:txBody>
+          <a:bodyPr wrap="square" rtlCol="0">
+            <a:spAutoFit/>
+          </a:bodyPr>
+          <a:p>
+            <a:r>
+              <a:rPr lang="zh-CN" altLang="en-US" sz="1400" b="1">
+                <a:latin typeface="微软雅黑" charset="0"/>
+                <a:ea typeface="微软雅黑" charset="0"/>
+              </a:rPr>
+              <a:t>第一种情况</a:t>
+            </a:r>
+            <a:br>
+              <a:rPr lang="zh-CN" altLang="en-US" sz="1400" b="1">
+                <a:latin typeface="微软雅黑" charset="0"/>
+                <a:ea typeface="微软雅黑" charset="0"/>
+              </a:rPr>
+            </a:br>
+            <a:r>
+              <a:rPr lang="zh-CN" altLang="en-US" sz="1400" b="1">
+                <a:latin typeface="微软雅黑" charset="0"/>
+                <a:ea typeface="微软雅黑" charset="0"/>
+              </a:rPr>
+              <a:t>上下两个通路完全一致，相当于两个残差块</a:t>
+            </a:r>
+            <a:r>
+              <a:rPr lang="zh-CN" altLang="en-US" sz="1400" b="1">
+                <a:latin typeface="微软雅黑" charset="0"/>
+                <a:ea typeface="微软雅黑" charset="0"/>
+              </a:rPr>
+              <a:t>串联</a:t>
+            </a:r>
+            <a:endParaRPr lang="zh-CN" altLang="en-US" sz="1400" b="1">
+              <a:latin typeface="微软雅黑" charset="0"/>
+              <a:ea typeface="微软雅黑" charset="0"/>
+            </a:endParaRPr>
+          </a:p>
+        </p:txBody>
+      </p:sp>
+      <p:sp>
+        <p:nvSpPr>
+          <p:cNvPr id="6" name="文本框 5"/>
+          <p:cNvSpPr txBox="1"/>
+          <p:nvPr>
+            <p:custDataLst>
+              <p:tags r:id="rId4"/>
+            </p:custDataLst>
+          </p:nvPr>
+        </p:nvSpPr>
+        <p:spPr>
+          <a:xfrm>
+            <a:off x="6027420" y="382905"/>
+            <a:ext cx="4204970" cy="521970"/>
+          </a:xfrm>
+          <a:prstGeom prst="rect">
+            <a:avLst/>
+          </a:prstGeom>
+          <a:noFill/>
+        </p:spPr>
+        <p:txBody>
+          <a:bodyPr wrap="square" rtlCol="0">
+            <a:spAutoFit/>
+          </a:bodyPr>
+          <a:p>
+            <a:r>
+              <a:rPr lang="zh-CN" altLang="en-US" sz="1400" b="1">
+                <a:latin typeface="微软雅黑" charset="0"/>
+                <a:ea typeface="微软雅黑" charset="0"/>
+              </a:rPr>
+              <a:t>第二种情况</a:t>
+            </a:r>
+            <a:br>
+              <a:rPr lang="zh-CN" altLang="en-US" sz="1400" b="1">
+                <a:latin typeface="微软雅黑" charset="0"/>
+                <a:ea typeface="微软雅黑" charset="0"/>
+              </a:rPr>
+            </a:br>
+            <a:r>
+              <a:rPr lang="zh-CN" altLang="en-US" sz="1400" b="1">
+                <a:latin typeface="微软雅黑" charset="0"/>
+                <a:ea typeface="微软雅黑" charset="0"/>
+              </a:rPr>
+              <a:t>上下两个通路第一步不一致，融合后完全</a:t>
+            </a:r>
+            <a:r>
+              <a:rPr lang="zh-CN" altLang="en-US" sz="1400" b="1">
+                <a:latin typeface="微软雅黑" charset="0"/>
+                <a:ea typeface="微软雅黑" charset="0"/>
+              </a:rPr>
+              <a:t>一致</a:t>
+            </a:r>
+            <a:endParaRPr lang="zh-CN" altLang="en-US" sz="1400" b="1">
+              <a:latin typeface="微软雅黑" charset="0"/>
+              <a:ea typeface="微软雅黑" charset="0"/>
+            </a:endParaRPr>
+          </a:p>
+        </p:txBody>
+      </p:sp>
+    </p:spTree>
+  </p:cSld>
+  <p:clrMapOvr>
+    <a:masterClrMapping/>
+  </p:clrMapOvr>
+</p:sld>
+</file>
+
 <file path=ppt/tags/tag1.xml><?xml version="1.0" encoding="utf-8"?>
 <p:tagLst xmlns:p="http://schemas.openxmlformats.org/presentationml/2006/main">
   <p:tag name="KSO_WM_BEAUTIFY_FLAG" val=""/>
@@ -5652,13 +6324,85 @@
 </p:tagLst>
 </file>
 
+<file path=ppt/tags/tag39.xml><?xml version="1.0" encoding="utf-8"?>
+<p:tagLst xmlns:p="http://schemas.openxmlformats.org/presentationml/2006/main">
+  <p:tag name="KSO_WM_BEAUTIFY_FLAG" val=""/>
+</p:tagLst>
+</file>
+
 <file path=ppt/tags/tag4.xml><?xml version="1.0" encoding="utf-8"?>
 <p:tagLst xmlns:p="http://schemas.openxmlformats.org/presentationml/2006/main">
   <p:tag name="KSO_WM_BEAUTIFY_FLAG" val=""/>
 </p:tagLst>
 </file>
 
+<file path=ppt/tags/tag40.xml><?xml version="1.0" encoding="utf-8"?>
+<p:tagLst xmlns:p="http://schemas.openxmlformats.org/presentationml/2006/main">
+  <p:tag name="KSO_WM_BEAUTIFY_FLAG" val=""/>
+</p:tagLst>
+</file>
+
+<file path=ppt/tags/tag41.xml><?xml version="1.0" encoding="utf-8"?>
+<p:tagLst xmlns:p="http://schemas.openxmlformats.org/presentationml/2006/main">
+  <p:tag name="KSO_WM_BEAUTIFY_FLAG" val=""/>
+</p:tagLst>
+</file>
+
+<file path=ppt/tags/tag42.xml><?xml version="1.0" encoding="utf-8"?>
+<p:tagLst xmlns:p="http://schemas.openxmlformats.org/presentationml/2006/main">
+  <p:tag name="KSO_WM_BEAUTIFY_FLAG" val=""/>
+</p:tagLst>
+</file>
+
+<file path=ppt/tags/tag43.xml><?xml version="1.0" encoding="utf-8"?>
+<p:tagLst xmlns:p="http://schemas.openxmlformats.org/presentationml/2006/main">
+  <p:tag name="KSO_WM_BEAUTIFY_FLAG" val=""/>
+</p:tagLst>
+</file>
+
+<file path=ppt/tags/tag44.xml><?xml version="1.0" encoding="utf-8"?>
+<p:tagLst xmlns:p="http://schemas.openxmlformats.org/presentationml/2006/main">
+  <p:tag name="KSO_WM_BEAUTIFY_FLAG" val=""/>
+</p:tagLst>
+</file>
+
+<file path=ppt/tags/tag45.xml><?xml version="1.0" encoding="utf-8"?>
+<p:tagLst xmlns:p="http://schemas.openxmlformats.org/presentationml/2006/main">
+  <p:tag name="KSO_WM_BEAUTIFY_FLAG" val=""/>
+</p:tagLst>
+</file>
+
+<file path=ppt/tags/tag46.xml><?xml version="1.0" encoding="utf-8"?>
+<p:tagLst xmlns:p="http://schemas.openxmlformats.org/presentationml/2006/main">
+  <p:tag name="KSO_WM_BEAUTIFY_FLAG" val=""/>
+</p:tagLst>
+</file>
+
+<file path=ppt/tags/tag47.xml><?xml version="1.0" encoding="utf-8"?>
+<p:tagLst xmlns:p="http://schemas.openxmlformats.org/presentationml/2006/main">
+  <p:tag name="KSO_WM_BEAUTIFY_FLAG" val=""/>
+</p:tagLst>
+</file>
+
+<file path=ppt/tags/tag48.xml><?xml version="1.0" encoding="utf-8"?>
+<p:tagLst xmlns:p="http://schemas.openxmlformats.org/presentationml/2006/main">
+  <p:tag name="KSO_WM_BEAUTIFY_FLAG" val=""/>
+</p:tagLst>
+</file>
+
+<file path=ppt/tags/tag49.xml><?xml version="1.0" encoding="utf-8"?>
+<p:tagLst xmlns:p="http://schemas.openxmlformats.org/presentationml/2006/main">
+  <p:tag name="KSO_WM_BEAUTIFY_FLAG" val=""/>
+</p:tagLst>
+</file>
+
 <file path=ppt/tags/tag5.xml><?xml version="1.0" encoding="utf-8"?>
+<p:tagLst xmlns:p="http://schemas.openxmlformats.org/presentationml/2006/main">
+  <p:tag name="KSO_WM_BEAUTIFY_FLAG" val=""/>
+</p:tagLst>
+</file>
+
+<file path=ppt/tags/tag50.xml><?xml version="1.0" encoding="utf-8"?>
 <p:tagLst xmlns:p="http://schemas.openxmlformats.org/presentationml/2006/main">
   <p:tag name="KSO_WM_BEAUTIFY_FLAG" val=""/>
 </p:tagLst>

</xml_diff>

<commit_message>
update_Compacter: A lightweight transformer for image restoration
</commit_message>
<xml_diff>
--- a/论文插图.pptx
+++ b/论文插图.pptx
@@ -8,7 +8,7 @@
     <p:notesMasterId r:id="rId4"/>
   </p:notesMasterIdLst>
   <p:handoutMasterIdLst>
-    <p:handoutMasterId r:id="rId12"/>
+    <p:handoutMasterId r:id="rId16"/>
   </p:handoutMasterIdLst>
   <p:sldIdLst>
     <p:sldId id="256" r:id="rId3"/>
@@ -19,6 +19,10 @@
     <p:sldId id="261" r:id="rId9"/>
     <p:sldId id="264" r:id="rId10"/>
     <p:sldId id="265" r:id="rId11"/>
+    <p:sldId id="266" r:id="rId12"/>
+    <p:sldId id="267" r:id="rId13"/>
+    <p:sldId id="268" r:id="rId14"/>
+    <p:sldId id="269" r:id="rId15"/>
   </p:sldIdLst>
   <p:sldSz cx="12192000" cy="6858000"/>
   <p:notesSz cx="7103745" cy="10234295"/>
@@ -4522,65 +4526,7 @@
 </p:sld>
 </file>
 
-<file path=ppt/slides/slide2.xml><?xml version="1.0" encoding="utf-8"?>
-<p:sld xmlns:a="http://schemas.openxmlformats.org/drawingml/2006/main" xmlns:r="http://schemas.openxmlformats.org/officeDocument/2006/relationships" xmlns:p="http://schemas.openxmlformats.org/presentationml/2006/main">
-  <p:cSld>
-    <p:spTree>
-      <p:nvGrpSpPr>
-        <p:cNvPr id="1" name=""/>
-        <p:cNvGrpSpPr/>
-        <p:nvPr/>
-      </p:nvGrpSpPr>
-      <p:grpSpPr/>
-      <p:sp>
-        <p:nvSpPr>
-          <p:cNvPr id="2" name="标题 1"/>
-          <p:cNvSpPr>
-            <a:spLocks noGrp="1"/>
-          </p:cNvSpPr>
-          <p:nvPr>
-            <p:ph type="ctrTitle"/>
-          </p:nvPr>
-        </p:nvSpPr>
-        <p:spPr/>
-        <p:txBody>
-          <a:bodyPr/>
-          <a:p>
-            <a:r>
-              <a:rPr lang="en-US" altLang="zh-CN"/>
-              <a:t>FD-Conv</a:t>
-            </a:r>
-            <a:endParaRPr lang="en-US" altLang="zh-CN"/>
-          </a:p>
-        </p:txBody>
-      </p:sp>
-      <p:sp>
-        <p:nvSpPr>
-          <p:cNvPr id="3" name="副标题 2"/>
-          <p:cNvSpPr>
-            <a:spLocks noGrp="1"/>
-          </p:cNvSpPr>
-          <p:nvPr>
-            <p:ph type="subTitle" idx="1"/>
-          </p:nvPr>
-        </p:nvSpPr>
-        <p:spPr/>
-        <p:txBody>
-          <a:bodyPr/>
-          <a:p>
-            <a:endParaRPr lang="zh-CN" altLang="en-US"/>
-          </a:p>
-        </p:txBody>
-      </p:sp>
-    </p:spTree>
-  </p:cSld>
-  <p:clrMapOvr>
-    <a:masterClrMapping/>
-  </p:clrMapOvr>
-</p:sld>
-</file>
-
-<file path=ppt/slides/slide3.xml><?xml version="1.0" encoding="utf-8"?>
+<file path=ppt/slides/slide10.xml><?xml version="1.0" encoding="utf-8"?>
 <p:sld xmlns:a="http://schemas.openxmlformats.org/drawingml/2006/main" xmlns:r="http://schemas.openxmlformats.org/officeDocument/2006/relationships" xmlns:p="http://schemas.openxmlformats.org/presentationml/2006/main">
   <p:cSld>
     <p:spTree>
@@ -4610,8 +4556,8 @@
         </p:blipFill>
         <p:spPr>
           <a:xfrm>
-            <a:off x="457200" y="1479550"/>
-            <a:ext cx="11277600" cy="3898900"/>
+            <a:off x="190500" y="2171700"/>
+            <a:ext cx="11811000" cy="3784600"/>
           </a:xfrm>
           <a:prstGeom prst="rect">
             <a:avLst/>
@@ -4622,12 +4568,16 @@
         <p:nvSpPr>
           <p:cNvPr id="5" name="文本框 4"/>
           <p:cNvSpPr txBox="1"/>
-          <p:nvPr/>
+          <p:nvPr>
+            <p:custDataLst>
+              <p:tags r:id="rId3"/>
+            </p:custDataLst>
+          </p:nvPr>
         </p:nvSpPr>
         <p:spPr>
           <a:xfrm>
-            <a:off x="187325" y="1167765"/>
-            <a:ext cx="4954270" cy="306705"/>
+            <a:off x="5384800" y="5829935"/>
+            <a:ext cx="4836795" cy="306705"/>
           </a:xfrm>
           <a:prstGeom prst="rect">
             <a:avLst/>
@@ -4644,151 +4594,69 @@
                 <a:latin typeface="微软雅黑" charset="0"/>
                 <a:ea typeface="微软雅黑" charset="0"/>
               </a:rPr>
-              <a:t>可视化一步卷积操作在频域中所有可学习的参数</a:t>
-            </a:r>
-            <a:endParaRPr lang="zh-CN" altLang="en-US" sz="1400" b="1">
-              <a:latin typeface="微软雅黑" charset="0"/>
-              <a:ea typeface="微软雅黑" charset="0"/>
-            </a:endParaRPr>
-          </a:p>
-        </p:txBody>
-      </p:sp>
-      <p:sp>
-        <p:nvSpPr>
-          <p:cNvPr id="6" name="文本框 5"/>
-          <p:cNvSpPr txBox="1"/>
-          <p:nvPr>
-            <p:custDataLst>
-              <p:tags r:id="rId3"/>
-            </p:custDataLst>
-          </p:nvPr>
-        </p:nvSpPr>
-        <p:spPr>
-          <a:xfrm>
-            <a:off x="3195320" y="5378450"/>
-            <a:ext cx="3502025" cy="737235"/>
-          </a:xfrm>
-          <a:prstGeom prst="rect">
-            <a:avLst/>
-          </a:prstGeom>
-          <a:noFill/>
-        </p:spPr>
-        <p:txBody>
-          <a:bodyPr wrap="square" rtlCol="0">
-            <a:spAutoFit/>
-          </a:bodyPr>
-          <a:p>
+              <a:t>每一步都相同，用</a:t>
+            </a:r>
+            <a:r>
+              <a:rPr lang="en-US" altLang="zh-CN" sz="1400" b="1">
+                <a:latin typeface="微软雅黑" charset="0"/>
+                <a:ea typeface="微软雅黑" charset="0"/>
+              </a:rPr>
+              <a:t>T3</a:t>
+            </a:r>
             <a:r>
               <a:rPr lang="zh-CN" altLang="en-US" sz="1400" b="1">
                 <a:latin typeface="微软雅黑" charset="0"/>
                 <a:ea typeface="微软雅黑" charset="0"/>
               </a:rPr>
-              <a:t>假设本卷积核只关注低频信息</a:t>
+              <a:t>举例子，</a:t>
             </a:r>
             <a:r>
               <a:rPr lang="en-US" altLang="zh-CN" sz="1400" b="1">
                 <a:latin typeface="微软雅黑" charset="0"/>
                 <a:ea typeface="微软雅黑" charset="0"/>
               </a:rPr>
-              <a:t>(</a:t>
-            </a:r>
-            <a:r>
-              <a:rPr lang="zh-CN" altLang="en-US" sz="1400" b="1">
-                <a:latin typeface="微软雅黑" charset="0"/>
-                <a:ea typeface="微软雅黑" charset="0"/>
-              </a:rPr>
-              <a:t>蓝色部分</a:t>
-            </a:r>
+              <a:t>T3 = conv1x1(cat(T4,F3))</a:t>
+            </a:r>
+            <a:endParaRPr lang="en-US" altLang="zh-CN" sz="1400" b="1">
+              <a:latin typeface="微软雅黑" charset="0"/>
+              <a:ea typeface="微软雅黑" charset="0"/>
+            </a:endParaRPr>
+          </a:p>
+        </p:txBody>
+      </p:sp>
+      <p:sp>
+        <p:nvSpPr>
+          <p:cNvPr id="6" name="文本框 5"/>
+          <p:cNvSpPr txBox="1"/>
+          <p:nvPr>
+            <p:custDataLst>
+              <p:tags r:id="rId4"/>
+            </p:custDataLst>
+          </p:nvPr>
+        </p:nvSpPr>
+        <p:spPr>
+          <a:xfrm>
+            <a:off x="10711180" y="6506845"/>
+            <a:ext cx="936625" cy="306705"/>
+          </a:xfrm>
+          <a:prstGeom prst="rect">
+            <a:avLst/>
+          </a:prstGeom>
+          <a:noFill/>
+        </p:spPr>
+        <p:txBody>
+          <a:bodyPr wrap="square" rtlCol="0">
+            <a:spAutoFit/>
+          </a:bodyPr>
+          <a:p>
             <a:r>
               <a:rPr lang="en-US" altLang="zh-CN" sz="1400" b="1">
                 <a:latin typeface="微软雅黑" charset="0"/>
                 <a:ea typeface="微软雅黑" charset="0"/>
               </a:rPr>
-              <a:t>)</a:t>
-            </a:r>
-            <a:br>
-              <a:rPr lang="en-US" altLang="zh-CN" sz="1400" b="1">
-                <a:latin typeface="微软雅黑" charset="0"/>
-                <a:ea typeface="微软雅黑" charset="0"/>
-              </a:rPr>
-            </a:br>
-            <a:r>
-              <a:rPr lang="zh-CN" altLang="en-US" sz="1400" b="1">
-                <a:latin typeface="微软雅黑" charset="0"/>
-                <a:ea typeface="微软雅黑" charset="0"/>
-              </a:rPr>
-              <a:t>那么将高频信息</a:t>
-            </a:r>
-            <a:r>
-              <a:rPr lang="en-US" altLang="zh-CN" sz="1400" b="1">
-                <a:latin typeface="微软雅黑" charset="0"/>
-                <a:ea typeface="微软雅黑" charset="0"/>
-              </a:rPr>
-              <a:t>(</a:t>
-            </a:r>
-            <a:r>
-              <a:rPr lang="zh-CN" altLang="en-US" sz="1400" b="1">
-                <a:latin typeface="微软雅黑" charset="0"/>
-                <a:ea typeface="微软雅黑" charset="0"/>
-              </a:rPr>
-              <a:t>黄色</a:t>
-            </a:r>
-            <a:r>
-              <a:rPr lang="en-US" altLang="zh-CN" sz="1400" b="1">
-                <a:latin typeface="微软雅黑" charset="0"/>
-                <a:ea typeface="微软雅黑" charset="0"/>
-              </a:rPr>
-              <a:t>)</a:t>
-            </a:r>
-            <a:r>
-              <a:rPr lang="zh-CN" altLang="en-US" sz="1400" b="1">
-                <a:latin typeface="微软雅黑" charset="0"/>
-                <a:ea typeface="微软雅黑" charset="0"/>
-              </a:rPr>
-              <a:t>置为</a:t>
-            </a:r>
-            <a:r>
-              <a:rPr lang="en-US" altLang="zh-CN" sz="1400" b="1">
-                <a:latin typeface="微软雅黑" charset="0"/>
-                <a:ea typeface="微软雅黑" charset="0"/>
-              </a:rPr>
-              <a:t>0(</a:t>
-            </a:r>
-            <a:r>
-              <a:rPr lang="zh-CN" altLang="en-US" sz="1400" b="1">
-                <a:latin typeface="微软雅黑" charset="0"/>
-                <a:ea typeface="微软雅黑" charset="0"/>
-              </a:rPr>
-              <a:t>白色</a:t>
-            </a:r>
-            <a:r>
-              <a:rPr lang="en-US" altLang="zh-CN" sz="1400" b="1">
-                <a:latin typeface="微软雅黑" charset="0"/>
-                <a:ea typeface="微软雅黑" charset="0"/>
-              </a:rPr>
-              <a:t>)</a:t>
-            </a:r>
-            <a:br>
-              <a:rPr lang="en-US" altLang="zh-CN" sz="1400" b="1">
-                <a:latin typeface="微软雅黑" charset="0"/>
-                <a:ea typeface="微软雅黑" charset="0"/>
-              </a:rPr>
-            </a:br>
-            <a:r>
-              <a:rPr lang="zh-CN" altLang="en-US" sz="1400" b="1">
-                <a:latin typeface="微软雅黑" charset="0"/>
-                <a:ea typeface="微软雅黑" charset="0"/>
-              </a:rPr>
-              <a:t>低频信息</a:t>
-            </a:r>
-            <a:r>
-              <a:rPr lang="zh-CN" altLang="en-US" sz="1400" b="1">
-                <a:latin typeface="微软雅黑" charset="0"/>
-                <a:ea typeface="微软雅黑" charset="0"/>
-              </a:rPr>
-              <a:t>不变</a:t>
-            </a:r>
-            <a:endParaRPr lang="zh-CN" altLang="en-US" sz="1400" b="1">
+              <a:t>T4=F4</a:t>
+            </a:r>
+            <a:endParaRPr lang="en-US" altLang="zh-CN" sz="1400" b="1">
               <a:latin typeface="微软雅黑" charset="0"/>
               <a:ea typeface="微软雅黑" charset="0"/>
             </a:endParaRPr>
@@ -4797,68 +4665,8 @@
       </p:sp>
       <p:sp>
         <p:nvSpPr>
-          <p:cNvPr id="7" name="文本框 6"/>
-          <p:cNvSpPr txBox="1"/>
-          <p:nvPr>
-            <p:custDataLst>
-              <p:tags r:id="rId4"/>
-            </p:custDataLst>
-          </p:nvPr>
-        </p:nvSpPr>
-        <p:spPr>
-          <a:xfrm>
-            <a:off x="6285230" y="861060"/>
-            <a:ext cx="2705735" cy="306705"/>
-          </a:xfrm>
-          <a:prstGeom prst="rect">
-            <a:avLst/>
-          </a:prstGeom>
-          <a:noFill/>
-        </p:spPr>
-        <p:txBody>
-          <a:bodyPr wrap="square" rtlCol="0">
-            <a:spAutoFit/>
-          </a:bodyPr>
-          <a:p>
-            <a:r>
-              <a:rPr lang="zh-CN" altLang="en-US" sz="1400" b="1">
-                <a:latin typeface="微软雅黑" charset="0"/>
-                <a:ea typeface="微软雅黑" charset="0"/>
-              </a:rPr>
-              <a:t>通过</a:t>
-            </a:r>
-            <a:r>
-              <a:rPr lang="en-US" altLang="zh-CN" sz="1400" b="1">
-                <a:latin typeface="微软雅黑" charset="0"/>
-                <a:ea typeface="微软雅黑" charset="0"/>
-              </a:rPr>
-              <a:t>iDFT</a:t>
-            </a:r>
-            <a:r>
-              <a:rPr lang="zh-CN" altLang="en-US" sz="1400" b="1">
-                <a:latin typeface="微软雅黑" charset="0"/>
-                <a:ea typeface="微软雅黑" charset="0"/>
-              </a:rPr>
-              <a:t>将频域映射回</a:t>
-            </a:r>
-            <a:r>
-              <a:rPr lang="zh-CN" altLang="en-US" sz="1400" b="1">
-                <a:latin typeface="微软雅黑" charset="0"/>
-                <a:ea typeface="微软雅黑" charset="0"/>
-              </a:rPr>
-              <a:t>空间域</a:t>
-            </a:r>
-            <a:endParaRPr lang="zh-CN" altLang="en-US" sz="1400" b="1">
-              <a:latin typeface="微软雅黑" charset="0"/>
-              <a:ea typeface="微软雅黑" charset="0"/>
-            </a:endParaRPr>
-          </a:p>
-        </p:txBody>
-      </p:sp>
-      <p:sp>
-        <p:nvSpPr>
-          <p:cNvPr id="8" name="文本框 7"/>
-          <p:cNvSpPr txBox="1"/>
+          <p:cNvPr id="11" name="矩形: 圆角 36"/>
+          <p:cNvSpPr/>
           <p:nvPr>
             <p:custDataLst>
               <p:tags r:id="rId5"/>
@@ -4866,462 +4674,9 @@
           </p:nvPr>
         </p:nvSpPr>
         <p:spPr>
-          <a:xfrm>
-            <a:off x="9117965" y="5071745"/>
-            <a:ext cx="2705735" cy="306705"/>
-          </a:xfrm>
-          <a:prstGeom prst="rect">
-            <a:avLst/>
-          </a:prstGeom>
-          <a:noFill/>
-        </p:spPr>
-        <p:txBody>
-          <a:bodyPr wrap="square" rtlCol="0">
-            <a:spAutoFit/>
-          </a:bodyPr>
-          <a:p>
-            <a:r>
-              <a:rPr lang="zh-CN" altLang="en-US" sz="1400" b="1">
-                <a:latin typeface="微软雅黑" charset="0"/>
-                <a:ea typeface="微软雅黑" charset="0"/>
-              </a:rPr>
-              <a:t>重新拆分拼接位</a:t>
-            </a:r>
-            <a:r>
-              <a:rPr lang="zh-CN" altLang="en-US" sz="1400" b="1">
-                <a:latin typeface="微软雅黑" charset="0"/>
-                <a:ea typeface="微软雅黑" charset="0"/>
-              </a:rPr>
-              <a:t>卷积核</a:t>
-            </a:r>
-            <a:endParaRPr lang="zh-CN" altLang="en-US" sz="1400" b="1">
-              <a:latin typeface="微软雅黑" charset="0"/>
-              <a:ea typeface="微软雅黑" charset="0"/>
-            </a:endParaRPr>
-          </a:p>
-        </p:txBody>
-      </p:sp>
-    </p:spTree>
-  </p:cSld>
-  <p:clrMapOvr>
-    <a:masterClrMapping/>
-  </p:clrMapOvr>
-</p:sld>
-</file>
-
-<file path=ppt/slides/slide4.xml><?xml version="1.0" encoding="utf-8"?>
-<p:sld xmlns:a="http://schemas.openxmlformats.org/drawingml/2006/main" xmlns:r="http://schemas.openxmlformats.org/officeDocument/2006/relationships" xmlns:p="http://schemas.openxmlformats.org/presentationml/2006/main">
-  <p:cSld>
-    <p:spTree>
-      <p:nvGrpSpPr>
-        <p:cNvPr id="1" name=""/>
-        <p:cNvGrpSpPr/>
-        <p:nvPr/>
-      </p:nvGrpSpPr>
-      <p:grpSpPr/>
-      <p:pic>
-        <p:nvPicPr>
-          <p:cNvPr id="4" name="图片 3"/>
-          <p:cNvPicPr>
-            <a:picLocks noChangeAspect="1"/>
-          </p:cNvPicPr>
-          <p:nvPr>
-            <p:custDataLst>
-              <p:tags r:id="rId1"/>
-            </p:custDataLst>
-          </p:nvPr>
-        </p:nvPicPr>
-        <p:blipFill>
-          <a:blip r:embed="rId2"/>
-          <a:stretch>
-            <a:fillRect/>
-          </a:stretch>
-        </p:blipFill>
-        <p:spPr>
-          <a:xfrm>
-            <a:off x="1435100" y="1416050"/>
-            <a:ext cx="9321800" cy="4025900"/>
-          </a:xfrm>
-          <a:prstGeom prst="rect">
-            <a:avLst/>
-          </a:prstGeom>
-        </p:spPr>
-      </p:pic>
-      <p:sp>
-        <p:nvSpPr>
-          <p:cNvPr id="5" name="文本框 4"/>
-          <p:cNvSpPr txBox="1"/>
-          <p:nvPr>
-            <p:custDataLst>
-              <p:tags r:id="rId3"/>
-            </p:custDataLst>
-          </p:nvPr>
-        </p:nvSpPr>
-        <p:spPr>
-          <a:xfrm>
-            <a:off x="3712845" y="1184275"/>
-            <a:ext cx="4954270" cy="398780"/>
-          </a:xfrm>
-          <a:prstGeom prst="rect">
-            <a:avLst/>
-          </a:prstGeom>
-          <a:noFill/>
-        </p:spPr>
-        <p:txBody>
-          <a:bodyPr wrap="square" rtlCol="0">
-            <a:spAutoFit/>
-          </a:bodyPr>
-          <a:p>
-            <a:r>
-              <a:rPr lang="zh-CN" altLang="en-US" sz="2000" b="1">
-                <a:latin typeface="微软雅黑" charset="0"/>
-                <a:ea typeface="微软雅黑" charset="0"/>
-              </a:rPr>
-              <a:t>用于为动态卷积根据输入特征分配权重</a:t>
-            </a:r>
-            <a:endParaRPr lang="zh-CN" altLang="en-US" sz="2000" b="1">
-              <a:latin typeface="微软雅黑" charset="0"/>
-              <a:ea typeface="微软雅黑" charset="0"/>
-            </a:endParaRPr>
-          </a:p>
-        </p:txBody>
-      </p:sp>
-      <p:sp>
-        <p:nvSpPr>
-          <p:cNvPr id="6" name="文本框 5"/>
-          <p:cNvSpPr txBox="1"/>
-          <p:nvPr>
-            <p:custDataLst>
-              <p:tags r:id="rId4"/>
-            </p:custDataLst>
-          </p:nvPr>
-        </p:nvSpPr>
-        <p:spPr>
-          <a:xfrm>
-            <a:off x="3628390" y="1622425"/>
-            <a:ext cx="4954270" cy="306705"/>
-          </a:xfrm>
-          <a:prstGeom prst="rect">
-            <a:avLst/>
-          </a:prstGeom>
-          <a:noFill/>
-        </p:spPr>
-        <p:txBody>
-          <a:bodyPr wrap="square" rtlCol="0">
-            <a:spAutoFit/>
-          </a:bodyPr>
-          <a:p>
-            <a:r>
-              <a:rPr lang="zh-CN" altLang="en-US" sz="1400" b="1">
-                <a:latin typeface="微软雅黑" charset="0"/>
-                <a:ea typeface="微软雅黑" charset="0"/>
-              </a:rPr>
-              <a:t>上面的部分关注全局信息，判断当前卷积核的重要</a:t>
-            </a:r>
-            <a:r>
-              <a:rPr lang="zh-CN" altLang="en-US" sz="1400" b="1">
-                <a:latin typeface="微软雅黑" charset="0"/>
-                <a:ea typeface="微软雅黑" charset="0"/>
-              </a:rPr>
-              <a:t>程度</a:t>
-            </a:r>
-            <a:endParaRPr lang="zh-CN" altLang="en-US" sz="1400" b="1">
-              <a:latin typeface="微软雅黑" charset="0"/>
-              <a:ea typeface="微软雅黑" charset="0"/>
-            </a:endParaRPr>
-          </a:p>
-        </p:txBody>
-      </p:sp>
-      <p:sp>
-        <p:nvSpPr>
-          <p:cNvPr id="7" name="文本框 6"/>
-          <p:cNvSpPr txBox="1"/>
-          <p:nvPr>
-            <p:custDataLst>
-              <p:tags r:id="rId5"/>
-            </p:custDataLst>
-          </p:nvPr>
-        </p:nvSpPr>
-        <p:spPr>
-          <a:xfrm>
-            <a:off x="3220720" y="5135245"/>
-            <a:ext cx="5750560" cy="306705"/>
-          </a:xfrm>
-          <a:prstGeom prst="rect">
-            <a:avLst/>
-          </a:prstGeom>
-          <a:noFill/>
-        </p:spPr>
-        <p:txBody>
-          <a:bodyPr wrap="square" rtlCol="0">
-            <a:spAutoFit/>
-          </a:bodyPr>
-          <a:p>
-            <a:r>
-              <a:rPr lang="zh-CN" altLang="en-US" sz="1400" b="1">
-                <a:latin typeface="微软雅黑" charset="0"/>
-                <a:ea typeface="微软雅黑" charset="0"/>
-              </a:rPr>
-              <a:t>上面的部分关注局部信息，判断当前卷积核的某个元素</a:t>
-            </a:r>
-            <a:r>
-              <a:rPr lang="zh-CN" altLang="en-US" sz="1400" b="1">
-                <a:latin typeface="微软雅黑" charset="0"/>
-                <a:ea typeface="微软雅黑" charset="0"/>
-              </a:rPr>
-              <a:t>的重要</a:t>
-            </a:r>
-            <a:r>
-              <a:rPr lang="zh-CN" altLang="en-US" sz="1400" b="1">
-                <a:latin typeface="微软雅黑" charset="0"/>
-                <a:ea typeface="微软雅黑" charset="0"/>
-              </a:rPr>
-              <a:t>程度</a:t>
-            </a:r>
-            <a:endParaRPr lang="zh-CN" altLang="en-US" sz="1400" b="1">
-              <a:latin typeface="微软雅黑" charset="0"/>
-              <a:ea typeface="微软雅黑" charset="0"/>
-            </a:endParaRPr>
-          </a:p>
-        </p:txBody>
-      </p:sp>
-    </p:spTree>
-  </p:cSld>
-  <p:clrMapOvr>
-    <a:masterClrMapping/>
-  </p:clrMapOvr>
-</p:sld>
-</file>
-
-<file path=ppt/slides/slide5.xml><?xml version="1.0" encoding="utf-8"?>
-<p:sld xmlns:a="http://schemas.openxmlformats.org/drawingml/2006/main" xmlns:r="http://schemas.openxmlformats.org/officeDocument/2006/relationships" xmlns:p="http://schemas.openxmlformats.org/presentationml/2006/main">
-  <p:cSld>
-    <p:spTree>
-      <p:nvGrpSpPr>
-        <p:cNvPr id="1" name=""/>
-        <p:cNvGrpSpPr/>
-        <p:nvPr/>
-      </p:nvGrpSpPr>
-      <p:grpSpPr/>
-      <p:pic>
-        <p:nvPicPr>
-          <p:cNvPr id="4" name="图片 3"/>
-          <p:cNvPicPr>
-            <a:picLocks noChangeAspect="1"/>
-          </p:cNvPicPr>
-          <p:nvPr>
-            <p:custDataLst>
-              <p:tags r:id="rId1"/>
-            </p:custDataLst>
-          </p:nvPr>
-        </p:nvPicPr>
-        <p:blipFill>
-          <a:blip r:embed="rId2"/>
-          <a:stretch>
-            <a:fillRect/>
-          </a:stretch>
-        </p:blipFill>
-        <p:spPr>
-          <a:xfrm>
-            <a:off x="2241550" y="1563370"/>
-            <a:ext cx="7005955" cy="4337050"/>
-          </a:xfrm>
-          <a:prstGeom prst="rect">
-            <a:avLst/>
-          </a:prstGeom>
-        </p:spPr>
-      </p:pic>
-      <p:sp>
-        <p:nvSpPr>
-          <p:cNvPr id="5" name="文本框 4"/>
-          <p:cNvSpPr txBox="1"/>
-          <p:nvPr>
-            <p:custDataLst>
-              <p:tags r:id="rId3"/>
-            </p:custDataLst>
-          </p:nvPr>
-        </p:nvSpPr>
-        <p:spPr>
-          <a:xfrm>
-            <a:off x="918845" y="2092960"/>
-            <a:ext cx="3771900" cy="306705"/>
-          </a:xfrm>
-          <a:prstGeom prst="rect">
-            <a:avLst/>
-          </a:prstGeom>
-          <a:noFill/>
-        </p:spPr>
-        <p:txBody>
-          <a:bodyPr wrap="square" rtlCol="0">
-            <a:spAutoFit/>
-          </a:bodyPr>
-          <a:p>
-            <a:r>
-              <a:rPr lang="zh-CN" altLang="en-US" sz="1400" b="1">
-                <a:latin typeface="微软雅黑" charset="0"/>
-                <a:ea typeface="微软雅黑" charset="0"/>
-              </a:rPr>
-              <a:t>将按照权重调整后的卷积核映射到频域</a:t>
-            </a:r>
-            <a:endParaRPr lang="zh-CN" altLang="en-US" sz="1400" b="1">
-              <a:latin typeface="微软雅黑" charset="0"/>
-              <a:ea typeface="微软雅黑" charset="0"/>
-            </a:endParaRPr>
-          </a:p>
-        </p:txBody>
-      </p:sp>
-      <p:sp>
-        <p:nvSpPr>
-          <p:cNvPr id="6" name="文本框 5"/>
-          <p:cNvSpPr txBox="1"/>
-          <p:nvPr>
-            <p:custDataLst>
-              <p:tags r:id="rId4"/>
-            </p:custDataLst>
-          </p:nvPr>
-        </p:nvSpPr>
-        <p:spPr>
-          <a:xfrm>
-            <a:off x="3014345" y="5900420"/>
-            <a:ext cx="3771900" cy="306705"/>
-          </a:xfrm>
-          <a:prstGeom prst="rect">
-            <a:avLst/>
-          </a:prstGeom>
-          <a:noFill/>
-        </p:spPr>
-        <p:txBody>
-          <a:bodyPr wrap="square" rtlCol="0">
-            <a:spAutoFit/>
-          </a:bodyPr>
-          <a:p>
-            <a:r>
-              <a:rPr lang="zh-CN" altLang="en-US" sz="1400" b="1">
-                <a:latin typeface="微软雅黑" charset="0"/>
-                <a:ea typeface="微软雅黑" charset="0"/>
-              </a:rPr>
-              <a:t>将</a:t>
-            </a:r>
-            <a:r>
-              <a:rPr lang="zh-CN" altLang="en-US" sz="1400" b="1">
-                <a:latin typeface="微软雅黑" charset="0"/>
-                <a:ea typeface="微软雅黑" charset="0"/>
-              </a:rPr>
-              <a:t>特征映射到频域</a:t>
-            </a:r>
-            <a:endParaRPr lang="zh-CN" altLang="en-US" sz="1400" b="1">
-              <a:latin typeface="微软雅黑" charset="0"/>
-              <a:ea typeface="微软雅黑" charset="0"/>
-            </a:endParaRPr>
-          </a:p>
-        </p:txBody>
-      </p:sp>
-      <p:sp>
-        <p:nvSpPr>
-          <p:cNvPr id="7" name="文本框 6"/>
-          <p:cNvSpPr txBox="1"/>
-          <p:nvPr>
-            <p:custDataLst>
-              <p:tags r:id="rId5"/>
-            </p:custDataLst>
-          </p:nvPr>
-        </p:nvSpPr>
-        <p:spPr>
-          <a:xfrm>
-            <a:off x="4371975" y="1372235"/>
-            <a:ext cx="2167890" cy="306705"/>
-          </a:xfrm>
-          <a:prstGeom prst="rect">
-            <a:avLst/>
-          </a:prstGeom>
-          <a:noFill/>
-        </p:spPr>
-        <p:txBody>
-          <a:bodyPr wrap="square" rtlCol="0">
-            <a:spAutoFit/>
-          </a:bodyPr>
-          <a:p>
-            <a:r>
-              <a:rPr lang="zh-CN" altLang="en-US" sz="1400" b="1">
-                <a:latin typeface="微软雅黑" charset="0"/>
-                <a:ea typeface="微软雅黑" charset="0"/>
-              </a:rPr>
-              <a:t>将按照不同频段进行</a:t>
-            </a:r>
-            <a:r>
-              <a:rPr lang="zh-CN" altLang="en-US" sz="1400" b="1">
-                <a:latin typeface="微软雅黑" charset="0"/>
-                <a:ea typeface="微软雅黑" charset="0"/>
-              </a:rPr>
-              <a:t>拆分</a:t>
-            </a:r>
-            <a:endParaRPr lang="zh-CN" altLang="en-US" sz="1400" b="1">
-              <a:latin typeface="微软雅黑" charset="0"/>
-              <a:ea typeface="微软雅黑" charset="0"/>
-            </a:endParaRPr>
-          </a:p>
-        </p:txBody>
-      </p:sp>
-      <p:sp>
-        <p:nvSpPr>
-          <p:cNvPr id="8" name="文本框 7"/>
-          <p:cNvSpPr txBox="1"/>
-          <p:nvPr>
-            <p:custDataLst>
-              <p:tags r:id="rId6"/>
-            </p:custDataLst>
-          </p:nvPr>
-        </p:nvSpPr>
-        <p:spPr>
-          <a:xfrm>
-            <a:off x="5633085" y="2276475"/>
-            <a:ext cx="2167890" cy="306705"/>
-          </a:xfrm>
-          <a:prstGeom prst="rect">
-            <a:avLst/>
-          </a:prstGeom>
-          <a:noFill/>
-        </p:spPr>
-        <p:txBody>
-          <a:bodyPr wrap="square" rtlCol="0">
-            <a:spAutoFit/>
-          </a:bodyPr>
-          <a:p>
-            <a:r>
-              <a:rPr lang="zh-CN" altLang="en-US" sz="1400" b="1">
-                <a:latin typeface="微软雅黑" charset="0"/>
-                <a:ea typeface="微软雅黑" charset="0"/>
-              </a:rPr>
-              <a:t>映射回空间</a:t>
-            </a:r>
-            <a:r>
-              <a:rPr lang="zh-CN" altLang="en-US" sz="1400" b="1">
-                <a:latin typeface="微软雅黑" charset="0"/>
-                <a:ea typeface="微软雅黑" charset="0"/>
-              </a:rPr>
-              <a:t>域</a:t>
-            </a:r>
-            <a:endParaRPr lang="zh-CN" altLang="en-US" sz="1400" b="1">
-              <a:latin typeface="微软雅黑" charset="0"/>
-              <a:ea typeface="微软雅黑" charset="0"/>
-            </a:endParaRPr>
-          </a:p>
-        </p:txBody>
-      </p:sp>
-      <p:sp>
-        <p:nvSpPr>
-          <p:cNvPr id="10" name="矩形: 圆角 36"/>
-          <p:cNvSpPr/>
-          <p:nvPr>
-            <p:custDataLst>
-              <p:tags r:id="rId7"/>
-            </p:custDataLst>
-          </p:nvPr>
-        </p:nvSpPr>
-        <p:spPr>
           <a:xfrm rot="10800000" flipV="1">
-            <a:off x="3131820" y="2399665"/>
-            <a:ext cx="663575" cy="888365"/>
+            <a:off x="8722360" y="5069840"/>
+            <a:ext cx="1374140" cy="562610"/>
           </a:xfrm>
           <a:prstGeom prst="roundRect">
             <a:avLst>
@@ -5356,410 +4711,27 @@
           <a:bodyPr rtlCol="0" anchor="ctr"/>
           <a:p>
             <a:pPr algn="ctr"/>
-            <a:endParaRPr lang="zh-CN" altLang="en-US">
-              <a:solidFill>
-                <a:srgbClr val="C00000"/>
-              </a:solidFill>
-            </a:endParaRPr>
-          </a:p>
-        </p:txBody>
-      </p:sp>
-      <p:sp>
-        <p:nvSpPr>
-          <p:cNvPr id="9" name="矩形: 圆角 36"/>
-          <p:cNvSpPr/>
-          <p:nvPr>
-            <p:custDataLst>
-              <p:tags r:id="rId8"/>
-            </p:custDataLst>
-          </p:nvPr>
-        </p:nvSpPr>
-        <p:spPr>
-          <a:xfrm rot="10800000" flipV="1">
-            <a:off x="4027170" y="5126355"/>
-            <a:ext cx="663575" cy="619760"/>
-          </a:xfrm>
-          <a:prstGeom prst="roundRect">
-            <a:avLst>
-              <a:gd name="adj" fmla="val 10039"/>
-            </a:avLst>
-          </a:prstGeom>
-          <a:noFill/>
-          <a:ln w="38100">
-            <a:solidFill>
-              <a:schemeClr val="tx1"/>
-            </a:solidFill>
-            <a:prstDash val="lgDash"/>
-          </a:ln>
-        </p:spPr>
-        <p:style>
-          <a:lnRef idx="2">
-            <a:schemeClr val="accent1">
-              <a:shade val="15000"/>
-            </a:schemeClr>
-          </a:lnRef>
-          <a:fillRef idx="1">
-            <a:schemeClr val="accent1"/>
-          </a:fillRef>
-          <a:effectRef idx="0">
-            <a:schemeClr val="accent1"/>
-          </a:effectRef>
-          <a:fontRef idx="minor">
-            <a:schemeClr val="lt1"/>
-          </a:fontRef>
-        </p:style>
-        <p:txBody>
-          <a:bodyPr rtlCol="0" anchor="ctr"/>
-          <a:p>
-            <a:pPr algn="ctr"/>
-            <a:endParaRPr lang="zh-CN" altLang="en-US">
-              <a:solidFill>
-                <a:srgbClr val="C00000"/>
-              </a:solidFill>
-            </a:endParaRPr>
-          </a:p>
-        </p:txBody>
-      </p:sp>
-      <p:sp>
-        <p:nvSpPr>
-          <p:cNvPr id="11" name="矩形: 圆角 36"/>
-          <p:cNvSpPr/>
-          <p:nvPr>
-            <p:custDataLst>
-              <p:tags r:id="rId9"/>
-            </p:custDataLst>
-          </p:nvPr>
-        </p:nvSpPr>
-        <p:spPr>
-          <a:xfrm rot="10800000" flipV="1">
-            <a:off x="4817745" y="1985645"/>
-            <a:ext cx="815340" cy="3032760"/>
-          </a:xfrm>
-          <a:prstGeom prst="roundRect">
-            <a:avLst>
-              <a:gd name="adj" fmla="val 10039"/>
-            </a:avLst>
-          </a:prstGeom>
-          <a:noFill/>
-          <a:ln w="38100">
-            <a:solidFill>
-              <a:schemeClr val="tx1"/>
-            </a:solidFill>
-            <a:prstDash val="lgDash"/>
-          </a:ln>
-        </p:spPr>
-        <p:style>
-          <a:lnRef idx="2">
-            <a:schemeClr val="accent1">
-              <a:shade val="15000"/>
-            </a:schemeClr>
-          </a:lnRef>
-          <a:fillRef idx="1">
-            <a:schemeClr val="accent1"/>
-          </a:fillRef>
-          <a:effectRef idx="0">
-            <a:schemeClr val="accent1"/>
-          </a:effectRef>
-          <a:fontRef idx="minor">
-            <a:schemeClr val="lt1"/>
-          </a:fontRef>
-        </p:style>
-        <p:txBody>
-          <a:bodyPr rtlCol="0" anchor="ctr"/>
-          <a:p>
-            <a:pPr algn="ctr"/>
-            <a:endParaRPr lang="zh-CN" altLang="en-US">
-              <a:solidFill>
-                <a:srgbClr val="C00000"/>
-              </a:solidFill>
-            </a:endParaRPr>
-          </a:p>
-        </p:txBody>
-      </p:sp>
-      <p:sp>
-        <p:nvSpPr>
-          <p:cNvPr id="12" name="矩形: 圆角 36"/>
-          <p:cNvSpPr/>
-          <p:nvPr>
-            <p:custDataLst>
-              <p:tags r:id="rId10"/>
-            </p:custDataLst>
-          </p:nvPr>
-        </p:nvSpPr>
-        <p:spPr>
-          <a:xfrm rot="10800000" flipV="1">
-            <a:off x="5799455" y="2654300"/>
-            <a:ext cx="815340" cy="889000"/>
-          </a:xfrm>
-          <a:prstGeom prst="roundRect">
-            <a:avLst>
-              <a:gd name="adj" fmla="val 10039"/>
-            </a:avLst>
-          </a:prstGeom>
-          <a:noFill/>
-          <a:ln w="38100">
-            <a:solidFill>
-              <a:schemeClr val="tx1"/>
-            </a:solidFill>
-            <a:prstDash val="lgDash"/>
-          </a:ln>
-        </p:spPr>
-        <p:style>
-          <a:lnRef idx="2">
-            <a:schemeClr val="accent1">
-              <a:shade val="15000"/>
-            </a:schemeClr>
-          </a:lnRef>
-          <a:fillRef idx="1">
-            <a:schemeClr val="accent1"/>
-          </a:fillRef>
-          <a:effectRef idx="0">
-            <a:schemeClr val="accent1"/>
-          </a:effectRef>
-          <a:fontRef idx="minor">
-            <a:schemeClr val="lt1"/>
-          </a:fontRef>
-        </p:style>
-        <p:txBody>
-          <a:bodyPr rtlCol="0" anchor="ctr"/>
-          <a:p>
-            <a:pPr algn="ctr"/>
-            <a:endParaRPr lang="zh-CN" altLang="en-US">
-              <a:solidFill>
-                <a:srgbClr val="C00000"/>
-              </a:solidFill>
-            </a:endParaRPr>
-          </a:p>
-        </p:txBody>
-      </p:sp>
-    </p:spTree>
-  </p:cSld>
-  <p:clrMapOvr>
-    <a:masterClrMapping/>
-  </p:clrMapOvr>
-</p:sld>
-</file>
-
-<file path=ppt/slides/slide6.xml><?xml version="1.0" encoding="utf-8"?>
-<p:sld xmlns:a="http://schemas.openxmlformats.org/drawingml/2006/main" xmlns:r="http://schemas.openxmlformats.org/officeDocument/2006/relationships" xmlns:p="http://schemas.openxmlformats.org/presentationml/2006/main">
-  <p:cSld>
-    <p:spTree>
-      <p:nvGrpSpPr>
-        <p:cNvPr id="1" name=""/>
-        <p:cNvGrpSpPr/>
-        <p:nvPr/>
-      </p:nvGrpSpPr>
-      <p:grpSpPr/>
-      <p:pic>
-        <p:nvPicPr>
-          <p:cNvPr id="4" name="图片 3"/>
-          <p:cNvPicPr>
-            <a:picLocks noChangeAspect="1"/>
-          </p:cNvPicPr>
-          <p:nvPr>
-            <p:custDataLst>
-              <p:tags r:id="rId1"/>
-            </p:custDataLst>
-          </p:nvPr>
-        </p:nvPicPr>
-        <p:blipFill>
-          <a:blip r:embed="rId2"/>
-          <a:stretch>
-            <a:fillRect/>
-          </a:stretch>
-        </p:blipFill>
-        <p:spPr>
-          <a:xfrm>
-            <a:off x="2380615" y="2200910"/>
-            <a:ext cx="7098665" cy="2710815"/>
-          </a:xfrm>
-          <a:prstGeom prst="rect">
-            <a:avLst/>
-          </a:prstGeom>
-        </p:spPr>
-      </p:pic>
-      <p:pic>
-        <p:nvPicPr>
-          <p:cNvPr id="5" name="图片 4"/>
-          <p:cNvPicPr>
-            <a:picLocks noChangeAspect="1"/>
-          </p:cNvPicPr>
-          <p:nvPr>
-            <p:custDataLst>
-              <p:tags r:id="rId3"/>
-            </p:custDataLst>
-          </p:nvPr>
-        </p:nvPicPr>
-        <p:blipFill>
-          <a:blip r:embed="rId4"/>
-          <a:stretch>
-            <a:fillRect/>
-          </a:stretch>
-        </p:blipFill>
-        <p:spPr>
-          <a:xfrm>
-            <a:off x="474345" y="403225"/>
-            <a:ext cx="4848860" cy="1676400"/>
-          </a:xfrm>
-          <a:prstGeom prst="rect">
-            <a:avLst/>
-          </a:prstGeom>
-        </p:spPr>
-      </p:pic>
-      <p:pic>
-        <p:nvPicPr>
-          <p:cNvPr id="6" name="图片 5"/>
-          <p:cNvPicPr>
-            <a:picLocks noChangeAspect="1"/>
-          </p:cNvPicPr>
-          <p:nvPr>
-            <p:custDataLst>
-              <p:tags r:id="rId5"/>
-            </p:custDataLst>
-          </p:nvPr>
-        </p:nvPicPr>
-        <p:blipFill>
-          <a:blip r:embed="rId6"/>
-          <a:stretch>
-            <a:fillRect/>
-          </a:stretch>
-        </p:blipFill>
-        <p:spPr>
-          <a:xfrm>
-            <a:off x="3658870" y="5033010"/>
-            <a:ext cx="4228465" cy="1826260"/>
-          </a:xfrm>
-          <a:prstGeom prst="rect">
-            <a:avLst/>
-          </a:prstGeom>
-        </p:spPr>
-      </p:pic>
-      <p:sp>
-        <p:nvSpPr>
-          <p:cNvPr id="10" name="矩形: 圆角 36"/>
-          <p:cNvSpPr/>
-          <p:nvPr>
-            <p:custDataLst>
-              <p:tags r:id="rId7"/>
-            </p:custDataLst>
-          </p:nvPr>
-        </p:nvSpPr>
-        <p:spPr>
-          <a:xfrm rot="10800000" flipV="1">
-            <a:off x="2475865" y="2298065"/>
-            <a:ext cx="1835150" cy="1826260"/>
-          </a:xfrm>
-          <a:prstGeom prst="roundRect">
-            <a:avLst>
-              <a:gd name="adj" fmla="val 10039"/>
-            </a:avLst>
-          </a:prstGeom>
-          <a:noFill/>
-          <a:ln w="38100">
-            <a:solidFill>
-              <a:schemeClr val="tx1"/>
-            </a:solidFill>
-            <a:prstDash val="lgDash"/>
-          </a:ln>
-        </p:spPr>
-        <p:style>
-          <a:lnRef idx="2">
-            <a:schemeClr val="accent1">
-              <a:shade val="15000"/>
-            </a:schemeClr>
-          </a:lnRef>
-          <a:fillRef idx="1">
-            <a:schemeClr val="accent1"/>
-          </a:fillRef>
-          <a:effectRef idx="0">
-            <a:schemeClr val="accent1"/>
-          </a:effectRef>
-          <a:fontRef idx="minor">
-            <a:schemeClr val="lt1"/>
-          </a:fontRef>
-        </p:style>
-        <p:txBody>
-          <a:bodyPr rtlCol="0" anchor="ctr"/>
-          <a:p>
-            <a:pPr algn="ctr"/>
-            <a:endParaRPr lang="zh-CN" altLang="en-US">
-              <a:solidFill>
-                <a:srgbClr val="C00000"/>
-              </a:solidFill>
-            </a:endParaRPr>
-          </a:p>
-        </p:txBody>
-      </p:sp>
-      <p:sp>
-        <p:nvSpPr>
-          <p:cNvPr id="7" name="矩形: 圆角 36"/>
-          <p:cNvSpPr/>
-          <p:nvPr>
-            <p:custDataLst>
-              <p:tags r:id="rId8"/>
-            </p:custDataLst>
-          </p:nvPr>
-        </p:nvSpPr>
-        <p:spPr>
-          <a:xfrm rot="10800000" flipV="1">
-            <a:off x="4944745" y="2401570"/>
-            <a:ext cx="805815" cy="2131060"/>
-          </a:xfrm>
-          <a:prstGeom prst="roundRect">
-            <a:avLst>
-              <a:gd name="adj" fmla="val 10039"/>
-            </a:avLst>
-          </a:prstGeom>
-          <a:noFill/>
-          <a:ln w="38100">
-            <a:solidFill>
-              <a:schemeClr val="tx1"/>
-            </a:solidFill>
-            <a:prstDash val="lgDash"/>
-          </a:ln>
-        </p:spPr>
-        <p:style>
-          <a:lnRef idx="2">
-            <a:schemeClr val="accent1">
-              <a:shade val="15000"/>
-            </a:schemeClr>
-          </a:lnRef>
-          <a:fillRef idx="1">
-            <a:schemeClr val="accent1"/>
-          </a:fillRef>
-          <a:effectRef idx="0">
-            <a:schemeClr val="accent1"/>
-          </a:effectRef>
-          <a:fontRef idx="minor">
-            <a:schemeClr val="lt1"/>
-          </a:fontRef>
-        </p:style>
-        <p:txBody>
-          <a:bodyPr rtlCol="0" anchor="ctr"/>
-          <a:p>
-            <a:pPr algn="ctr"/>
-            <a:endParaRPr lang="zh-CN" altLang="en-US">
-              <a:solidFill>
-                <a:srgbClr val="C00000"/>
-              </a:solidFill>
-            </a:endParaRPr>
+            <a:endParaRPr lang="zh-CN" altLang="en-US"/>
           </a:p>
         </p:txBody>
       </p:sp>
       <p:cxnSp>
         <p:nvCxnSpPr>
-          <p:cNvPr id="8" name="直接连接符 7"/>
-          <p:cNvCxnSpPr/>
+          <p:cNvPr id="16" name="直接连接符 15"/>
+          <p:cNvCxnSpPr>
+            <a:stCxn id="11" idx="2"/>
+            <a:endCxn id="5" idx="0"/>
+          </p:cNvCxnSpPr>
           <p:nvPr>
             <p:custDataLst>
-              <p:tags r:id="rId9"/>
+              <p:tags r:id="rId6"/>
             </p:custDataLst>
           </p:nvPr>
         </p:nvCxnSpPr>
         <p:spPr>
-          <a:xfrm>
-            <a:off x="666750" y="2015490"/>
-            <a:ext cx="1809115" cy="282575"/>
+          <a:xfrm flipH="1">
+            <a:off x="7803515" y="5632450"/>
+            <a:ext cx="1605915" cy="197485"/>
           </a:xfrm>
           <a:prstGeom prst="line">
             <a:avLst/>
@@ -5787,18 +4759,139 @@
       </p:cxnSp>
       <p:cxnSp>
         <p:nvCxnSpPr>
-          <p:cNvPr id="9" name="直接连接符 8"/>
-          <p:cNvCxnSpPr/>
+          <p:cNvPr id="7" name="直接连接符 6"/>
+          <p:cNvCxnSpPr>
+            <a:endCxn id="6" idx="0"/>
+          </p:cNvCxnSpPr>
+          <p:nvPr>
+            <p:custDataLst>
+              <p:tags r:id="rId7"/>
+            </p:custDataLst>
+          </p:nvPr>
+        </p:nvCxnSpPr>
+        <p:spPr>
+          <a:xfrm flipH="1">
+            <a:off x="11179810" y="5544820"/>
+            <a:ext cx="107950" cy="962025"/>
+          </a:xfrm>
+          <a:prstGeom prst="line">
+            <a:avLst/>
+          </a:prstGeom>
+          <a:ln w="38100">
+            <a:solidFill>
+              <a:schemeClr val="tx1"/>
+            </a:solidFill>
+          </a:ln>
+        </p:spPr>
+        <p:style>
+          <a:lnRef idx="2">
+            <a:schemeClr val="accent1"/>
+          </a:lnRef>
+          <a:fillRef idx="0">
+            <a:srgbClr val="FFFFFF"/>
+          </a:fillRef>
+          <a:effectRef idx="0">
+            <a:srgbClr val="FFFFFF"/>
+          </a:effectRef>
+          <a:fontRef idx="minor">
+            <a:schemeClr val="tx1"/>
+          </a:fontRef>
+        </p:style>
+      </p:cxnSp>
+      <p:pic>
+        <p:nvPicPr>
+          <p:cNvPr id="8" name="图片 7"/>
+          <p:cNvPicPr>
+            <a:picLocks noChangeAspect="1"/>
+          </p:cNvPicPr>
+          <p:nvPr>
+            <p:custDataLst>
+              <p:tags r:id="rId8"/>
+            </p:custDataLst>
+          </p:nvPr>
+        </p:nvPicPr>
+        <p:blipFill>
+          <a:blip r:embed="rId9"/>
+          <a:stretch>
+            <a:fillRect/>
+          </a:stretch>
+        </p:blipFill>
+        <p:spPr>
+          <a:xfrm>
+            <a:off x="2950210" y="153670"/>
+            <a:ext cx="5448300" cy="1866900"/>
+          </a:xfrm>
+          <a:prstGeom prst="rect">
+            <a:avLst/>
+          </a:prstGeom>
+        </p:spPr>
+      </p:pic>
+      <p:sp>
+        <p:nvSpPr>
+          <p:cNvPr id="9" name="矩形: 圆角 36"/>
+          <p:cNvSpPr/>
           <p:nvPr>
             <p:custDataLst>
               <p:tags r:id="rId10"/>
             </p:custDataLst>
           </p:nvPr>
+        </p:nvSpPr>
+        <p:spPr>
+          <a:xfrm rot="10800000" flipV="1">
+            <a:off x="3099435" y="2538095"/>
+            <a:ext cx="935990" cy="1229995"/>
+          </a:xfrm>
+          <a:prstGeom prst="roundRect">
+            <a:avLst>
+              <a:gd name="adj" fmla="val 10039"/>
+            </a:avLst>
+          </a:prstGeom>
+          <a:noFill/>
+          <a:ln w="38100">
+            <a:solidFill>
+              <a:schemeClr val="tx1"/>
+            </a:solidFill>
+            <a:prstDash val="lgDash"/>
+          </a:ln>
+        </p:spPr>
+        <p:style>
+          <a:lnRef idx="2">
+            <a:schemeClr val="accent1">
+              <a:shade val="15000"/>
+            </a:schemeClr>
+          </a:lnRef>
+          <a:fillRef idx="1">
+            <a:schemeClr val="accent1"/>
+          </a:fillRef>
+          <a:effectRef idx="0">
+            <a:schemeClr val="accent1"/>
+          </a:effectRef>
+          <a:fontRef idx="minor">
+            <a:schemeClr val="lt1"/>
+          </a:fontRef>
+        </p:style>
+        <p:txBody>
+          <a:bodyPr rtlCol="0" anchor="ctr"/>
+          <a:p>
+            <a:pPr algn="ctr"/>
+            <a:endParaRPr lang="zh-CN" altLang="en-US"/>
+          </a:p>
+        </p:txBody>
+      </p:sp>
+      <p:cxnSp>
+        <p:nvCxnSpPr>
+          <p:cNvPr id="10" name="直接连接符 9"/>
+          <p:cNvCxnSpPr/>
+          <p:nvPr>
+            <p:custDataLst>
+              <p:tags r:id="rId11"/>
+            </p:custDataLst>
+          </p:nvPr>
         </p:nvCxnSpPr>
         <p:spPr>
-          <a:xfrm flipV="1">
-            <a:off x="3735705" y="4532630"/>
-            <a:ext cx="1209040" cy="773430"/>
+          <a:xfrm flipH="1">
+            <a:off x="4026535" y="1841500"/>
+            <a:ext cx="4368800" cy="702945"/>
           </a:xfrm>
           <a:prstGeom prst="line">
             <a:avLst/>
@@ -5826,46 +4919,7 @@
       </p:cxnSp>
       <p:cxnSp>
         <p:nvCxnSpPr>
-          <p:cNvPr id="11" name="直接连接符 10"/>
-          <p:cNvCxnSpPr/>
-          <p:nvPr>
-            <p:custDataLst>
-              <p:tags r:id="rId11"/>
-            </p:custDataLst>
-          </p:nvPr>
-        </p:nvCxnSpPr>
-        <p:spPr>
-          <a:xfrm flipH="1" flipV="1">
-            <a:off x="5750560" y="4532630"/>
-            <a:ext cx="2025650" cy="832485"/>
-          </a:xfrm>
-          <a:prstGeom prst="line">
-            <a:avLst/>
-          </a:prstGeom>
-          <a:ln w="38100">
-            <a:solidFill>
-              <a:schemeClr val="tx1"/>
-            </a:solidFill>
-          </a:ln>
-        </p:spPr>
-        <p:style>
-          <a:lnRef idx="2">
-            <a:schemeClr val="accent1"/>
-          </a:lnRef>
-          <a:fillRef idx="0">
-            <a:srgbClr val="FFFFFF"/>
-          </a:fillRef>
-          <a:effectRef idx="0">
-            <a:srgbClr val="FFFFFF"/>
-          </a:effectRef>
-          <a:fontRef idx="minor">
-            <a:schemeClr val="tx1"/>
-          </a:fontRef>
-        </p:style>
-      </p:cxnSp>
-      <p:cxnSp>
-        <p:nvCxnSpPr>
-          <p:cNvPr id="20" name="直接连接符 19"/>
+          <p:cNvPr id="13" name="直接连接符 12"/>
           <p:cNvCxnSpPr/>
           <p:nvPr>
             <p:custDataLst>
@@ -5874,9 +4928,9 @@
           </p:nvPr>
         </p:nvCxnSpPr>
         <p:spPr>
-          <a:xfrm flipH="1">
-            <a:off x="4413885" y="1990090"/>
-            <a:ext cx="748665" cy="553085"/>
+          <a:xfrm>
+            <a:off x="3099435" y="1838960"/>
+            <a:ext cx="0" cy="705485"/>
           </a:xfrm>
           <a:prstGeom prst="line">
             <a:avLst/>
@@ -5910,6 +4964,1927 @@
 </p:sld>
 </file>
 
+<file path=ppt/slides/slide11.xml><?xml version="1.0" encoding="utf-8"?>
+<p:sld xmlns:a="http://schemas.openxmlformats.org/drawingml/2006/main" xmlns:r="http://schemas.openxmlformats.org/officeDocument/2006/relationships" xmlns:p="http://schemas.openxmlformats.org/presentationml/2006/main">
+  <p:cSld>
+    <p:spTree>
+      <p:nvGrpSpPr>
+        <p:cNvPr id="1" name=""/>
+        <p:cNvGrpSpPr/>
+        <p:nvPr/>
+      </p:nvGrpSpPr>
+      <p:grpSpPr/>
+      <p:sp>
+        <p:nvSpPr>
+          <p:cNvPr id="2" name="标题 1"/>
+          <p:cNvSpPr>
+            <a:spLocks noGrp="1"/>
+          </p:cNvSpPr>
+          <p:nvPr>
+            <p:ph type="ctrTitle"/>
+          </p:nvPr>
+        </p:nvSpPr>
+        <p:spPr/>
+        <p:txBody>
+          <a:bodyPr/>
+          <a:p>
+            <a:r>
+              <a:rPr lang="en-US" altLang="zh-CN"/>
+              <a:t>Compact</a:t>
+            </a:r>
+            <a:r>
+              <a:rPr lang="en-US" altLang="zh-CN"/>
+              <a:t>er</a:t>
+            </a:r>
+            <a:endParaRPr lang="en-US" altLang="zh-CN"/>
+          </a:p>
+        </p:txBody>
+      </p:sp>
+      <p:sp>
+        <p:nvSpPr>
+          <p:cNvPr id="3" name="副标题 2"/>
+          <p:cNvSpPr>
+            <a:spLocks noGrp="1"/>
+          </p:cNvSpPr>
+          <p:nvPr>
+            <p:ph type="subTitle" idx="1"/>
+          </p:nvPr>
+        </p:nvSpPr>
+        <p:spPr/>
+        <p:txBody>
+          <a:bodyPr/>
+          <a:p>
+            <a:endParaRPr lang="zh-CN" altLang="en-US"/>
+          </a:p>
+        </p:txBody>
+      </p:sp>
+    </p:spTree>
+  </p:cSld>
+  <p:clrMapOvr>
+    <a:masterClrMapping/>
+  </p:clrMapOvr>
+</p:sld>
+</file>
+
+<file path=ppt/slides/slide12.xml><?xml version="1.0" encoding="utf-8"?>
+<p:sld xmlns:a="http://schemas.openxmlformats.org/drawingml/2006/main" xmlns:r="http://schemas.openxmlformats.org/officeDocument/2006/relationships" xmlns:p="http://schemas.openxmlformats.org/presentationml/2006/main">
+  <p:cSld>
+    <p:spTree>
+      <p:nvGrpSpPr>
+        <p:cNvPr id="1" name=""/>
+        <p:cNvGrpSpPr/>
+        <p:nvPr/>
+      </p:nvGrpSpPr>
+      <p:grpSpPr/>
+      <p:pic>
+        <p:nvPicPr>
+          <p:cNvPr id="4" name="图片 3"/>
+          <p:cNvPicPr>
+            <a:picLocks noChangeAspect="1"/>
+          </p:cNvPicPr>
+          <p:nvPr>
+            <p:custDataLst>
+              <p:tags r:id="rId1"/>
+            </p:custDataLst>
+          </p:nvPr>
+        </p:nvPicPr>
+        <p:blipFill>
+          <a:blip r:embed="rId2"/>
+          <a:stretch>
+            <a:fillRect/>
+          </a:stretch>
+        </p:blipFill>
+        <p:spPr>
+          <a:xfrm>
+            <a:off x="565150" y="1713230"/>
+            <a:ext cx="11061700" cy="2946400"/>
+          </a:xfrm>
+          <a:prstGeom prst="rect">
+            <a:avLst/>
+          </a:prstGeom>
+        </p:spPr>
+      </p:pic>
+      <p:pic>
+        <p:nvPicPr>
+          <p:cNvPr id="5" name="图片 4"/>
+          <p:cNvPicPr>
+            <a:picLocks noChangeAspect="1"/>
+          </p:cNvPicPr>
+          <p:nvPr>
+            <p:custDataLst>
+              <p:tags r:id="rId3"/>
+            </p:custDataLst>
+          </p:nvPr>
+        </p:nvPicPr>
+        <p:blipFill>
+          <a:blip r:embed="rId4"/>
+          <a:stretch>
+            <a:fillRect/>
+          </a:stretch>
+        </p:blipFill>
+        <p:spPr>
+          <a:xfrm>
+            <a:off x="3556000" y="4619625"/>
+            <a:ext cx="8552815" cy="2150745"/>
+          </a:xfrm>
+          <a:prstGeom prst="rect">
+            <a:avLst/>
+          </a:prstGeom>
+        </p:spPr>
+      </p:pic>
+      <p:pic>
+        <p:nvPicPr>
+          <p:cNvPr id="6" name="图片 5"/>
+          <p:cNvPicPr>
+            <a:picLocks noChangeAspect="1"/>
+          </p:cNvPicPr>
+          <p:nvPr>
+            <p:custDataLst>
+              <p:tags r:id="rId5"/>
+            </p:custDataLst>
+          </p:nvPr>
+        </p:nvPicPr>
+        <p:blipFill>
+          <a:blip r:embed="rId6"/>
+          <a:stretch>
+            <a:fillRect/>
+          </a:stretch>
+        </p:blipFill>
+        <p:spPr>
+          <a:xfrm>
+            <a:off x="8686800" y="45085"/>
+            <a:ext cx="3505200" cy="1863725"/>
+          </a:xfrm>
+          <a:prstGeom prst="rect">
+            <a:avLst/>
+          </a:prstGeom>
+        </p:spPr>
+      </p:pic>
+      <p:sp>
+        <p:nvSpPr>
+          <p:cNvPr id="9" name="矩形: 圆角 36"/>
+          <p:cNvSpPr/>
+          <p:nvPr>
+            <p:custDataLst>
+              <p:tags r:id="rId7"/>
+            </p:custDataLst>
+          </p:nvPr>
+        </p:nvSpPr>
+        <p:spPr>
+          <a:xfrm rot="10800000" flipV="1">
+            <a:off x="3692525" y="2571750"/>
+            <a:ext cx="1317625" cy="1102995"/>
+          </a:xfrm>
+          <a:prstGeom prst="roundRect">
+            <a:avLst>
+              <a:gd name="adj" fmla="val 10039"/>
+            </a:avLst>
+          </a:prstGeom>
+          <a:noFill/>
+          <a:ln w="38100">
+            <a:solidFill>
+              <a:schemeClr val="tx1"/>
+            </a:solidFill>
+            <a:prstDash val="lgDash"/>
+          </a:ln>
+        </p:spPr>
+        <p:style>
+          <a:lnRef idx="2">
+            <a:schemeClr val="accent1">
+              <a:shade val="15000"/>
+            </a:schemeClr>
+          </a:lnRef>
+          <a:fillRef idx="1">
+            <a:schemeClr val="accent1"/>
+          </a:fillRef>
+          <a:effectRef idx="0">
+            <a:schemeClr val="accent1"/>
+          </a:effectRef>
+          <a:fontRef idx="minor">
+            <a:schemeClr val="lt1"/>
+          </a:fontRef>
+        </p:style>
+        <p:txBody>
+          <a:bodyPr rtlCol="0" anchor="ctr"/>
+          <a:p>
+            <a:pPr algn="ctr"/>
+            <a:endParaRPr lang="zh-CN" altLang="en-US"/>
+          </a:p>
+        </p:txBody>
+      </p:sp>
+      <p:sp>
+        <p:nvSpPr>
+          <p:cNvPr id="7" name="矩形: 圆角 36"/>
+          <p:cNvSpPr/>
+          <p:nvPr>
+            <p:custDataLst>
+              <p:tags r:id="rId8"/>
+            </p:custDataLst>
+          </p:nvPr>
+        </p:nvSpPr>
+        <p:spPr>
+          <a:xfrm rot="10800000" flipV="1">
+            <a:off x="5938520" y="2232025"/>
+            <a:ext cx="611505" cy="1738630"/>
+          </a:xfrm>
+          <a:prstGeom prst="roundRect">
+            <a:avLst>
+              <a:gd name="adj" fmla="val 10039"/>
+            </a:avLst>
+          </a:prstGeom>
+          <a:noFill/>
+          <a:ln w="38100">
+            <a:solidFill>
+              <a:schemeClr val="tx1"/>
+            </a:solidFill>
+            <a:prstDash val="lgDash"/>
+          </a:ln>
+        </p:spPr>
+        <p:style>
+          <a:lnRef idx="2">
+            <a:schemeClr val="accent1">
+              <a:shade val="15000"/>
+            </a:schemeClr>
+          </a:lnRef>
+          <a:fillRef idx="1">
+            <a:schemeClr val="accent1"/>
+          </a:fillRef>
+          <a:effectRef idx="0">
+            <a:schemeClr val="accent1"/>
+          </a:effectRef>
+          <a:fontRef idx="minor">
+            <a:schemeClr val="lt1"/>
+          </a:fontRef>
+        </p:style>
+        <p:txBody>
+          <a:bodyPr rtlCol="0" anchor="ctr"/>
+          <a:p>
+            <a:pPr algn="ctr"/>
+            <a:endParaRPr lang="zh-CN" altLang="en-US"/>
+          </a:p>
+        </p:txBody>
+      </p:sp>
+      <p:sp>
+        <p:nvSpPr>
+          <p:cNvPr id="8" name="矩形: 圆角 36"/>
+          <p:cNvSpPr/>
+          <p:nvPr>
+            <p:custDataLst>
+              <p:tags r:id="rId9"/>
+            </p:custDataLst>
+          </p:nvPr>
+        </p:nvSpPr>
+        <p:spPr>
+          <a:xfrm rot="10800000" flipV="1">
+            <a:off x="9625965" y="3305810"/>
+            <a:ext cx="1628775" cy="368935"/>
+          </a:xfrm>
+          <a:prstGeom prst="roundRect">
+            <a:avLst>
+              <a:gd name="adj" fmla="val 10039"/>
+            </a:avLst>
+          </a:prstGeom>
+          <a:noFill/>
+          <a:ln w="38100">
+            <a:solidFill>
+              <a:schemeClr val="tx1"/>
+            </a:solidFill>
+            <a:prstDash val="lgDash"/>
+          </a:ln>
+        </p:spPr>
+        <p:style>
+          <a:lnRef idx="2">
+            <a:schemeClr val="accent1">
+              <a:shade val="15000"/>
+            </a:schemeClr>
+          </a:lnRef>
+          <a:fillRef idx="1">
+            <a:schemeClr val="accent1"/>
+          </a:fillRef>
+          <a:effectRef idx="0">
+            <a:schemeClr val="accent1"/>
+          </a:effectRef>
+          <a:fontRef idx="minor">
+            <a:schemeClr val="lt1"/>
+          </a:fontRef>
+        </p:style>
+        <p:txBody>
+          <a:bodyPr rtlCol="0" anchor="ctr"/>
+          <a:p>
+            <a:pPr algn="ctr"/>
+            <a:endParaRPr lang="zh-CN" altLang="en-US"/>
+          </a:p>
+        </p:txBody>
+      </p:sp>
+      <p:sp>
+        <p:nvSpPr>
+          <p:cNvPr id="10" name="矩形: 圆角 36"/>
+          <p:cNvSpPr/>
+          <p:nvPr>
+            <p:custDataLst>
+              <p:tags r:id="rId10"/>
+            </p:custDataLst>
+          </p:nvPr>
+        </p:nvSpPr>
+        <p:spPr>
+          <a:xfrm rot="10800000" flipV="1">
+            <a:off x="9625965" y="2232025"/>
+            <a:ext cx="1628775" cy="368935"/>
+          </a:xfrm>
+          <a:prstGeom prst="roundRect">
+            <a:avLst>
+              <a:gd name="adj" fmla="val 10039"/>
+            </a:avLst>
+          </a:prstGeom>
+          <a:noFill/>
+          <a:ln w="38100">
+            <a:solidFill>
+              <a:schemeClr val="tx1"/>
+            </a:solidFill>
+            <a:prstDash val="lgDash"/>
+          </a:ln>
+        </p:spPr>
+        <p:style>
+          <a:lnRef idx="2">
+            <a:schemeClr val="accent1">
+              <a:shade val="15000"/>
+            </a:schemeClr>
+          </a:lnRef>
+          <a:fillRef idx="1">
+            <a:schemeClr val="accent1"/>
+          </a:fillRef>
+          <a:effectRef idx="0">
+            <a:schemeClr val="accent1"/>
+          </a:effectRef>
+          <a:fontRef idx="minor">
+            <a:schemeClr val="lt1"/>
+          </a:fontRef>
+        </p:style>
+        <p:txBody>
+          <a:bodyPr rtlCol="0" anchor="ctr"/>
+          <a:p>
+            <a:pPr algn="ctr"/>
+            <a:endParaRPr lang="zh-CN" altLang="en-US"/>
+          </a:p>
+        </p:txBody>
+      </p:sp>
+      <p:cxnSp>
+        <p:nvCxnSpPr>
+          <p:cNvPr id="11" name="直接连接符 10"/>
+          <p:cNvCxnSpPr>
+            <a:stCxn id="10" idx="3"/>
+          </p:cNvCxnSpPr>
+          <p:nvPr>
+            <p:custDataLst>
+              <p:tags r:id="rId11"/>
+            </p:custDataLst>
+          </p:nvPr>
+        </p:nvCxnSpPr>
+        <p:spPr>
+          <a:xfrm flipH="1">
+            <a:off x="5010150" y="2416810"/>
+            <a:ext cx="4615815" cy="184150"/>
+          </a:xfrm>
+          <a:prstGeom prst="line">
+            <a:avLst/>
+          </a:prstGeom>
+          <a:ln w="38100">
+            <a:solidFill>
+              <a:schemeClr val="tx1"/>
+            </a:solidFill>
+          </a:ln>
+        </p:spPr>
+        <p:style>
+          <a:lnRef idx="2">
+            <a:schemeClr val="accent1"/>
+          </a:lnRef>
+          <a:fillRef idx="0">
+            <a:srgbClr val="FFFFFF"/>
+          </a:fillRef>
+          <a:effectRef idx="0">
+            <a:srgbClr val="FFFFFF"/>
+          </a:effectRef>
+          <a:fontRef idx="minor">
+            <a:schemeClr val="tx1"/>
+          </a:fontRef>
+        </p:style>
+      </p:cxnSp>
+      <p:cxnSp>
+        <p:nvCxnSpPr>
+          <p:cNvPr id="12" name="直接连接符 11"/>
+          <p:cNvCxnSpPr/>
+          <p:nvPr>
+            <p:custDataLst>
+              <p:tags r:id="rId12"/>
+            </p:custDataLst>
+          </p:nvPr>
+        </p:nvCxnSpPr>
+        <p:spPr>
+          <a:xfrm flipH="1" flipV="1">
+            <a:off x="5010150" y="3674745"/>
+            <a:ext cx="4592955" cy="368300"/>
+          </a:xfrm>
+          <a:prstGeom prst="line">
+            <a:avLst/>
+          </a:prstGeom>
+          <a:ln w="38100">
+            <a:solidFill>
+              <a:schemeClr val="tx1"/>
+            </a:solidFill>
+          </a:ln>
+        </p:spPr>
+        <p:style>
+          <a:lnRef idx="2">
+            <a:schemeClr val="accent1"/>
+          </a:lnRef>
+          <a:fillRef idx="0">
+            <a:srgbClr val="FFFFFF"/>
+          </a:fillRef>
+          <a:effectRef idx="0">
+            <a:srgbClr val="FFFFFF"/>
+          </a:effectRef>
+          <a:fontRef idx="minor">
+            <a:schemeClr val="tx1"/>
+          </a:fontRef>
+        </p:style>
+      </p:cxnSp>
+      <p:sp>
+        <p:nvSpPr>
+          <p:cNvPr id="13" name="文本框 12"/>
+          <p:cNvSpPr txBox="1"/>
+          <p:nvPr>
+            <p:custDataLst>
+              <p:tags r:id="rId13"/>
+            </p:custDataLst>
+          </p:nvPr>
+        </p:nvSpPr>
+        <p:spPr>
+          <a:xfrm>
+            <a:off x="4766310" y="1581150"/>
+            <a:ext cx="4836795" cy="306705"/>
+          </a:xfrm>
+          <a:prstGeom prst="rect">
+            <a:avLst/>
+          </a:prstGeom>
+          <a:noFill/>
+        </p:spPr>
+        <p:txBody>
+          <a:bodyPr wrap="square" rtlCol="0">
+            <a:spAutoFit/>
+          </a:bodyPr>
+          <a:p>
+            <a:r>
+              <a:rPr lang="en-US" altLang="zh-CN" sz="1400" b="1">
+                <a:latin typeface="微软雅黑" charset="0"/>
+                <a:ea typeface="微软雅黑" charset="0"/>
+              </a:rPr>
+              <a:t>IR</a:t>
+            </a:r>
+            <a:r>
+              <a:rPr lang="zh-CN" altLang="en-US" sz="1400" b="1">
+                <a:latin typeface="微软雅黑" charset="0"/>
+                <a:ea typeface="微软雅黑" charset="0"/>
+              </a:rPr>
+              <a:t>和</a:t>
+            </a:r>
+            <a:r>
+              <a:rPr lang="en-US" altLang="zh-CN" sz="1400" b="1">
+                <a:latin typeface="微软雅黑" charset="0"/>
+                <a:ea typeface="微软雅黑" charset="0"/>
+              </a:rPr>
+              <a:t>SR</a:t>
+            </a:r>
+            <a:r>
+              <a:rPr lang="zh-CN" altLang="en-US" sz="1400" b="1">
+                <a:latin typeface="微软雅黑" charset="0"/>
+                <a:ea typeface="微软雅黑" charset="0"/>
+              </a:rPr>
+              <a:t>在</a:t>
+            </a:r>
+            <a:r>
+              <a:rPr lang="en-US" altLang="zh-CN" sz="1400" b="1">
+                <a:latin typeface="微软雅黑" charset="0"/>
+                <a:ea typeface="微软雅黑" charset="0"/>
+              </a:rPr>
+              <a:t>Reconstruction</a:t>
+            </a:r>
+            <a:r>
+              <a:rPr lang="zh-CN" altLang="en-US" sz="1400" b="1">
+                <a:latin typeface="微软雅黑" charset="0"/>
+                <a:ea typeface="微软雅黑" charset="0"/>
+              </a:rPr>
+              <a:t>部分设计</a:t>
+            </a:r>
+            <a:r>
+              <a:rPr lang="zh-CN" altLang="en-US" sz="1400" b="1">
+                <a:latin typeface="微软雅黑" charset="0"/>
+                <a:ea typeface="微软雅黑" charset="0"/>
+              </a:rPr>
+              <a:t>不同</a:t>
+            </a:r>
+            <a:endParaRPr lang="zh-CN" altLang="en-US" sz="1400" b="1">
+              <a:latin typeface="微软雅黑" charset="0"/>
+              <a:ea typeface="微软雅黑" charset="0"/>
+            </a:endParaRPr>
+          </a:p>
+        </p:txBody>
+      </p:sp>
+    </p:spTree>
+  </p:cSld>
+  <p:clrMapOvr>
+    <a:masterClrMapping/>
+  </p:clrMapOvr>
+</p:sld>
+</file>
+
+<file path=ppt/slides/slide2.xml><?xml version="1.0" encoding="utf-8"?>
+<p:sld xmlns:a="http://schemas.openxmlformats.org/drawingml/2006/main" xmlns:r="http://schemas.openxmlformats.org/officeDocument/2006/relationships" xmlns:p="http://schemas.openxmlformats.org/presentationml/2006/main">
+  <p:cSld>
+    <p:spTree>
+      <p:nvGrpSpPr>
+        <p:cNvPr id="1" name=""/>
+        <p:cNvGrpSpPr/>
+        <p:nvPr/>
+      </p:nvGrpSpPr>
+      <p:grpSpPr/>
+      <p:sp>
+        <p:nvSpPr>
+          <p:cNvPr id="2" name="标题 1"/>
+          <p:cNvSpPr>
+            <a:spLocks noGrp="1"/>
+          </p:cNvSpPr>
+          <p:nvPr>
+            <p:ph type="ctrTitle"/>
+          </p:nvPr>
+        </p:nvSpPr>
+        <p:spPr/>
+        <p:txBody>
+          <a:bodyPr/>
+          <a:p>
+            <a:r>
+              <a:rPr lang="en-US" altLang="zh-CN"/>
+              <a:t>FD-Conv</a:t>
+            </a:r>
+            <a:endParaRPr lang="en-US" altLang="zh-CN"/>
+          </a:p>
+        </p:txBody>
+      </p:sp>
+      <p:sp>
+        <p:nvSpPr>
+          <p:cNvPr id="3" name="副标题 2"/>
+          <p:cNvSpPr>
+            <a:spLocks noGrp="1"/>
+          </p:cNvSpPr>
+          <p:nvPr>
+            <p:ph type="subTitle" idx="1"/>
+          </p:nvPr>
+        </p:nvSpPr>
+        <p:spPr/>
+        <p:txBody>
+          <a:bodyPr/>
+          <a:p>
+            <a:endParaRPr lang="zh-CN" altLang="en-US"/>
+          </a:p>
+        </p:txBody>
+      </p:sp>
+    </p:spTree>
+  </p:cSld>
+  <p:clrMapOvr>
+    <a:masterClrMapping/>
+  </p:clrMapOvr>
+</p:sld>
+</file>
+
+<file path=ppt/slides/slide3.xml><?xml version="1.0" encoding="utf-8"?>
+<p:sld xmlns:a="http://schemas.openxmlformats.org/drawingml/2006/main" xmlns:r="http://schemas.openxmlformats.org/officeDocument/2006/relationships" xmlns:p="http://schemas.openxmlformats.org/presentationml/2006/main">
+  <p:cSld>
+    <p:spTree>
+      <p:nvGrpSpPr>
+        <p:cNvPr id="1" name=""/>
+        <p:cNvGrpSpPr/>
+        <p:nvPr/>
+      </p:nvGrpSpPr>
+      <p:grpSpPr/>
+      <p:pic>
+        <p:nvPicPr>
+          <p:cNvPr id="4" name="图片 3"/>
+          <p:cNvPicPr>
+            <a:picLocks noChangeAspect="1"/>
+          </p:cNvPicPr>
+          <p:nvPr>
+            <p:custDataLst>
+              <p:tags r:id="rId1"/>
+            </p:custDataLst>
+          </p:nvPr>
+        </p:nvPicPr>
+        <p:blipFill>
+          <a:blip r:embed="rId2"/>
+          <a:stretch>
+            <a:fillRect/>
+          </a:stretch>
+        </p:blipFill>
+        <p:spPr>
+          <a:xfrm>
+            <a:off x="457200" y="1479550"/>
+            <a:ext cx="11277600" cy="3898900"/>
+          </a:xfrm>
+          <a:prstGeom prst="rect">
+            <a:avLst/>
+          </a:prstGeom>
+        </p:spPr>
+      </p:pic>
+      <p:sp>
+        <p:nvSpPr>
+          <p:cNvPr id="5" name="文本框 4"/>
+          <p:cNvSpPr txBox="1"/>
+          <p:nvPr/>
+        </p:nvSpPr>
+        <p:spPr>
+          <a:xfrm>
+            <a:off x="187325" y="1167765"/>
+            <a:ext cx="4954270" cy="306705"/>
+          </a:xfrm>
+          <a:prstGeom prst="rect">
+            <a:avLst/>
+          </a:prstGeom>
+          <a:noFill/>
+        </p:spPr>
+        <p:txBody>
+          <a:bodyPr wrap="square" rtlCol="0">
+            <a:spAutoFit/>
+          </a:bodyPr>
+          <a:p>
+            <a:r>
+              <a:rPr lang="zh-CN" altLang="en-US" sz="1400" b="1">
+                <a:latin typeface="微软雅黑" charset="0"/>
+                <a:ea typeface="微软雅黑" charset="0"/>
+              </a:rPr>
+              <a:t>可视化一步卷积操作在频域中所有可学习的参数</a:t>
+            </a:r>
+            <a:endParaRPr lang="zh-CN" altLang="en-US" sz="1400" b="1">
+              <a:latin typeface="微软雅黑" charset="0"/>
+              <a:ea typeface="微软雅黑" charset="0"/>
+            </a:endParaRPr>
+          </a:p>
+        </p:txBody>
+      </p:sp>
+      <p:sp>
+        <p:nvSpPr>
+          <p:cNvPr id="6" name="文本框 5"/>
+          <p:cNvSpPr txBox="1"/>
+          <p:nvPr>
+            <p:custDataLst>
+              <p:tags r:id="rId3"/>
+            </p:custDataLst>
+          </p:nvPr>
+        </p:nvSpPr>
+        <p:spPr>
+          <a:xfrm>
+            <a:off x="3195320" y="5378450"/>
+            <a:ext cx="3502025" cy="737235"/>
+          </a:xfrm>
+          <a:prstGeom prst="rect">
+            <a:avLst/>
+          </a:prstGeom>
+          <a:noFill/>
+        </p:spPr>
+        <p:txBody>
+          <a:bodyPr wrap="square" rtlCol="0">
+            <a:spAutoFit/>
+          </a:bodyPr>
+          <a:p>
+            <a:r>
+              <a:rPr lang="zh-CN" altLang="en-US" sz="1400" b="1">
+                <a:latin typeface="微软雅黑" charset="0"/>
+                <a:ea typeface="微软雅黑" charset="0"/>
+              </a:rPr>
+              <a:t>假设本卷积核只关注低频信息</a:t>
+            </a:r>
+            <a:r>
+              <a:rPr lang="en-US" altLang="zh-CN" sz="1400" b="1">
+                <a:latin typeface="微软雅黑" charset="0"/>
+                <a:ea typeface="微软雅黑" charset="0"/>
+              </a:rPr>
+              <a:t>(</a:t>
+            </a:r>
+            <a:r>
+              <a:rPr lang="zh-CN" altLang="en-US" sz="1400" b="1">
+                <a:latin typeface="微软雅黑" charset="0"/>
+                <a:ea typeface="微软雅黑" charset="0"/>
+              </a:rPr>
+              <a:t>蓝色部分</a:t>
+            </a:r>
+            <a:r>
+              <a:rPr lang="en-US" altLang="zh-CN" sz="1400" b="1">
+                <a:latin typeface="微软雅黑" charset="0"/>
+                <a:ea typeface="微软雅黑" charset="0"/>
+              </a:rPr>
+              <a:t>)</a:t>
+            </a:r>
+            <a:br>
+              <a:rPr lang="en-US" altLang="zh-CN" sz="1400" b="1">
+                <a:latin typeface="微软雅黑" charset="0"/>
+                <a:ea typeface="微软雅黑" charset="0"/>
+              </a:rPr>
+            </a:br>
+            <a:r>
+              <a:rPr lang="zh-CN" altLang="en-US" sz="1400" b="1">
+                <a:latin typeface="微软雅黑" charset="0"/>
+                <a:ea typeface="微软雅黑" charset="0"/>
+              </a:rPr>
+              <a:t>那么将高频信息</a:t>
+            </a:r>
+            <a:r>
+              <a:rPr lang="en-US" altLang="zh-CN" sz="1400" b="1">
+                <a:latin typeface="微软雅黑" charset="0"/>
+                <a:ea typeface="微软雅黑" charset="0"/>
+              </a:rPr>
+              <a:t>(</a:t>
+            </a:r>
+            <a:r>
+              <a:rPr lang="zh-CN" altLang="en-US" sz="1400" b="1">
+                <a:latin typeface="微软雅黑" charset="0"/>
+                <a:ea typeface="微软雅黑" charset="0"/>
+              </a:rPr>
+              <a:t>黄色</a:t>
+            </a:r>
+            <a:r>
+              <a:rPr lang="en-US" altLang="zh-CN" sz="1400" b="1">
+                <a:latin typeface="微软雅黑" charset="0"/>
+                <a:ea typeface="微软雅黑" charset="0"/>
+              </a:rPr>
+              <a:t>)</a:t>
+            </a:r>
+            <a:r>
+              <a:rPr lang="zh-CN" altLang="en-US" sz="1400" b="1">
+                <a:latin typeface="微软雅黑" charset="0"/>
+                <a:ea typeface="微软雅黑" charset="0"/>
+              </a:rPr>
+              <a:t>置为</a:t>
+            </a:r>
+            <a:r>
+              <a:rPr lang="en-US" altLang="zh-CN" sz="1400" b="1">
+                <a:latin typeface="微软雅黑" charset="0"/>
+                <a:ea typeface="微软雅黑" charset="0"/>
+              </a:rPr>
+              <a:t>0(</a:t>
+            </a:r>
+            <a:r>
+              <a:rPr lang="zh-CN" altLang="en-US" sz="1400" b="1">
+                <a:latin typeface="微软雅黑" charset="0"/>
+                <a:ea typeface="微软雅黑" charset="0"/>
+              </a:rPr>
+              <a:t>白色</a:t>
+            </a:r>
+            <a:r>
+              <a:rPr lang="en-US" altLang="zh-CN" sz="1400" b="1">
+                <a:latin typeface="微软雅黑" charset="0"/>
+                <a:ea typeface="微软雅黑" charset="0"/>
+              </a:rPr>
+              <a:t>)</a:t>
+            </a:r>
+            <a:br>
+              <a:rPr lang="en-US" altLang="zh-CN" sz="1400" b="1">
+                <a:latin typeface="微软雅黑" charset="0"/>
+                <a:ea typeface="微软雅黑" charset="0"/>
+              </a:rPr>
+            </a:br>
+            <a:r>
+              <a:rPr lang="zh-CN" altLang="en-US" sz="1400" b="1">
+                <a:latin typeface="微软雅黑" charset="0"/>
+                <a:ea typeface="微软雅黑" charset="0"/>
+              </a:rPr>
+              <a:t>低频信息</a:t>
+            </a:r>
+            <a:r>
+              <a:rPr lang="zh-CN" altLang="en-US" sz="1400" b="1">
+                <a:latin typeface="微软雅黑" charset="0"/>
+                <a:ea typeface="微软雅黑" charset="0"/>
+              </a:rPr>
+              <a:t>不变</a:t>
+            </a:r>
+            <a:endParaRPr lang="zh-CN" altLang="en-US" sz="1400" b="1">
+              <a:latin typeface="微软雅黑" charset="0"/>
+              <a:ea typeface="微软雅黑" charset="0"/>
+            </a:endParaRPr>
+          </a:p>
+        </p:txBody>
+      </p:sp>
+      <p:sp>
+        <p:nvSpPr>
+          <p:cNvPr id="7" name="文本框 6"/>
+          <p:cNvSpPr txBox="1"/>
+          <p:nvPr>
+            <p:custDataLst>
+              <p:tags r:id="rId4"/>
+            </p:custDataLst>
+          </p:nvPr>
+        </p:nvSpPr>
+        <p:spPr>
+          <a:xfrm>
+            <a:off x="6285230" y="861060"/>
+            <a:ext cx="2705735" cy="306705"/>
+          </a:xfrm>
+          <a:prstGeom prst="rect">
+            <a:avLst/>
+          </a:prstGeom>
+          <a:noFill/>
+        </p:spPr>
+        <p:txBody>
+          <a:bodyPr wrap="square" rtlCol="0">
+            <a:spAutoFit/>
+          </a:bodyPr>
+          <a:p>
+            <a:r>
+              <a:rPr lang="zh-CN" altLang="en-US" sz="1400" b="1">
+                <a:latin typeface="微软雅黑" charset="0"/>
+                <a:ea typeface="微软雅黑" charset="0"/>
+              </a:rPr>
+              <a:t>通过</a:t>
+            </a:r>
+            <a:r>
+              <a:rPr lang="en-US" altLang="zh-CN" sz="1400" b="1">
+                <a:latin typeface="微软雅黑" charset="0"/>
+                <a:ea typeface="微软雅黑" charset="0"/>
+              </a:rPr>
+              <a:t>iDFT</a:t>
+            </a:r>
+            <a:r>
+              <a:rPr lang="zh-CN" altLang="en-US" sz="1400" b="1">
+                <a:latin typeface="微软雅黑" charset="0"/>
+                <a:ea typeface="微软雅黑" charset="0"/>
+              </a:rPr>
+              <a:t>将频域映射回</a:t>
+            </a:r>
+            <a:r>
+              <a:rPr lang="zh-CN" altLang="en-US" sz="1400" b="1">
+                <a:latin typeface="微软雅黑" charset="0"/>
+                <a:ea typeface="微软雅黑" charset="0"/>
+              </a:rPr>
+              <a:t>空间域</a:t>
+            </a:r>
+            <a:endParaRPr lang="zh-CN" altLang="en-US" sz="1400" b="1">
+              <a:latin typeface="微软雅黑" charset="0"/>
+              <a:ea typeface="微软雅黑" charset="0"/>
+            </a:endParaRPr>
+          </a:p>
+        </p:txBody>
+      </p:sp>
+      <p:sp>
+        <p:nvSpPr>
+          <p:cNvPr id="8" name="文本框 7"/>
+          <p:cNvSpPr txBox="1"/>
+          <p:nvPr>
+            <p:custDataLst>
+              <p:tags r:id="rId5"/>
+            </p:custDataLst>
+          </p:nvPr>
+        </p:nvSpPr>
+        <p:spPr>
+          <a:xfrm>
+            <a:off x="9117965" y="5071745"/>
+            <a:ext cx="2705735" cy="306705"/>
+          </a:xfrm>
+          <a:prstGeom prst="rect">
+            <a:avLst/>
+          </a:prstGeom>
+          <a:noFill/>
+        </p:spPr>
+        <p:txBody>
+          <a:bodyPr wrap="square" rtlCol="0">
+            <a:spAutoFit/>
+          </a:bodyPr>
+          <a:p>
+            <a:r>
+              <a:rPr lang="zh-CN" altLang="en-US" sz="1400" b="1">
+                <a:latin typeface="微软雅黑" charset="0"/>
+                <a:ea typeface="微软雅黑" charset="0"/>
+              </a:rPr>
+              <a:t>重新拆分拼接位</a:t>
+            </a:r>
+            <a:r>
+              <a:rPr lang="zh-CN" altLang="en-US" sz="1400" b="1">
+                <a:latin typeface="微软雅黑" charset="0"/>
+                <a:ea typeface="微软雅黑" charset="0"/>
+              </a:rPr>
+              <a:t>卷积核</a:t>
+            </a:r>
+            <a:endParaRPr lang="zh-CN" altLang="en-US" sz="1400" b="1">
+              <a:latin typeface="微软雅黑" charset="0"/>
+              <a:ea typeface="微软雅黑" charset="0"/>
+            </a:endParaRPr>
+          </a:p>
+        </p:txBody>
+      </p:sp>
+    </p:spTree>
+  </p:cSld>
+  <p:clrMapOvr>
+    <a:masterClrMapping/>
+  </p:clrMapOvr>
+</p:sld>
+</file>
+
+<file path=ppt/slides/slide4.xml><?xml version="1.0" encoding="utf-8"?>
+<p:sld xmlns:a="http://schemas.openxmlformats.org/drawingml/2006/main" xmlns:r="http://schemas.openxmlformats.org/officeDocument/2006/relationships" xmlns:p="http://schemas.openxmlformats.org/presentationml/2006/main">
+  <p:cSld>
+    <p:spTree>
+      <p:nvGrpSpPr>
+        <p:cNvPr id="1" name=""/>
+        <p:cNvGrpSpPr/>
+        <p:nvPr/>
+      </p:nvGrpSpPr>
+      <p:grpSpPr/>
+      <p:pic>
+        <p:nvPicPr>
+          <p:cNvPr id="4" name="图片 3"/>
+          <p:cNvPicPr>
+            <a:picLocks noChangeAspect="1"/>
+          </p:cNvPicPr>
+          <p:nvPr>
+            <p:custDataLst>
+              <p:tags r:id="rId1"/>
+            </p:custDataLst>
+          </p:nvPr>
+        </p:nvPicPr>
+        <p:blipFill>
+          <a:blip r:embed="rId2"/>
+          <a:stretch>
+            <a:fillRect/>
+          </a:stretch>
+        </p:blipFill>
+        <p:spPr>
+          <a:xfrm>
+            <a:off x="1435100" y="1416050"/>
+            <a:ext cx="9321800" cy="4025900"/>
+          </a:xfrm>
+          <a:prstGeom prst="rect">
+            <a:avLst/>
+          </a:prstGeom>
+        </p:spPr>
+      </p:pic>
+      <p:sp>
+        <p:nvSpPr>
+          <p:cNvPr id="5" name="文本框 4"/>
+          <p:cNvSpPr txBox="1"/>
+          <p:nvPr>
+            <p:custDataLst>
+              <p:tags r:id="rId3"/>
+            </p:custDataLst>
+          </p:nvPr>
+        </p:nvSpPr>
+        <p:spPr>
+          <a:xfrm>
+            <a:off x="3712845" y="1184275"/>
+            <a:ext cx="4954270" cy="398780"/>
+          </a:xfrm>
+          <a:prstGeom prst="rect">
+            <a:avLst/>
+          </a:prstGeom>
+          <a:noFill/>
+        </p:spPr>
+        <p:txBody>
+          <a:bodyPr wrap="square" rtlCol="0">
+            <a:spAutoFit/>
+          </a:bodyPr>
+          <a:p>
+            <a:r>
+              <a:rPr lang="zh-CN" altLang="en-US" sz="2000" b="1">
+                <a:latin typeface="微软雅黑" charset="0"/>
+                <a:ea typeface="微软雅黑" charset="0"/>
+              </a:rPr>
+              <a:t>用于为动态卷积根据输入特征分配权重</a:t>
+            </a:r>
+            <a:endParaRPr lang="zh-CN" altLang="en-US" sz="2000" b="1">
+              <a:latin typeface="微软雅黑" charset="0"/>
+              <a:ea typeface="微软雅黑" charset="0"/>
+            </a:endParaRPr>
+          </a:p>
+        </p:txBody>
+      </p:sp>
+      <p:sp>
+        <p:nvSpPr>
+          <p:cNvPr id="6" name="文本框 5"/>
+          <p:cNvSpPr txBox="1"/>
+          <p:nvPr>
+            <p:custDataLst>
+              <p:tags r:id="rId4"/>
+            </p:custDataLst>
+          </p:nvPr>
+        </p:nvSpPr>
+        <p:spPr>
+          <a:xfrm>
+            <a:off x="3628390" y="1622425"/>
+            <a:ext cx="4954270" cy="306705"/>
+          </a:xfrm>
+          <a:prstGeom prst="rect">
+            <a:avLst/>
+          </a:prstGeom>
+          <a:noFill/>
+        </p:spPr>
+        <p:txBody>
+          <a:bodyPr wrap="square" rtlCol="0">
+            <a:spAutoFit/>
+          </a:bodyPr>
+          <a:p>
+            <a:r>
+              <a:rPr lang="zh-CN" altLang="en-US" sz="1400" b="1">
+                <a:latin typeface="微软雅黑" charset="0"/>
+                <a:ea typeface="微软雅黑" charset="0"/>
+              </a:rPr>
+              <a:t>上面的部分关注全局信息，判断当前卷积核的重要</a:t>
+            </a:r>
+            <a:r>
+              <a:rPr lang="zh-CN" altLang="en-US" sz="1400" b="1">
+                <a:latin typeface="微软雅黑" charset="0"/>
+                <a:ea typeface="微软雅黑" charset="0"/>
+              </a:rPr>
+              <a:t>程度</a:t>
+            </a:r>
+            <a:endParaRPr lang="zh-CN" altLang="en-US" sz="1400" b="1">
+              <a:latin typeface="微软雅黑" charset="0"/>
+              <a:ea typeface="微软雅黑" charset="0"/>
+            </a:endParaRPr>
+          </a:p>
+        </p:txBody>
+      </p:sp>
+      <p:sp>
+        <p:nvSpPr>
+          <p:cNvPr id="7" name="文本框 6"/>
+          <p:cNvSpPr txBox="1"/>
+          <p:nvPr>
+            <p:custDataLst>
+              <p:tags r:id="rId5"/>
+            </p:custDataLst>
+          </p:nvPr>
+        </p:nvSpPr>
+        <p:spPr>
+          <a:xfrm>
+            <a:off x="3220720" y="5135245"/>
+            <a:ext cx="5750560" cy="306705"/>
+          </a:xfrm>
+          <a:prstGeom prst="rect">
+            <a:avLst/>
+          </a:prstGeom>
+          <a:noFill/>
+        </p:spPr>
+        <p:txBody>
+          <a:bodyPr wrap="square" rtlCol="0">
+            <a:spAutoFit/>
+          </a:bodyPr>
+          <a:p>
+            <a:r>
+              <a:rPr lang="zh-CN" altLang="en-US" sz="1400" b="1">
+                <a:latin typeface="微软雅黑" charset="0"/>
+                <a:ea typeface="微软雅黑" charset="0"/>
+              </a:rPr>
+              <a:t>上面的部分关注局部信息，判断当前卷积核的某个元素</a:t>
+            </a:r>
+            <a:r>
+              <a:rPr lang="zh-CN" altLang="en-US" sz="1400" b="1">
+                <a:latin typeface="微软雅黑" charset="0"/>
+                <a:ea typeface="微软雅黑" charset="0"/>
+              </a:rPr>
+              <a:t>的重要</a:t>
+            </a:r>
+            <a:r>
+              <a:rPr lang="zh-CN" altLang="en-US" sz="1400" b="1">
+                <a:latin typeface="微软雅黑" charset="0"/>
+                <a:ea typeface="微软雅黑" charset="0"/>
+              </a:rPr>
+              <a:t>程度</a:t>
+            </a:r>
+            <a:endParaRPr lang="zh-CN" altLang="en-US" sz="1400" b="1">
+              <a:latin typeface="微软雅黑" charset="0"/>
+              <a:ea typeface="微软雅黑" charset="0"/>
+            </a:endParaRPr>
+          </a:p>
+        </p:txBody>
+      </p:sp>
+    </p:spTree>
+  </p:cSld>
+  <p:clrMapOvr>
+    <a:masterClrMapping/>
+  </p:clrMapOvr>
+</p:sld>
+</file>
+
+<file path=ppt/slides/slide5.xml><?xml version="1.0" encoding="utf-8"?>
+<p:sld xmlns:a="http://schemas.openxmlformats.org/drawingml/2006/main" xmlns:r="http://schemas.openxmlformats.org/officeDocument/2006/relationships" xmlns:p="http://schemas.openxmlformats.org/presentationml/2006/main">
+  <p:cSld>
+    <p:spTree>
+      <p:nvGrpSpPr>
+        <p:cNvPr id="1" name=""/>
+        <p:cNvGrpSpPr/>
+        <p:nvPr/>
+      </p:nvGrpSpPr>
+      <p:grpSpPr/>
+      <p:pic>
+        <p:nvPicPr>
+          <p:cNvPr id="4" name="图片 3"/>
+          <p:cNvPicPr>
+            <a:picLocks noChangeAspect="1"/>
+          </p:cNvPicPr>
+          <p:nvPr>
+            <p:custDataLst>
+              <p:tags r:id="rId1"/>
+            </p:custDataLst>
+          </p:nvPr>
+        </p:nvPicPr>
+        <p:blipFill>
+          <a:blip r:embed="rId2"/>
+          <a:stretch>
+            <a:fillRect/>
+          </a:stretch>
+        </p:blipFill>
+        <p:spPr>
+          <a:xfrm>
+            <a:off x="2241550" y="1563370"/>
+            <a:ext cx="7005955" cy="4337050"/>
+          </a:xfrm>
+          <a:prstGeom prst="rect">
+            <a:avLst/>
+          </a:prstGeom>
+        </p:spPr>
+      </p:pic>
+      <p:sp>
+        <p:nvSpPr>
+          <p:cNvPr id="5" name="文本框 4"/>
+          <p:cNvSpPr txBox="1"/>
+          <p:nvPr>
+            <p:custDataLst>
+              <p:tags r:id="rId3"/>
+            </p:custDataLst>
+          </p:nvPr>
+        </p:nvSpPr>
+        <p:spPr>
+          <a:xfrm>
+            <a:off x="918845" y="2092960"/>
+            <a:ext cx="3771900" cy="306705"/>
+          </a:xfrm>
+          <a:prstGeom prst="rect">
+            <a:avLst/>
+          </a:prstGeom>
+          <a:noFill/>
+        </p:spPr>
+        <p:txBody>
+          <a:bodyPr wrap="square" rtlCol="0">
+            <a:spAutoFit/>
+          </a:bodyPr>
+          <a:p>
+            <a:r>
+              <a:rPr lang="zh-CN" altLang="en-US" sz="1400" b="1">
+                <a:latin typeface="微软雅黑" charset="0"/>
+                <a:ea typeface="微软雅黑" charset="0"/>
+              </a:rPr>
+              <a:t>将按照权重调整后的卷积核映射到频域</a:t>
+            </a:r>
+            <a:endParaRPr lang="zh-CN" altLang="en-US" sz="1400" b="1">
+              <a:latin typeface="微软雅黑" charset="0"/>
+              <a:ea typeface="微软雅黑" charset="0"/>
+            </a:endParaRPr>
+          </a:p>
+        </p:txBody>
+      </p:sp>
+      <p:sp>
+        <p:nvSpPr>
+          <p:cNvPr id="6" name="文本框 5"/>
+          <p:cNvSpPr txBox="1"/>
+          <p:nvPr>
+            <p:custDataLst>
+              <p:tags r:id="rId4"/>
+            </p:custDataLst>
+          </p:nvPr>
+        </p:nvSpPr>
+        <p:spPr>
+          <a:xfrm>
+            <a:off x="3014345" y="5900420"/>
+            <a:ext cx="3771900" cy="306705"/>
+          </a:xfrm>
+          <a:prstGeom prst="rect">
+            <a:avLst/>
+          </a:prstGeom>
+          <a:noFill/>
+        </p:spPr>
+        <p:txBody>
+          <a:bodyPr wrap="square" rtlCol="0">
+            <a:spAutoFit/>
+          </a:bodyPr>
+          <a:p>
+            <a:r>
+              <a:rPr lang="zh-CN" altLang="en-US" sz="1400" b="1">
+                <a:latin typeface="微软雅黑" charset="0"/>
+                <a:ea typeface="微软雅黑" charset="0"/>
+              </a:rPr>
+              <a:t>将</a:t>
+            </a:r>
+            <a:r>
+              <a:rPr lang="zh-CN" altLang="en-US" sz="1400" b="1">
+                <a:latin typeface="微软雅黑" charset="0"/>
+                <a:ea typeface="微软雅黑" charset="0"/>
+              </a:rPr>
+              <a:t>特征映射到频域</a:t>
+            </a:r>
+            <a:endParaRPr lang="zh-CN" altLang="en-US" sz="1400" b="1">
+              <a:latin typeface="微软雅黑" charset="0"/>
+              <a:ea typeface="微软雅黑" charset="0"/>
+            </a:endParaRPr>
+          </a:p>
+        </p:txBody>
+      </p:sp>
+      <p:sp>
+        <p:nvSpPr>
+          <p:cNvPr id="7" name="文本框 6"/>
+          <p:cNvSpPr txBox="1"/>
+          <p:nvPr>
+            <p:custDataLst>
+              <p:tags r:id="rId5"/>
+            </p:custDataLst>
+          </p:nvPr>
+        </p:nvSpPr>
+        <p:spPr>
+          <a:xfrm>
+            <a:off x="4371975" y="1372235"/>
+            <a:ext cx="2167890" cy="306705"/>
+          </a:xfrm>
+          <a:prstGeom prst="rect">
+            <a:avLst/>
+          </a:prstGeom>
+          <a:noFill/>
+        </p:spPr>
+        <p:txBody>
+          <a:bodyPr wrap="square" rtlCol="0">
+            <a:spAutoFit/>
+          </a:bodyPr>
+          <a:p>
+            <a:r>
+              <a:rPr lang="zh-CN" altLang="en-US" sz="1400" b="1">
+                <a:latin typeface="微软雅黑" charset="0"/>
+                <a:ea typeface="微软雅黑" charset="0"/>
+              </a:rPr>
+              <a:t>将按照不同频段进行</a:t>
+            </a:r>
+            <a:r>
+              <a:rPr lang="zh-CN" altLang="en-US" sz="1400" b="1">
+                <a:latin typeface="微软雅黑" charset="0"/>
+                <a:ea typeface="微软雅黑" charset="0"/>
+              </a:rPr>
+              <a:t>拆分</a:t>
+            </a:r>
+            <a:endParaRPr lang="zh-CN" altLang="en-US" sz="1400" b="1">
+              <a:latin typeface="微软雅黑" charset="0"/>
+              <a:ea typeface="微软雅黑" charset="0"/>
+            </a:endParaRPr>
+          </a:p>
+        </p:txBody>
+      </p:sp>
+      <p:sp>
+        <p:nvSpPr>
+          <p:cNvPr id="8" name="文本框 7"/>
+          <p:cNvSpPr txBox="1"/>
+          <p:nvPr>
+            <p:custDataLst>
+              <p:tags r:id="rId6"/>
+            </p:custDataLst>
+          </p:nvPr>
+        </p:nvSpPr>
+        <p:spPr>
+          <a:xfrm>
+            <a:off x="5633085" y="2276475"/>
+            <a:ext cx="2167890" cy="306705"/>
+          </a:xfrm>
+          <a:prstGeom prst="rect">
+            <a:avLst/>
+          </a:prstGeom>
+          <a:noFill/>
+        </p:spPr>
+        <p:txBody>
+          <a:bodyPr wrap="square" rtlCol="0">
+            <a:spAutoFit/>
+          </a:bodyPr>
+          <a:p>
+            <a:r>
+              <a:rPr lang="zh-CN" altLang="en-US" sz="1400" b="1">
+                <a:latin typeface="微软雅黑" charset="0"/>
+                <a:ea typeface="微软雅黑" charset="0"/>
+              </a:rPr>
+              <a:t>映射回空间</a:t>
+            </a:r>
+            <a:r>
+              <a:rPr lang="zh-CN" altLang="en-US" sz="1400" b="1">
+                <a:latin typeface="微软雅黑" charset="0"/>
+                <a:ea typeface="微软雅黑" charset="0"/>
+              </a:rPr>
+              <a:t>域</a:t>
+            </a:r>
+            <a:endParaRPr lang="zh-CN" altLang="en-US" sz="1400" b="1">
+              <a:latin typeface="微软雅黑" charset="0"/>
+              <a:ea typeface="微软雅黑" charset="0"/>
+            </a:endParaRPr>
+          </a:p>
+        </p:txBody>
+      </p:sp>
+      <p:sp>
+        <p:nvSpPr>
+          <p:cNvPr id="10" name="矩形: 圆角 36"/>
+          <p:cNvSpPr/>
+          <p:nvPr>
+            <p:custDataLst>
+              <p:tags r:id="rId7"/>
+            </p:custDataLst>
+          </p:nvPr>
+        </p:nvSpPr>
+        <p:spPr>
+          <a:xfrm rot="10800000" flipV="1">
+            <a:off x="3131820" y="2399665"/>
+            <a:ext cx="663575" cy="888365"/>
+          </a:xfrm>
+          <a:prstGeom prst="roundRect">
+            <a:avLst>
+              <a:gd name="adj" fmla="val 10039"/>
+            </a:avLst>
+          </a:prstGeom>
+          <a:noFill/>
+          <a:ln w="38100">
+            <a:solidFill>
+              <a:schemeClr val="tx1"/>
+            </a:solidFill>
+            <a:prstDash val="lgDash"/>
+          </a:ln>
+        </p:spPr>
+        <p:style>
+          <a:lnRef idx="2">
+            <a:schemeClr val="accent1">
+              <a:shade val="15000"/>
+            </a:schemeClr>
+          </a:lnRef>
+          <a:fillRef idx="1">
+            <a:schemeClr val="accent1"/>
+          </a:fillRef>
+          <a:effectRef idx="0">
+            <a:schemeClr val="accent1"/>
+          </a:effectRef>
+          <a:fontRef idx="minor">
+            <a:schemeClr val="lt1"/>
+          </a:fontRef>
+        </p:style>
+        <p:txBody>
+          <a:bodyPr rtlCol="0" anchor="ctr"/>
+          <a:p>
+            <a:pPr algn="ctr"/>
+            <a:endParaRPr lang="zh-CN" altLang="en-US">
+              <a:solidFill>
+                <a:srgbClr val="C00000"/>
+              </a:solidFill>
+            </a:endParaRPr>
+          </a:p>
+        </p:txBody>
+      </p:sp>
+      <p:sp>
+        <p:nvSpPr>
+          <p:cNvPr id="9" name="矩形: 圆角 36"/>
+          <p:cNvSpPr/>
+          <p:nvPr>
+            <p:custDataLst>
+              <p:tags r:id="rId8"/>
+            </p:custDataLst>
+          </p:nvPr>
+        </p:nvSpPr>
+        <p:spPr>
+          <a:xfrm rot="10800000" flipV="1">
+            <a:off x="4027170" y="5126355"/>
+            <a:ext cx="663575" cy="619760"/>
+          </a:xfrm>
+          <a:prstGeom prst="roundRect">
+            <a:avLst>
+              <a:gd name="adj" fmla="val 10039"/>
+            </a:avLst>
+          </a:prstGeom>
+          <a:noFill/>
+          <a:ln w="38100">
+            <a:solidFill>
+              <a:schemeClr val="tx1"/>
+            </a:solidFill>
+            <a:prstDash val="lgDash"/>
+          </a:ln>
+        </p:spPr>
+        <p:style>
+          <a:lnRef idx="2">
+            <a:schemeClr val="accent1">
+              <a:shade val="15000"/>
+            </a:schemeClr>
+          </a:lnRef>
+          <a:fillRef idx="1">
+            <a:schemeClr val="accent1"/>
+          </a:fillRef>
+          <a:effectRef idx="0">
+            <a:schemeClr val="accent1"/>
+          </a:effectRef>
+          <a:fontRef idx="minor">
+            <a:schemeClr val="lt1"/>
+          </a:fontRef>
+        </p:style>
+        <p:txBody>
+          <a:bodyPr rtlCol="0" anchor="ctr"/>
+          <a:p>
+            <a:pPr algn="ctr"/>
+            <a:endParaRPr lang="zh-CN" altLang="en-US">
+              <a:solidFill>
+                <a:srgbClr val="C00000"/>
+              </a:solidFill>
+            </a:endParaRPr>
+          </a:p>
+        </p:txBody>
+      </p:sp>
+      <p:sp>
+        <p:nvSpPr>
+          <p:cNvPr id="11" name="矩形: 圆角 36"/>
+          <p:cNvSpPr/>
+          <p:nvPr>
+            <p:custDataLst>
+              <p:tags r:id="rId9"/>
+            </p:custDataLst>
+          </p:nvPr>
+        </p:nvSpPr>
+        <p:spPr>
+          <a:xfrm rot="10800000" flipV="1">
+            <a:off x="4817745" y="1985645"/>
+            <a:ext cx="815340" cy="3032760"/>
+          </a:xfrm>
+          <a:prstGeom prst="roundRect">
+            <a:avLst>
+              <a:gd name="adj" fmla="val 10039"/>
+            </a:avLst>
+          </a:prstGeom>
+          <a:noFill/>
+          <a:ln w="38100">
+            <a:solidFill>
+              <a:schemeClr val="tx1"/>
+            </a:solidFill>
+            <a:prstDash val="lgDash"/>
+          </a:ln>
+        </p:spPr>
+        <p:style>
+          <a:lnRef idx="2">
+            <a:schemeClr val="accent1">
+              <a:shade val="15000"/>
+            </a:schemeClr>
+          </a:lnRef>
+          <a:fillRef idx="1">
+            <a:schemeClr val="accent1"/>
+          </a:fillRef>
+          <a:effectRef idx="0">
+            <a:schemeClr val="accent1"/>
+          </a:effectRef>
+          <a:fontRef idx="minor">
+            <a:schemeClr val="lt1"/>
+          </a:fontRef>
+        </p:style>
+        <p:txBody>
+          <a:bodyPr rtlCol="0" anchor="ctr"/>
+          <a:p>
+            <a:pPr algn="ctr"/>
+            <a:endParaRPr lang="zh-CN" altLang="en-US">
+              <a:solidFill>
+                <a:srgbClr val="C00000"/>
+              </a:solidFill>
+            </a:endParaRPr>
+          </a:p>
+        </p:txBody>
+      </p:sp>
+      <p:sp>
+        <p:nvSpPr>
+          <p:cNvPr id="12" name="矩形: 圆角 36"/>
+          <p:cNvSpPr/>
+          <p:nvPr>
+            <p:custDataLst>
+              <p:tags r:id="rId10"/>
+            </p:custDataLst>
+          </p:nvPr>
+        </p:nvSpPr>
+        <p:spPr>
+          <a:xfrm rot="10800000" flipV="1">
+            <a:off x="5799455" y="2654300"/>
+            <a:ext cx="815340" cy="889000"/>
+          </a:xfrm>
+          <a:prstGeom prst="roundRect">
+            <a:avLst>
+              <a:gd name="adj" fmla="val 10039"/>
+            </a:avLst>
+          </a:prstGeom>
+          <a:noFill/>
+          <a:ln w="38100">
+            <a:solidFill>
+              <a:schemeClr val="tx1"/>
+            </a:solidFill>
+            <a:prstDash val="lgDash"/>
+          </a:ln>
+        </p:spPr>
+        <p:style>
+          <a:lnRef idx="2">
+            <a:schemeClr val="accent1">
+              <a:shade val="15000"/>
+            </a:schemeClr>
+          </a:lnRef>
+          <a:fillRef idx="1">
+            <a:schemeClr val="accent1"/>
+          </a:fillRef>
+          <a:effectRef idx="0">
+            <a:schemeClr val="accent1"/>
+          </a:effectRef>
+          <a:fontRef idx="minor">
+            <a:schemeClr val="lt1"/>
+          </a:fontRef>
+        </p:style>
+        <p:txBody>
+          <a:bodyPr rtlCol="0" anchor="ctr"/>
+          <a:p>
+            <a:pPr algn="ctr"/>
+            <a:endParaRPr lang="zh-CN" altLang="en-US">
+              <a:solidFill>
+                <a:srgbClr val="C00000"/>
+              </a:solidFill>
+            </a:endParaRPr>
+          </a:p>
+        </p:txBody>
+      </p:sp>
+    </p:spTree>
+  </p:cSld>
+  <p:clrMapOvr>
+    <a:masterClrMapping/>
+  </p:clrMapOvr>
+</p:sld>
+</file>
+
+<file path=ppt/slides/slide6.xml><?xml version="1.0" encoding="utf-8"?>
+<p:sld xmlns:a="http://schemas.openxmlformats.org/drawingml/2006/main" xmlns:r="http://schemas.openxmlformats.org/officeDocument/2006/relationships" xmlns:p="http://schemas.openxmlformats.org/presentationml/2006/main">
+  <p:cSld>
+    <p:spTree>
+      <p:nvGrpSpPr>
+        <p:cNvPr id="1" name=""/>
+        <p:cNvGrpSpPr/>
+        <p:nvPr/>
+      </p:nvGrpSpPr>
+      <p:grpSpPr/>
+      <p:pic>
+        <p:nvPicPr>
+          <p:cNvPr id="4" name="图片 3"/>
+          <p:cNvPicPr>
+            <a:picLocks noChangeAspect="1"/>
+          </p:cNvPicPr>
+          <p:nvPr>
+            <p:custDataLst>
+              <p:tags r:id="rId1"/>
+            </p:custDataLst>
+          </p:nvPr>
+        </p:nvPicPr>
+        <p:blipFill>
+          <a:blip r:embed="rId2"/>
+          <a:stretch>
+            <a:fillRect/>
+          </a:stretch>
+        </p:blipFill>
+        <p:spPr>
+          <a:xfrm>
+            <a:off x="2380615" y="2200910"/>
+            <a:ext cx="7098665" cy="2710815"/>
+          </a:xfrm>
+          <a:prstGeom prst="rect">
+            <a:avLst/>
+          </a:prstGeom>
+        </p:spPr>
+      </p:pic>
+      <p:pic>
+        <p:nvPicPr>
+          <p:cNvPr id="5" name="图片 4"/>
+          <p:cNvPicPr>
+            <a:picLocks noChangeAspect="1"/>
+          </p:cNvPicPr>
+          <p:nvPr>
+            <p:custDataLst>
+              <p:tags r:id="rId3"/>
+            </p:custDataLst>
+          </p:nvPr>
+        </p:nvPicPr>
+        <p:blipFill>
+          <a:blip r:embed="rId4"/>
+          <a:stretch>
+            <a:fillRect/>
+          </a:stretch>
+        </p:blipFill>
+        <p:spPr>
+          <a:xfrm>
+            <a:off x="474345" y="403225"/>
+            <a:ext cx="4848860" cy="1676400"/>
+          </a:xfrm>
+          <a:prstGeom prst="rect">
+            <a:avLst/>
+          </a:prstGeom>
+        </p:spPr>
+      </p:pic>
+      <p:pic>
+        <p:nvPicPr>
+          <p:cNvPr id="6" name="图片 5"/>
+          <p:cNvPicPr>
+            <a:picLocks noChangeAspect="1"/>
+          </p:cNvPicPr>
+          <p:nvPr>
+            <p:custDataLst>
+              <p:tags r:id="rId5"/>
+            </p:custDataLst>
+          </p:nvPr>
+        </p:nvPicPr>
+        <p:blipFill>
+          <a:blip r:embed="rId6"/>
+          <a:stretch>
+            <a:fillRect/>
+          </a:stretch>
+        </p:blipFill>
+        <p:spPr>
+          <a:xfrm>
+            <a:off x="3658870" y="5033010"/>
+            <a:ext cx="4228465" cy="1826260"/>
+          </a:xfrm>
+          <a:prstGeom prst="rect">
+            <a:avLst/>
+          </a:prstGeom>
+        </p:spPr>
+      </p:pic>
+      <p:sp>
+        <p:nvSpPr>
+          <p:cNvPr id="10" name="矩形: 圆角 36"/>
+          <p:cNvSpPr/>
+          <p:nvPr>
+            <p:custDataLst>
+              <p:tags r:id="rId7"/>
+            </p:custDataLst>
+          </p:nvPr>
+        </p:nvSpPr>
+        <p:spPr>
+          <a:xfrm rot="10800000" flipV="1">
+            <a:off x="2475865" y="2298065"/>
+            <a:ext cx="1835150" cy="1826260"/>
+          </a:xfrm>
+          <a:prstGeom prst="roundRect">
+            <a:avLst>
+              <a:gd name="adj" fmla="val 10039"/>
+            </a:avLst>
+          </a:prstGeom>
+          <a:noFill/>
+          <a:ln w="38100">
+            <a:solidFill>
+              <a:schemeClr val="tx1"/>
+            </a:solidFill>
+            <a:prstDash val="lgDash"/>
+          </a:ln>
+        </p:spPr>
+        <p:style>
+          <a:lnRef idx="2">
+            <a:schemeClr val="accent1">
+              <a:shade val="15000"/>
+            </a:schemeClr>
+          </a:lnRef>
+          <a:fillRef idx="1">
+            <a:schemeClr val="accent1"/>
+          </a:fillRef>
+          <a:effectRef idx="0">
+            <a:schemeClr val="accent1"/>
+          </a:effectRef>
+          <a:fontRef idx="minor">
+            <a:schemeClr val="lt1"/>
+          </a:fontRef>
+        </p:style>
+        <p:txBody>
+          <a:bodyPr rtlCol="0" anchor="ctr"/>
+          <a:p>
+            <a:pPr algn="ctr"/>
+            <a:endParaRPr lang="zh-CN" altLang="en-US">
+              <a:solidFill>
+                <a:srgbClr val="C00000"/>
+              </a:solidFill>
+            </a:endParaRPr>
+          </a:p>
+        </p:txBody>
+      </p:sp>
+      <p:sp>
+        <p:nvSpPr>
+          <p:cNvPr id="7" name="矩形: 圆角 36"/>
+          <p:cNvSpPr/>
+          <p:nvPr>
+            <p:custDataLst>
+              <p:tags r:id="rId8"/>
+            </p:custDataLst>
+          </p:nvPr>
+        </p:nvSpPr>
+        <p:spPr>
+          <a:xfrm rot="10800000" flipV="1">
+            <a:off x="4944745" y="2401570"/>
+            <a:ext cx="805815" cy="2131060"/>
+          </a:xfrm>
+          <a:prstGeom prst="roundRect">
+            <a:avLst>
+              <a:gd name="adj" fmla="val 10039"/>
+            </a:avLst>
+          </a:prstGeom>
+          <a:noFill/>
+          <a:ln w="38100">
+            <a:solidFill>
+              <a:schemeClr val="tx1"/>
+            </a:solidFill>
+            <a:prstDash val="lgDash"/>
+          </a:ln>
+        </p:spPr>
+        <p:style>
+          <a:lnRef idx="2">
+            <a:schemeClr val="accent1">
+              <a:shade val="15000"/>
+            </a:schemeClr>
+          </a:lnRef>
+          <a:fillRef idx="1">
+            <a:schemeClr val="accent1"/>
+          </a:fillRef>
+          <a:effectRef idx="0">
+            <a:schemeClr val="accent1"/>
+          </a:effectRef>
+          <a:fontRef idx="minor">
+            <a:schemeClr val="lt1"/>
+          </a:fontRef>
+        </p:style>
+        <p:txBody>
+          <a:bodyPr rtlCol="0" anchor="ctr"/>
+          <a:p>
+            <a:pPr algn="ctr"/>
+            <a:endParaRPr lang="zh-CN" altLang="en-US">
+              <a:solidFill>
+                <a:srgbClr val="C00000"/>
+              </a:solidFill>
+            </a:endParaRPr>
+          </a:p>
+        </p:txBody>
+      </p:sp>
+      <p:cxnSp>
+        <p:nvCxnSpPr>
+          <p:cNvPr id="8" name="直接连接符 7"/>
+          <p:cNvCxnSpPr/>
+          <p:nvPr>
+            <p:custDataLst>
+              <p:tags r:id="rId9"/>
+            </p:custDataLst>
+          </p:nvPr>
+        </p:nvCxnSpPr>
+        <p:spPr>
+          <a:xfrm>
+            <a:off x="666750" y="2015490"/>
+            <a:ext cx="1809115" cy="282575"/>
+          </a:xfrm>
+          <a:prstGeom prst="line">
+            <a:avLst/>
+          </a:prstGeom>
+          <a:ln w="38100">
+            <a:solidFill>
+              <a:schemeClr val="tx1"/>
+            </a:solidFill>
+          </a:ln>
+        </p:spPr>
+        <p:style>
+          <a:lnRef idx="2">
+            <a:schemeClr val="accent1"/>
+          </a:lnRef>
+          <a:fillRef idx="0">
+            <a:srgbClr val="FFFFFF"/>
+          </a:fillRef>
+          <a:effectRef idx="0">
+            <a:srgbClr val="FFFFFF"/>
+          </a:effectRef>
+          <a:fontRef idx="minor">
+            <a:schemeClr val="tx1"/>
+          </a:fontRef>
+        </p:style>
+      </p:cxnSp>
+      <p:cxnSp>
+        <p:nvCxnSpPr>
+          <p:cNvPr id="9" name="直接连接符 8"/>
+          <p:cNvCxnSpPr/>
+          <p:nvPr>
+            <p:custDataLst>
+              <p:tags r:id="rId10"/>
+            </p:custDataLst>
+          </p:nvPr>
+        </p:nvCxnSpPr>
+        <p:spPr>
+          <a:xfrm flipV="1">
+            <a:off x="3735705" y="4532630"/>
+            <a:ext cx="1209040" cy="773430"/>
+          </a:xfrm>
+          <a:prstGeom prst="line">
+            <a:avLst/>
+          </a:prstGeom>
+          <a:ln w="38100">
+            <a:solidFill>
+              <a:schemeClr val="tx1"/>
+            </a:solidFill>
+          </a:ln>
+        </p:spPr>
+        <p:style>
+          <a:lnRef idx="2">
+            <a:schemeClr val="accent1"/>
+          </a:lnRef>
+          <a:fillRef idx="0">
+            <a:srgbClr val="FFFFFF"/>
+          </a:fillRef>
+          <a:effectRef idx="0">
+            <a:srgbClr val="FFFFFF"/>
+          </a:effectRef>
+          <a:fontRef idx="minor">
+            <a:schemeClr val="tx1"/>
+          </a:fontRef>
+        </p:style>
+      </p:cxnSp>
+      <p:cxnSp>
+        <p:nvCxnSpPr>
+          <p:cNvPr id="11" name="直接连接符 10"/>
+          <p:cNvCxnSpPr/>
+          <p:nvPr>
+            <p:custDataLst>
+              <p:tags r:id="rId11"/>
+            </p:custDataLst>
+          </p:nvPr>
+        </p:nvCxnSpPr>
+        <p:spPr>
+          <a:xfrm flipH="1" flipV="1">
+            <a:off x="5750560" y="4532630"/>
+            <a:ext cx="2025650" cy="832485"/>
+          </a:xfrm>
+          <a:prstGeom prst="line">
+            <a:avLst/>
+          </a:prstGeom>
+          <a:ln w="38100">
+            <a:solidFill>
+              <a:schemeClr val="tx1"/>
+            </a:solidFill>
+          </a:ln>
+        </p:spPr>
+        <p:style>
+          <a:lnRef idx="2">
+            <a:schemeClr val="accent1"/>
+          </a:lnRef>
+          <a:fillRef idx="0">
+            <a:srgbClr val="FFFFFF"/>
+          </a:fillRef>
+          <a:effectRef idx="0">
+            <a:srgbClr val="FFFFFF"/>
+          </a:effectRef>
+          <a:fontRef idx="minor">
+            <a:schemeClr val="tx1"/>
+          </a:fontRef>
+        </p:style>
+      </p:cxnSp>
+      <p:cxnSp>
+        <p:nvCxnSpPr>
+          <p:cNvPr id="20" name="直接连接符 19"/>
+          <p:cNvCxnSpPr/>
+          <p:nvPr>
+            <p:custDataLst>
+              <p:tags r:id="rId12"/>
+            </p:custDataLst>
+          </p:nvPr>
+        </p:nvCxnSpPr>
+        <p:spPr>
+          <a:xfrm flipH="1">
+            <a:off x="4413885" y="1990090"/>
+            <a:ext cx="748665" cy="553085"/>
+          </a:xfrm>
+          <a:prstGeom prst="line">
+            <a:avLst/>
+          </a:prstGeom>
+          <a:ln w="38100">
+            <a:solidFill>
+              <a:schemeClr val="tx1"/>
+            </a:solidFill>
+          </a:ln>
+        </p:spPr>
+        <p:style>
+          <a:lnRef idx="2">
+            <a:schemeClr val="accent1"/>
+          </a:lnRef>
+          <a:fillRef idx="0">
+            <a:srgbClr val="FFFFFF"/>
+          </a:fillRef>
+          <a:effectRef idx="0">
+            <a:srgbClr val="FFFFFF"/>
+          </a:effectRef>
+          <a:fontRef idx="minor">
+            <a:schemeClr val="tx1"/>
+          </a:fontRef>
+        </p:style>
+      </p:cxnSp>
+    </p:spTree>
+  </p:cSld>
+  <p:clrMapOvr>
+    <a:masterClrMapping/>
+  </p:clrMapOvr>
+</p:sld>
+</file>
+
 <file path=ppt/slides/slide7.xml><?xml version="1.0" encoding="utf-8"?>
 <p:sld xmlns:a="http://schemas.openxmlformats.org/drawingml/2006/main" xmlns:r="http://schemas.openxmlformats.org/officeDocument/2006/relationships" xmlns:p="http://schemas.openxmlformats.org/presentationml/2006/main">
   <p:cSld>
@@ -6124,6 +7099,124 @@
           </a:p>
         </p:txBody>
       </p:sp>
+      <p:sp>
+        <p:nvSpPr>
+          <p:cNvPr id="7" name="文本框 6"/>
+          <p:cNvSpPr txBox="1"/>
+          <p:nvPr>
+            <p:custDataLst>
+              <p:tags r:id="rId5"/>
+            </p:custDataLst>
+          </p:nvPr>
+        </p:nvSpPr>
+        <p:spPr>
+          <a:xfrm>
+            <a:off x="1169035" y="6188075"/>
+            <a:ext cx="4204970" cy="521970"/>
+          </a:xfrm>
+          <a:prstGeom prst="rect">
+            <a:avLst/>
+          </a:prstGeom>
+          <a:noFill/>
+        </p:spPr>
+        <p:txBody>
+          <a:bodyPr wrap="square" rtlCol="0">
+            <a:spAutoFit/>
+          </a:bodyPr>
+          <a:p>
+            <a:r>
+              <a:rPr lang="zh-CN" altLang="en-US" sz="1400" b="1">
+                <a:latin typeface="微软雅黑" charset="0"/>
+                <a:ea typeface="微软雅黑" charset="0"/>
+              </a:rPr>
+              <a:t>第三种情况</a:t>
+            </a:r>
+            <a:br>
+              <a:rPr lang="zh-CN" altLang="en-US" sz="1400" b="1">
+                <a:latin typeface="微软雅黑" charset="0"/>
+                <a:ea typeface="微软雅黑" charset="0"/>
+              </a:rPr>
+            </a:br>
+            <a:r>
+              <a:rPr lang="zh-CN" altLang="en-US" sz="1400" b="1">
+                <a:latin typeface="微软雅黑" charset="0"/>
+                <a:ea typeface="微软雅黑" charset="0"/>
+              </a:rPr>
+              <a:t>上下两个通路第一步一致，融合后</a:t>
+            </a:r>
+            <a:r>
+              <a:rPr lang="zh-CN" altLang="en-US" sz="1400" b="1">
+                <a:latin typeface="微软雅黑" charset="0"/>
+                <a:ea typeface="微软雅黑" charset="0"/>
+              </a:rPr>
+              <a:t>不一致</a:t>
+            </a:r>
+            <a:endParaRPr lang="zh-CN" altLang="en-US" sz="1400" b="1">
+              <a:latin typeface="微软雅黑" charset="0"/>
+              <a:ea typeface="微软雅黑" charset="0"/>
+            </a:endParaRPr>
+          </a:p>
+        </p:txBody>
+      </p:sp>
+      <p:sp>
+        <p:nvSpPr>
+          <p:cNvPr id="8" name="文本框 7"/>
+          <p:cNvSpPr txBox="1"/>
+          <p:nvPr>
+            <p:custDataLst>
+              <p:tags r:id="rId6"/>
+            </p:custDataLst>
+          </p:nvPr>
+        </p:nvSpPr>
+        <p:spPr>
+          <a:xfrm>
+            <a:off x="6402705" y="6188075"/>
+            <a:ext cx="4204970" cy="521970"/>
+          </a:xfrm>
+          <a:prstGeom prst="rect">
+            <a:avLst/>
+          </a:prstGeom>
+          <a:noFill/>
+        </p:spPr>
+        <p:txBody>
+          <a:bodyPr wrap="square" rtlCol="0">
+            <a:spAutoFit/>
+          </a:bodyPr>
+          <a:p>
+            <a:r>
+              <a:rPr lang="zh-CN" altLang="en-US" sz="1400" b="1">
+                <a:latin typeface="微软雅黑" charset="0"/>
+                <a:ea typeface="微软雅黑" charset="0"/>
+              </a:rPr>
+              <a:t>第三种情况</a:t>
+            </a:r>
+            <a:br>
+              <a:rPr lang="zh-CN" altLang="en-US" sz="1400" b="1">
+                <a:latin typeface="微软雅黑" charset="0"/>
+                <a:ea typeface="微软雅黑" charset="0"/>
+              </a:rPr>
+            </a:br>
+            <a:r>
+              <a:rPr lang="zh-CN" altLang="en-US" sz="1400" b="1">
+                <a:latin typeface="微软雅黑" charset="0"/>
+                <a:ea typeface="微软雅黑" charset="0"/>
+              </a:rPr>
+              <a:t>上下两个通路</a:t>
+            </a:r>
+            <a:r>
+              <a:rPr lang="zh-CN" altLang="en-US" sz="1400" b="1">
+                <a:latin typeface="微软雅黑" charset="0"/>
+                <a:ea typeface="微软雅黑" charset="0"/>
+              </a:rPr>
+              <a:t>都不一致</a:t>
+            </a:r>
+            <a:endParaRPr lang="zh-CN" altLang="en-US" sz="1400" b="1">
+              <a:latin typeface="微软雅黑" charset="0"/>
+              <a:ea typeface="微软雅黑" charset="0"/>
+            </a:endParaRPr>
+          </a:p>
+        </p:txBody>
+      </p:sp>
     </p:spTree>
   </p:cSld>
   <p:clrMapOvr>
@@ -6132,6 +7225,223 @@
 </p:sld>
 </file>
 
+<file path=ppt/slides/slide9.xml><?xml version="1.0" encoding="utf-8"?>
+<p:sld xmlns:a="http://schemas.openxmlformats.org/drawingml/2006/main" xmlns:r="http://schemas.openxmlformats.org/officeDocument/2006/relationships" xmlns:p="http://schemas.openxmlformats.org/presentationml/2006/main">
+  <p:cSld>
+    <p:spTree>
+      <p:nvGrpSpPr>
+        <p:cNvPr id="1" name=""/>
+        <p:cNvGrpSpPr/>
+        <p:nvPr/>
+      </p:nvGrpSpPr>
+      <p:grpSpPr/>
+      <p:pic>
+        <p:nvPicPr>
+          <p:cNvPr id="4" name="图片 3"/>
+          <p:cNvPicPr>
+            <a:picLocks noChangeAspect="1"/>
+          </p:cNvPicPr>
+          <p:nvPr>
+            <p:custDataLst>
+              <p:tags r:id="rId1"/>
+            </p:custDataLst>
+          </p:nvPr>
+        </p:nvPicPr>
+        <p:blipFill>
+          <a:blip r:embed="rId2"/>
+          <a:stretch>
+            <a:fillRect/>
+          </a:stretch>
+        </p:blipFill>
+        <p:spPr>
+          <a:xfrm>
+            <a:off x="400050" y="1244600"/>
+            <a:ext cx="11391900" cy="4368800"/>
+          </a:xfrm>
+          <a:prstGeom prst="rect">
+            <a:avLst/>
+          </a:prstGeom>
+        </p:spPr>
+      </p:pic>
+      <p:sp>
+        <p:nvSpPr>
+          <p:cNvPr id="5" name="文本框 4"/>
+          <p:cNvSpPr txBox="1"/>
+          <p:nvPr>
+            <p:custDataLst>
+              <p:tags r:id="rId3"/>
+            </p:custDataLst>
+          </p:nvPr>
+        </p:nvSpPr>
+        <p:spPr>
+          <a:xfrm>
+            <a:off x="2000250" y="535305"/>
+            <a:ext cx="4204970" cy="521970"/>
+          </a:xfrm>
+          <a:prstGeom prst="rect">
+            <a:avLst/>
+          </a:prstGeom>
+          <a:noFill/>
+        </p:spPr>
+        <p:txBody>
+          <a:bodyPr wrap="square" rtlCol="0">
+            <a:spAutoFit/>
+          </a:bodyPr>
+          <a:p>
+            <a:r>
+              <a:rPr lang="zh-CN" altLang="en-US" sz="1400" b="1">
+                <a:latin typeface="微软雅黑" charset="0"/>
+                <a:ea typeface="微软雅黑" charset="0"/>
+              </a:rPr>
+              <a:t>上分支使用全局平均</a:t>
+            </a:r>
+            <a:r>
+              <a:rPr lang="zh-CN" altLang="en-US" sz="1400" b="1">
+                <a:latin typeface="微软雅黑" charset="0"/>
+                <a:ea typeface="微软雅黑" charset="0"/>
+              </a:rPr>
+              <a:t>池化</a:t>
+            </a:r>
+            <a:br>
+              <a:rPr lang="zh-CN" altLang="en-US" sz="1400" b="1">
+                <a:latin typeface="微软雅黑" charset="0"/>
+                <a:ea typeface="微软雅黑" charset="0"/>
+              </a:rPr>
+            </a:br>
+            <a:r>
+              <a:rPr lang="zh-CN" altLang="en-US" sz="1400" b="1">
+                <a:latin typeface="微软雅黑" charset="0"/>
+                <a:ea typeface="微软雅黑" charset="0"/>
+              </a:rPr>
+              <a:t>用于计算每个通道的</a:t>
+            </a:r>
+            <a:r>
+              <a:rPr lang="zh-CN" altLang="en-US" sz="1400" b="1">
+                <a:latin typeface="微软雅黑" charset="0"/>
+                <a:ea typeface="微软雅黑" charset="0"/>
+              </a:rPr>
+              <a:t>强度</a:t>
+            </a:r>
+            <a:endParaRPr lang="zh-CN" altLang="en-US" sz="1400" b="1">
+              <a:latin typeface="微软雅黑" charset="0"/>
+              <a:ea typeface="微软雅黑" charset="0"/>
+            </a:endParaRPr>
+          </a:p>
+        </p:txBody>
+      </p:sp>
+      <p:sp>
+        <p:nvSpPr>
+          <p:cNvPr id="6" name="文本框 5"/>
+          <p:cNvSpPr txBox="1"/>
+          <p:nvPr>
+            <p:custDataLst>
+              <p:tags r:id="rId4"/>
+            </p:custDataLst>
+          </p:nvPr>
+        </p:nvSpPr>
+        <p:spPr>
+          <a:xfrm>
+            <a:off x="2000250" y="5534025"/>
+            <a:ext cx="4204970" cy="521970"/>
+          </a:xfrm>
+          <a:prstGeom prst="rect">
+            <a:avLst/>
+          </a:prstGeom>
+          <a:noFill/>
+        </p:spPr>
+        <p:txBody>
+          <a:bodyPr wrap="square" rtlCol="0">
+            <a:spAutoFit/>
+          </a:bodyPr>
+          <a:p>
+            <a:r>
+              <a:rPr lang="zh-CN" altLang="en-US" sz="1400" b="1">
+                <a:latin typeface="微软雅黑" charset="0"/>
+                <a:ea typeface="微软雅黑" charset="0"/>
+              </a:rPr>
+              <a:t>下分支使用标准差池化</a:t>
+            </a:r>
+            <a:br>
+              <a:rPr lang="zh-CN" altLang="en-US" sz="1400" b="1">
+                <a:latin typeface="微软雅黑" charset="0"/>
+                <a:ea typeface="微软雅黑" charset="0"/>
+              </a:rPr>
+            </a:br>
+            <a:r>
+              <a:rPr lang="zh-CN" altLang="en-US" sz="1400" b="1">
+                <a:latin typeface="微软雅黑" charset="0"/>
+                <a:ea typeface="微软雅黑" charset="0"/>
+              </a:rPr>
+              <a:t>用于计算每个通道的的变化</a:t>
+            </a:r>
+            <a:r>
+              <a:rPr lang="zh-CN" altLang="en-US" sz="1400" b="1">
+                <a:latin typeface="微软雅黑" charset="0"/>
+                <a:ea typeface="微软雅黑" charset="0"/>
+              </a:rPr>
+              <a:t>量</a:t>
+            </a:r>
+            <a:endParaRPr lang="zh-CN" altLang="en-US" sz="1400" b="1">
+              <a:latin typeface="微软雅黑" charset="0"/>
+              <a:ea typeface="微软雅黑" charset="0"/>
+            </a:endParaRPr>
+          </a:p>
+        </p:txBody>
+      </p:sp>
+      <p:sp>
+        <p:nvSpPr>
+          <p:cNvPr id="7" name="文本框 6"/>
+          <p:cNvSpPr txBox="1"/>
+          <p:nvPr>
+            <p:custDataLst>
+              <p:tags r:id="rId5"/>
+            </p:custDataLst>
+          </p:nvPr>
+        </p:nvSpPr>
+        <p:spPr>
+          <a:xfrm>
+            <a:off x="9681210" y="1892300"/>
+            <a:ext cx="1160145" cy="306705"/>
+          </a:xfrm>
+          <a:prstGeom prst="rect">
+            <a:avLst/>
+          </a:prstGeom>
+          <a:noFill/>
+        </p:spPr>
+        <p:txBody>
+          <a:bodyPr wrap="square" rtlCol="0">
+            <a:spAutoFit/>
+          </a:bodyPr>
+          <a:p>
+            <a:r>
+              <a:rPr lang="zh-CN" altLang="en-US" sz="1400" b="1">
+                <a:latin typeface="微软雅黑" charset="0"/>
+                <a:ea typeface="微软雅黑" charset="0"/>
+              </a:rPr>
+              <a:t>取加权</a:t>
+            </a:r>
+            <a:r>
+              <a:rPr lang="zh-CN" altLang="en-US" sz="1400" b="1">
+                <a:latin typeface="微软雅黑" charset="0"/>
+                <a:ea typeface="微软雅黑" charset="0"/>
+              </a:rPr>
+              <a:t>平均</a:t>
+            </a:r>
+            <a:endParaRPr lang="zh-CN" altLang="en-US" sz="1400" b="1">
+              <a:latin typeface="微软雅黑" charset="0"/>
+              <a:ea typeface="微软雅黑" charset="0"/>
+            </a:endParaRPr>
+          </a:p>
+        </p:txBody>
+      </p:sp>
+    </p:spTree>
+  </p:cSld>
+  <p:clrMapOvr>
+    <a:masterClrMapping/>
+  </p:clrMapOvr>
+</p:sld>
+</file>
+
 <file path=ppt/tags/tag1.xml><?xml version="1.0" encoding="utf-8"?>
 <p:tagLst xmlns:p="http://schemas.openxmlformats.org/presentationml/2006/main">
   <p:tag name="KSO_WM_BEAUTIFY_FLAG" val=""/>
@@ -6408,13 +7718,169 @@
 </p:tagLst>
 </file>
 
+<file path=ppt/tags/tag51.xml><?xml version="1.0" encoding="utf-8"?>
+<p:tagLst xmlns:p="http://schemas.openxmlformats.org/presentationml/2006/main">
+  <p:tag name="KSO_WM_BEAUTIFY_FLAG" val=""/>
+</p:tagLst>
+</file>
+
+<file path=ppt/tags/tag52.xml><?xml version="1.0" encoding="utf-8"?>
+<p:tagLst xmlns:p="http://schemas.openxmlformats.org/presentationml/2006/main">
+  <p:tag name="KSO_WM_BEAUTIFY_FLAG" val=""/>
+</p:tagLst>
+</file>
+
+<file path=ppt/tags/tag53.xml><?xml version="1.0" encoding="utf-8"?>
+<p:tagLst xmlns:p="http://schemas.openxmlformats.org/presentationml/2006/main">
+  <p:tag name="KSO_WM_BEAUTIFY_FLAG" val=""/>
+</p:tagLst>
+</file>
+
+<file path=ppt/tags/tag54.xml><?xml version="1.0" encoding="utf-8"?>
+<p:tagLst xmlns:p="http://schemas.openxmlformats.org/presentationml/2006/main">
+  <p:tag name="KSO_WM_BEAUTIFY_FLAG" val=""/>
+</p:tagLst>
+</file>
+
+<file path=ppt/tags/tag55.xml><?xml version="1.0" encoding="utf-8"?>
+<p:tagLst xmlns:p="http://schemas.openxmlformats.org/presentationml/2006/main">
+  <p:tag name="KSO_WM_BEAUTIFY_FLAG" val=""/>
+</p:tagLst>
+</file>
+
+<file path=ppt/tags/tag56.xml><?xml version="1.0" encoding="utf-8"?>
+<p:tagLst xmlns:p="http://schemas.openxmlformats.org/presentationml/2006/main">
+  <p:tag name="KSO_WM_BEAUTIFY_FLAG" val=""/>
+</p:tagLst>
+</file>
+
+<file path=ppt/tags/tag57.xml><?xml version="1.0" encoding="utf-8"?>
+<p:tagLst xmlns:p="http://schemas.openxmlformats.org/presentationml/2006/main">
+  <p:tag name="KSO_WM_BEAUTIFY_FLAG" val=""/>
+</p:tagLst>
+</file>
+
+<file path=ppt/tags/tag58.xml><?xml version="1.0" encoding="utf-8"?>
+<p:tagLst xmlns:p="http://schemas.openxmlformats.org/presentationml/2006/main">
+  <p:tag name="KSO_WM_BEAUTIFY_FLAG" val=""/>
+</p:tagLst>
+</file>
+
+<file path=ppt/tags/tag59.xml><?xml version="1.0" encoding="utf-8"?>
+<p:tagLst xmlns:p="http://schemas.openxmlformats.org/presentationml/2006/main">
+  <p:tag name="KSO_WM_BEAUTIFY_FLAG" val=""/>
+</p:tagLst>
+</file>
+
 <file path=ppt/tags/tag6.xml><?xml version="1.0" encoding="utf-8"?>
 <p:tagLst xmlns:p="http://schemas.openxmlformats.org/presentationml/2006/main">
   <p:tag name="KSO_WM_BEAUTIFY_FLAG" val=""/>
 </p:tagLst>
 </file>
 
+<file path=ppt/tags/tag60.xml><?xml version="1.0" encoding="utf-8"?>
+<p:tagLst xmlns:p="http://schemas.openxmlformats.org/presentationml/2006/main">
+  <p:tag name="KSO_WM_BEAUTIFY_FLAG" val=""/>
+</p:tagLst>
+</file>
+
+<file path=ppt/tags/tag61.xml><?xml version="1.0" encoding="utf-8"?>
+<p:tagLst xmlns:p="http://schemas.openxmlformats.org/presentationml/2006/main">
+  <p:tag name="KSO_WM_BEAUTIFY_FLAG" val=""/>
+</p:tagLst>
+</file>
+
+<file path=ppt/tags/tag62.xml><?xml version="1.0" encoding="utf-8"?>
+<p:tagLst xmlns:p="http://schemas.openxmlformats.org/presentationml/2006/main">
+  <p:tag name="KSO_WM_BEAUTIFY_FLAG" val=""/>
+</p:tagLst>
+</file>
+
+<file path=ppt/tags/tag63.xml><?xml version="1.0" encoding="utf-8"?>
+<p:tagLst xmlns:p="http://schemas.openxmlformats.org/presentationml/2006/main">
+  <p:tag name="KSO_WM_BEAUTIFY_FLAG" val=""/>
+</p:tagLst>
+</file>
+
+<file path=ppt/tags/tag64.xml><?xml version="1.0" encoding="utf-8"?>
+<p:tagLst xmlns:p="http://schemas.openxmlformats.org/presentationml/2006/main">
+  <p:tag name="KSO_WM_BEAUTIFY_FLAG" val=""/>
+</p:tagLst>
+</file>
+
+<file path=ppt/tags/tag65.xml><?xml version="1.0" encoding="utf-8"?>
+<p:tagLst xmlns:p="http://schemas.openxmlformats.org/presentationml/2006/main">
+  <p:tag name="KSO_WM_BEAUTIFY_FLAG" val=""/>
+</p:tagLst>
+</file>
+
+<file path=ppt/tags/tag66.xml><?xml version="1.0" encoding="utf-8"?>
+<p:tagLst xmlns:p="http://schemas.openxmlformats.org/presentationml/2006/main">
+  <p:tag name="KSO_WM_BEAUTIFY_FLAG" val=""/>
+</p:tagLst>
+</file>
+
+<file path=ppt/tags/tag67.xml><?xml version="1.0" encoding="utf-8"?>
+<p:tagLst xmlns:p="http://schemas.openxmlformats.org/presentationml/2006/main">
+  <p:tag name="KSO_WM_BEAUTIFY_FLAG" val=""/>
+</p:tagLst>
+</file>
+
+<file path=ppt/tags/tag68.xml><?xml version="1.0" encoding="utf-8"?>
+<p:tagLst xmlns:p="http://schemas.openxmlformats.org/presentationml/2006/main">
+  <p:tag name="KSO_WM_BEAUTIFY_FLAG" val=""/>
+</p:tagLst>
+</file>
+
+<file path=ppt/tags/tag69.xml><?xml version="1.0" encoding="utf-8"?>
+<p:tagLst xmlns:p="http://schemas.openxmlformats.org/presentationml/2006/main">
+  <p:tag name="KSO_WM_BEAUTIFY_FLAG" val=""/>
+</p:tagLst>
+</file>
+
 <file path=ppt/tags/tag7.xml><?xml version="1.0" encoding="utf-8"?>
+<p:tagLst xmlns:p="http://schemas.openxmlformats.org/presentationml/2006/main">
+  <p:tag name="KSO_WM_BEAUTIFY_FLAG" val=""/>
+</p:tagLst>
+</file>
+
+<file path=ppt/tags/tag70.xml><?xml version="1.0" encoding="utf-8"?>
+<p:tagLst xmlns:p="http://schemas.openxmlformats.org/presentationml/2006/main">
+  <p:tag name="KSO_WM_BEAUTIFY_FLAG" val=""/>
+</p:tagLst>
+</file>
+
+<file path=ppt/tags/tag71.xml><?xml version="1.0" encoding="utf-8"?>
+<p:tagLst xmlns:p="http://schemas.openxmlformats.org/presentationml/2006/main">
+  <p:tag name="KSO_WM_BEAUTIFY_FLAG" val=""/>
+</p:tagLst>
+</file>
+
+<file path=ppt/tags/tag72.xml><?xml version="1.0" encoding="utf-8"?>
+<p:tagLst xmlns:p="http://schemas.openxmlformats.org/presentationml/2006/main">
+  <p:tag name="KSO_WM_BEAUTIFY_FLAG" val=""/>
+</p:tagLst>
+</file>
+
+<file path=ppt/tags/tag73.xml><?xml version="1.0" encoding="utf-8"?>
+<p:tagLst xmlns:p="http://schemas.openxmlformats.org/presentationml/2006/main">
+  <p:tag name="KSO_WM_BEAUTIFY_FLAG" val=""/>
+</p:tagLst>
+</file>
+
+<file path=ppt/tags/tag74.xml><?xml version="1.0" encoding="utf-8"?>
+<p:tagLst xmlns:p="http://schemas.openxmlformats.org/presentationml/2006/main">
+  <p:tag name="KSO_WM_BEAUTIFY_FLAG" val=""/>
+</p:tagLst>
+</file>
+
+<file path=ppt/tags/tag75.xml><?xml version="1.0" encoding="utf-8"?>
+<p:tagLst xmlns:p="http://schemas.openxmlformats.org/presentationml/2006/main">
+  <p:tag name="KSO_WM_BEAUTIFY_FLAG" val=""/>
+</p:tagLst>
+</file>
+
+<file path=ppt/tags/tag76.xml><?xml version="1.0" encoding="utf-8"?>
 <p:tagLst xmlns:p="http://schemas.openxmlformats.org/presentationml/2006/main">
   <p:tag name="KSO_WM_BEAUTIFY_FLAG" val=""/>
 </p:tagLst>

</xml_diff>

<commit_message>
update_Reciprocal Attention Mixing Transformer for Lightweight Image Restoration**.
</commit_message>
<xml_diff>
--- a/论文插图.pptx
+++ b/论文插图.pptx
@@ -8,7 +8,7 @@
     <p:notesMasterId r:id="rId4"/>
   </p:notesMasterIdLst>
   <p:handoutMasterIdLst>
-    <p:handoutMasterId r:id="rId16"/>
+    <p:handoutMasterId r:id="rId18"/>
   </p:handoutMasterIdLst>
   <p:sldIdLst>
     <p:sldId id="256" r:id="rId3"/>
@@ -23,6 +23,8 @@
     <p:sldId id="267" r:id="rId13"/>
     <p:sldId id="268" r:id="rId14"/>
     <p:sldId id="269" r:id="rId15"/>
+    <p:sldId id="270" r:id="rId16"/>
+    <p:sldId id="271" r:id="rId17"/>
   </p:sldIdLst>
   <p:sldSz cx="12192000" cy="6858000"/>
   <p:notesSz cx="7103745" cy="10234295"/>
@@ -5497,6 +5499,138 @@
 </p:sld>
 </file>
 
+<file path=ppt/slides/slide13.xml><?xml version="1.0" encoding="utf-8"?>
+<p:sld xmlns:a="http://schemas.openxmlformats.org/drawingml/2006/main" xmlns:r="http://schemas.openxmlformats.org/officeDocument/2006/relationships" xmlns:p="http://schemas.openxmlformats.org/presentationml/2006/main">
+  <p:cSld>
+    <p:spTree>
+      <p:nvGrpSpPr>
+        <p:cNvPr id="1" name=""/>
+        <p:cNvGrpSpPr/>
+        <p:nvPr/>
+      </p:nvGrpSpPr>
+      <p:grpSpPr/>
+      <p:sp>
+        <p:nvSpPr>
+          <p:cNvPr id="2" name="标题 1"/>
+          <p:cNvSpPr>
+            <a:spLocks noGrp="1"/>
+          </p:cNvSpPr>
+          <p:nvPr>
+            <p:ph type="ctrTitle"/>
+          </p:nvPr>
+        </p:nvSpPr>
+        <p:spPr/>
+        <p:txBody>
+          <a:bodyPr/>
+          <a:p>
+            <a:r>
+              <a:rPr lang="en-US" altLang="zh-CN"/>
+              <a:t>RAMiT</a:t>
+            </a:r>
+            <a:endParaRPr lang="en-US" altLang="zh-CN"/>
+          </a:p>
+        </p:txBody>
+      </p:sp>
+      <p:sp>
+        <p:nvSpPr>
+          <p:cNvPr id="3" name="副标题 2"/>
+          <p:cNvSpPr>
+            <a:spLocks noGrp="1"/>
+          </p:cNvSpPr>
+          <p:nvPr>
+            <p:ph type="subTitle" idx="1"/>
+          </p:nvPr>
+        </p:nvSpPr>
+        <p:spPr/>
+        <p:txBody>
+          <a:bodyPr/>
+          <a:p>
+            <a:endParaRPr lang="zh-CN" altLang="en-US"/>
+          </a:p>
+        </p:txBody>
+      </p:sp>
+    </p:spTree>
+  </p:cSld>
+  <p:clrMapOvr>
+    <a:masterClrMapping/>
+  </p:clrMapOvr>
+</p:sld>
+</file>
+
+<file path=ppt/slides/slide14.xml><?xml version="1.0" encoding="utf-8"?>
+<p:sld xmlns:a="http://schemas.openxmlformats.org/drawingml/2006/main" xmlns:r="http://schemas.openxmlformats.org/officeDocument/2006/relationships" xmlns:p="http://schemas.openxmlformats.org/presentationml/2006/main">
+  <p:cSld>
+    <p:spTree>
+      <p:nvGrpSpPr>
+        <p:cNvPr id="1" name=""/>
+        <p:cNvGrpSpPr/>
+        <p:nvPr/>
+      </p:nvGrpSpPr>
+      <p:grpSpPr/>
+      <p:pic>
+        <p:nvPicPr>
+          <p:cNvPr id="4" name="图片 3"/>
+          <p:cNvPicPr>
+            <a:picLocks noChangeAspect="1"/>
+          </p:cNvPicPr>
+          <p:nvPr>
+            <p:custDataLst>
+              <p:tags r:id="rId1"/>
+            </p:custDataLst>
+          </p:nvPr>
+        </p:nvPicPr>
+        <p:blipFill>
+          <a:blip r:embed="rId2"/>
+          <a:stretch>
+            <a:fillRect/>
+          </a:stretch>
+        </p:blipFill>
+        <p:spPr>
+          <a:xfrm>
+            <a:off x="1395095" y="0"/>
+            <a:ext cx="9203055" cy="4187825"/>
+          </a:xfrm>
+          <a:prstGeom prst="rect">
+            <a:avLst/>
+          </a:prstGeom>
+        </p:spPr>
+      </p:pic>
+      <p:pic>
+        <p:nvPicPr>
+          <p:cNvPr id="5" name="图片 4"/>
+          <p:cNvPicPr>
+            <a:picLocks noChangeAspect="1"/>
+          </p:cNvPicPr>
+          <p:nvPr>
+            <p:custDataLst>
+              <p:tags r:id="rId3"/>
+            </p:custDataLst>
+          </p:nvPr>
+        </p:nvPicPr>
+        <p:blipFill>
+          <a:blip r:embed="rId4"/>
+          <a:stretch>
+            <a:fillRect/>
+          </a:stretch>
+        </p:blipFill>
+        <p:spPr>
+          <a:xfrm>
+            <a:off x="4671695" y="4229100"/>
+            <a:ext cx="5448300" cy="2628900"/>
+          </a:xfrm>
+          <a:prstGeom prst="rect">
+            <a:avLst/>
+          </a:prstGeom>
+        </p:spPr>
+      </p:pic>
+    </p:spTree>
+  </p:cSld>
+  <p:clrMapOvr>
+    <a:masterClrMapping/>
+  </p:clrMapOvr>
+</p:sld>
+</file>
+
 <file path=ppt/slides/slide2.xml><?xml version="1.0" encoding="utf-8"?>
 <p:sld xmlns:a="http://schemas.openxmlformats.org/drawingml/2006/main" xmlns:r="http://schemas.openxmlformats.org/officeDocument/2006/relationships" xmlns:p="http://schemas.openxmlformats.org/presentationml/2006/main">
   <p:cSld>
@@ -7881,6 +8015,18 @@
 </file>
 
 <file path=ppt/tags/tag76.xml><?xml version="1.0" encoding="utf-8"?>
+<p:tagLst xmlns:p="http://schemas.openxmlformats.org/presentationml/2006/main">
+  <p:tag name="KSO_WM_BEAUTIFY_FLAG" val=""/>
+</p:tagLst>
+</file>
+
+<file path=ppt/tags/tag77.xml><?xml version="1.0" encoding="utf-8"?>
+<p:tagLst xmlns:p="http://schemas.openxmlformats.org/presentationml/2006/main">
+  <p:tag name="KSO_WM_BEAUTIFY_FLAG" val=""/>
+</p:tagLst>
+</file>
+
+<file path=ppt/tags/tag78.xml><?xml version="1.0" encoding="utf-8"?>
 <p:tagLst xmlns:p="http://schemas.openxmlformats.org/presentationml/2006/main">
   <p:tag name="KSO_WM_BEAUTIFY_FLAG" val=""/>
 </p:tagLst>

</xml_diff>

<commit_message>
update_SRConvNet: A Transformer-Style ConvNet for Lightweight Image Super-Resolution
</commit_message>
<xml_diff>
--- a/论文插图.pptx
+++ b/论文插图.pptx
@@ -8,7 +8,7 @@
     <p:notesMasterId r:id="rId4"/>
   </p:notesMasterIdLst>
   <p:handoutMasterIdLst>
-    <p:handoutMasterId r:id="rId18"/>
+    <p:handoutMasterId r:id="rId24"/>
   </p:handoutMasterIdLst>
   <p:sldIdLst>
     <p:sldId id="256" r:id="rId3"/>
@@ -25,6 +25,12 @@
     <p:sldId id="269" r:id="rId15"/>
     <p:sldId id="270" r:id="rId16"/>
     <p:sldId id="271" r:id="rId17"/>
+    <p:sldId id="272" r:id="rId18"/>
+    <p:sldId id="273" r:id="rId19"/>
+    <p:sldId id="274" r:id="rId20"/>
+    <p:sldId id="275" r:id="rId21"/>
+    <p:sldId id="276" r:id="rId22"/>
+    <p:sldId id="277" r:id="rId23"/>
   </p:sldIdLst>
   <p:sldSz cx="12192000" cy="6858000"/>
   <p:notesSz cx="7103745" cy="10234295"/>
@@ -5587,8 +5593,8 @@
         </p:blipFill>
         <p:spPr>
           <a:xfrm>
-            <a:off x="1395095" y="0"/>
-            <a:ext cx="9203055" cy="4187825"/>
+            <a:off x="3924300" y="554990"/>
+            <a:ext cx="8074025" cy="3674110"/>
           </a:xfrm>
           <a:prstGeom prst="rect">
             <a:avLst/>
@@ -5615,441 +5621,64 @@
         </p:blipFill>
         <p:spPr>
           <a:xfrm>
-            <a:off x="4671695" y="4229100"/>
-            <a:ext cx="5448300" cy="2628900"/>
+            <a:off x="0" y="3970020"/>
+            <a:ext cx="5985510" cy="2887980"/>
           </a:xfrm>
           <a:prstGeom prst="rect">
             <a:avLst/>
           </a:prstGeom>
         </p:spPr>
       </p:pic>
-    </p:spTree>
-  </p:cSld>
-  <p:clrMapOvr>
-    <a:masterClrMapping/>
-  </p:clrMapOvr>
-</p:sld>
-</file>
-
-<file path=ppt/slides/slide2.xml><?xml version="1.0" encoding="utf-8"?>
-<p:sld xmlns:a="http://schemas.openxmlformats.org/drawingml/2006/main" xmlns:r="http://schemas.openxmlformats.org/officeDocument/2006/relationships" xmlns:p="http://schemas.openxmlformats.org/presentationml/2006/main">
-  <p:cSld>
-    <p:spTree>
-      <p:nvGrpSpPr>
-        <p:cNvPr id="1" name=""/>
-        <p:cNvGrpSpPr/>
-        <p:nvPr/>
-      </p:nvGrpSpPr>
-      <p:grpSpPr/>
-      <p:sp>
-        <p:nvSpPr>
-          <p:cNvPr id="2" name="标题 1"/>
-          <p:cNvSpPr>
-            <a:spLocks noGrp="1"/>
-          </p:cNvSpPr>
-          <p:nvPr>
-            <p:ph type="ctrTitle"/>
-          </p:nvPr>
-        </p:nvSpPr>
-        <p:spPr/>
-        <p:txBody>
-          <a:bodyPr/>
-          <a:p>
-            <a:r>
-              <a:rPr lang="en-US" altLang="zh-CN"/>
-              <a:t>FD-Conv</a:t>
-            </a:r>
-            <a:endParaRPr lang="en-US" altLang="zh-CN"/>
-          </a:p>
-        </p:txBody>
-      </p:sp>
-      <p:sp>
-        <p:nvSpPr>
-          <p:cNvPr id="3" name="副标题 2"/>
-          <p:cNvSpPr>
-            <a:spLocks noGrp="1"/>
-          </p:cNvSpPr>
-          <p:nvPr>
-            <p:ph type="subTitle" idx="1"/>
-          </p:nvPr>
-        </p:nvSpPr>
-        <p:spPr/>
-        <p:txBody>
-          <a:bodyPr/>
-          <a:p>
-            <a:endParaRPr lang="zh-CN" altLang="en-US"/>
-          </a:p>
-        </p:txBody>
-      </p:sp>
-    </p:spTree>
-  </p:cSld>
-  <p:clrMapOvr>
-    <a:masterClrMapping/>
-  </p:clrMapOvr>
-</p:sld>
-</file>
-
-<file path=ppt/slides/slide3.xml><?xml version="1.0" encoding="utf-8"?>
-<p:sld xmlns:a="http://schemas.openxmlformats.org/drawingml/2006/main" xmlns:r="http://schemas.openxmlformats.org/officeDocument/2006/relationships" xmlns:p="http://schemas.openxmlformats.org/presentationml/2006/main">
-  <p:cSld>
-    <p:spTree>
-      <p:nvGrpSpPr>
-        <p:cNvPr id="1" name=""/>
-        <p:cNvGrpSpPr/>
-        <p:nvPr/>
-      </p:nvGrpSpPr>
-      <p:grpSpPr/>
       <p:pic>
         <p:nvPicPr>
-          <p:cNvPr id="4" name="图片 3"/>
+          <p:cNvPr id="6" name="图片 5"/>
           <p:cNvPicPr>
             <a:picLocks noChangeAspect="1"/>
           </p:cNvPicPr>
           <p:nvPr>
             <p:custDataLst>
-              <p:tags r:id="rId1"/>
+              <p:tags r:id="rId5"/>
             </p:custDataLst>
           </p:nvPr>
         </p:nvPicPr>
         <p:blipFill>
-          <a:blip r:embed="rId2"/>
+          <a:blip r:embed="rId6"/>
           <a:stretch>
             <a:fillRect/>
           </a:stretch>
         </p:blipFill>
         <p:spPr>
           <a:xfrm>
-            <a:off x="457200" y="1479550"/>
-            <a:ext cx="11277600" cy="3898900"/>
+            <a:off x="6012815" y="5198110"/>
+            <a:ext cx="5985510" cy="932180"/>
           </a:xfrm>
           <a:prstGeom prst="rect">
             <a:avLst/>
           </a:prstGeom>
         </p:spPr>
       </p:pic>
-      <p:sp>
-        <p:nvSpPr>
-          <p:cNvPr id="5" name="文本框 4"/>
-          <p:cNvSpPr txBox="1"/>
-          <p:nvPr/>
-        </p:nvSpPr>
-        <p:spPr>
-          <a:xfrm>
-            <a:off x="187325" y="1167765"/>
-            <a:ext cx="4954270" cy="306705"/>
-          </a:xfrm>
-          <a:prstGeom prst="rect">
-            <a:avLst/>
-          </a:prstGeom>
-          <a:noFill/>
-        </p:spPr>
-        <p:txBody>
-          <a:bodyPr wrap="square" rtlCol="0">
-            <a:spAutoFit/>
-          </a:bodyPr>
-          <a:p>
-            <a:r>
-              <a:rPr lang="zh-CN" altLang="en-US" sz="1400" b="1">
-                <a:latin typeface="微软雅黑" charset="0"/>
-                <a:ea typeface="微软雅黑" charset="0"/>
-              </a:rPr>
-              <a:t>可视化一步卷积操作在频域中所有可学习的参数</a:t>
-            </a:r>
-            <a:endParaRPr lang="zh-CN" altLang="en-US" sz="1400" b="1">
-              <a:latin typeface="微软雅黑" charset="0"/>
-              <a:ea typeface="微软雅黑" charset="0"/>
-            </a:endParaRPr>
-          </a:p>
-        </p:txBody>
-      </p:sp>
-      <p:sp>
-        <p:nvSpPr>
-          <p:cNvPr id="6" name="文本框 5"/>
-          <p:cNvSpPr txBox="1"/>
-          <p:nvPr>
-            <p:custDataLst>
-              <p:tags r:id="rId3"/>
-            </p:custDataLst>
-          </p:nvPr>
-        </p:nvSpPr>
-        <p:spPr>
-          <a:xfrm>
-            <a:off x="3195320" y="5378450"/>
-            <a:ext cx="3502025" cy="737235"/>
-          </a:xfrm>
-          <a:prstGeom prst="rect">
-            <a:avLst/>
-          </a:prstGeom>
-          <a:noFill/>
-        </p:spPr>
-        <p:txBody>
-          <a:bodyPr wrap="square" rtlCol="0">
-            <a:spAutoFit/>
-          </a:bodyPr>
-          <a:p>
-            <a:r>
-              <a:rPr lang="zh-CN" altLang="en-US" sz="1400" b="1">
-                <a:latin typeface="微软雅黑" charset="0"/>
-                <a:ea typeface="微软雅黑" charset="0"/>
-              </a:rPr>
-              <a:t>假设本卷积核只关注低频信息</a:t>
-            </a:r>
-            <a:r>
-              <a:rPr lang="en-US" altLang="zh-CN" sz="1400" b="1">
-                <a:latin typeface="微软雅黑" charset="0"/>
-                <a:ea typeface="微软雅黑" charset="0"/>
-              </a:rPr>
-              <a:t>(</a:t>
-            </a:r>
-            <a:r>
-              <a:rPr lang="zh-CN" altLang="en-US" sz="1400" b="1">
-                <a:latin typeface="微软雅黑" charset="0"/>
-                <a:ea typeface="微软雅黑" charset="0"/>
-              </a:rPr>
-              <a:t>蓝色部分</a:t>
-            </a:r>
-            <a:r>
-              <a:rPr lang="en-US" altLang="zh-CN" sz="1400" b="1">
-                <a:latin typeface="微软雅黑" charset="0"/>
-                <a:ea typeface="微软雅黑" charset="0"/>
-              </a:rPr>
-              <a:t>)</a:t>
-            </a:r>
-            <a:br>
-              <a:rPr lang="en-US" altLang="zh-CN" sz="1400" b="1">
-                <a:latin typeface="微软雅黑" charset="0"/>
-                <a:ea typeface="微软雅黑" charset="0"/>
-              </a:rPr>
-            </a:br>
-            <a:r>
-              <a:rPr lang="zh-CN" altLang="en-US" sz="1400" b="1">
-                <a:latin typeface="微软雅黑" charset="0"/>
-                <a:ea typeface="微软雅黑" charset="0"/>
-              </a:rPr>
-              <a:t>那么将高频信息</a:t>
-            </a:r>
-            <a:r>
-              <a:rPr lang="en-US" altLang="zh-CN" sz="1400" b="1">
-                <a:latin typeface="微软雅黑" charset="0"/>
-                <a:ea typeface="微软雅黑" charset="0"/>
-              </a:rPr>
-              <a:t>(</a:t>
-            </a:r>
-            <a:r>
-              <a:rPr lang="zh-CN" altLang="en-US" sz="1400" b="1">
-                <a:latin typeface="微软雅黑" charset="0"/>
-                <a:ea typeface="微软雅黑" charset="0"/>
-              </a:rPr>
-              <a:t>黄色</a:t>
-            </a:r>
-            <a:r>
-              <a:rPr lang="en-US" altLang="zh-CN" sz="1400" b="1">
-                <a:latin typeface="微软雅黑" charset="0"/>
-                <a:ea typeface="微软雅黑" charset="0"/>
-              </a:rPr>
-              <a:t>)</a:t>
-            </a:r>
-            <a:r>
-              <a:rPr lang="zh-CN" altLang="en-US" sz="1400" b="1">
-                <a:latin typeface="微软雅黑" charset="0"/>
-                <a:ea typeface="微软雅黑" charset="0"/>
-              </a:rPr>
-              <a:t>置为</a:t>
-            </a:r>
-            <a:r>
-              <a:rPr lang="en-US" altLang="zh-CN" sz="1400" b="1">
-                <a:latin typeface="微软雅黑" charset="0"/>
-                <a:ea typeface="微软雅黑" charset="0"/>
-              </a:rPr>
-              <a:t>0(</a:t>
-            </a:r>
-            <a:r>
-              <a:rPr lang="zh-CN" altLang="en-US" sz="1400" b="1">
-                <a:latin typeface="微软雅黑" charset="0"/>
-                <a:ea typeface="微软雅黑" charset="0"/>
-              </a:rPr>
-              <a:t>白色</a:t>
-            </a:r>
-            <a:r>
-              <a:rPr lang="en-US" altLang="zh-CN" sz="1400" b="1">
-                <a:latin typeface="微软雅黑" charset="0"/>
-                <a:ea typeface="微软雅黑" charset="0"/>
-              </a:rPr>
-              <a:t>)</a:t>
-            </a:r>
-            <a:br>
-              <a:rPr lang="en-US" altLang="zh-CN" sz="1400" b="1">
-                <a:latin typeface="微软雅黑" charset="0"/>
-                <a:ea typeface="微软雅黑" charset="0"/>
-              </a:rPr>
-            </a:br>
-            <a:r>
-              <a:rPr lang="zh-CN" altLang="en-US" sz="1400" b="1">
-                <a:latin typeface="微软雅黑" charset="0"/>
-                <a:ea typeface="微软雅黑" charset="0"/>
-              </a:rPr>
-              <a:t>低频信息</a:t>
-            </a:r>
-            <a:r>
-              <a:rPr lang="zh-CN" altLang="en-US" sz="1400" b="1">
-                <a:latin typeface="微软雅黑" charset="0"/>
-                <a:ea typeface="微软雅黑" charset="0"/>
-              </a:rPr>
-              <a:t>不变</a:t>
-            </a:r>
-            <a:endParaRPr lang="zh-CN" altLang="en-US" sz="1400" b="1">
-              <a:latin typeface="微软雅黑" charset="0"/>
-              <a:ea typeface="微软雅黑" charset="0"/>
-            </a:endParaRPr>
-          </a:p>
-        </p:txBody>
-      </p:sp>
-      <p:sp>
-        <p:nvSpPr>
-          <p:cNvPr id="7" name="文本框 6"/>
-          <p:cNvSpPr txBox="1"/>
-          <p:nvPr>
-            <p:custDataLst>
-              <p:tags r:id="rId4"/>
-            </p:custDataLst>
-          </p:nvPr>
-        </p:nvSpPr>
-        <p:spPr>
-          <a:xfrm>
-            <a:off x="6285230" y="861060"/>
-            <a:ext cx="2705735" cy="306705"/>
-          </a:xfrm>
-          <a:prstGeom prst="rect">
-            <a:avLst/>
-          </a:prstGeom>
-          <a:noFill/>
-        </p:spPr>
-        <p:txBody>
-          <a:bodyPr wrap="square" rtlCol="0">
-            <a:spAutoFit/>
-          </a:bodyPr>
-          <a:p>
-            <a:r>
-              <a:rPr lang="zh-CN" altLang="en-US" sz="1400" b="1">
-                <a:latin typeface="微软雅黑" charset="0"/>
-                <a:ea typeface="微软雅黑" charset="0"/>
-              </a:rPr>
-              <a:t>通过</a:t>
-            </a:r>
-            <a:r>
-              <a:rPr lang="en-US" altLang="zh-CN" sz="1400" b="1">
-                <a:latin typeface="微软雅黑" charset="0"/>
-                <a:ea typeface="微软雅黑" charset="0"/>
-              </a:rPr>
-              <a:t>iDFT</a:t>
-            </a:r>
-            <a:r>
-              <a:rPr lang="zh-CN" altLang="en-US" sz="1400" b="1">
-                <a:latin typeface="微软雅黑" charset="0"/>
-                <a:ea typeface="微软雅黑" charset="0"/>
-              </a:rPr>
-              <a:t>将频域映射回</a:t>
-            </a:r>
-            <a:r>
-              <a:rPr lang="zh-CN" altLang="en-US" sz="1400" b="1">
-                <a:latin typeface="微软雅黑" charset="0"/>
-                <a:ea typeface="微软雅黑" charset="0"/>
-              </a:rPr>
-              <a:t>空间域</a:t>
-            </a:r>
-            <a:endParaRPr lang="zh-CN" altLang="en-US" sz="1400" b="1">
-              <a:latin typeface="微软雅黑" charset="0"/>
-              <a:ea typeface="微软雅黑" charset="0"/>
-            </a:endParaRPr>
-          </a:p>
-        </p:txBody>
-      </p:sp>
-      <p:sp>
-        <p:nvSpPr>
-          <p:cNvPr id="8" name="文本框 7"/>
-          <p:cNvSpPr txBox="1"/>
-          <p:nvPr>
-            <p:custDataLst>
-              <p:tags r:id="rId5"/>
-            </p:custDataLst>
-          </p:nvPr>
-        </p:nvSpPr>
-        <p:spPr>
-          <a:xfrm>
-            <a:off x="9117965" y="5071745"/>
-            <a:ext cx="2705735" cy="306705"/>
-          </a:xfrm>
-          <a:prstGeom prst="rect">
-            <a:avLst/>
-          </a:prstGeom>
-          <a:noFill/>
-        </p:spPr>
-        <p:txBody>
-          <a:bodyPr wrap="square" rtlCol="0">
-            <a:spAutoFit/>
-          </a:bodyPr>
-          <a:p>
-            <a:r>
-              <a:rPr lang="zh-CN" altLang="en-US" sz="1400" b="1">
-                <a:latin typeface="微软雅黑" charset="0"/>
-                <a:ea typeface="微软雅黑" charset="0"/>
-              </a:rPr>
-              <a:t>重新拆分拼接位</a:t>
-            </a:r>
-            <a:r>
-              <a:rPr lang="zh-CN" altLang="en-US" sz="1400" b="1">
-                <a:latin typeface="微软雅黑" charset="0"/>
-                <a:ea typeface="微软雅黑" charset="0"/>
-              </a:rPr>
-              <a:t>卷积核</a:t>
-            </a:r>
-            <a:endParaRPr lang="zh-CN" altLang="en-US" sz="1400" b="1">
-              <a:latin typeface="微软雅黑" charset="0"/>
-              <a:ea typeface="微软雅黑" charset="0"/>
-            </a:endParaRPr>
-          </a:p>
-        </p:txBody>
-      </p:sp>
-    </p:spTree>
-  </p:cSld>
-  <p:clrMapOvr>
-    <a:masterClrMapping/>
-  </p:clrMapOvr>
-</p:sld>
-</file>
-
-<file path=ppt/slides/slide4.xml><?xml version="1.0" encoding="utf-8"?>
-<p:sld xmlns:a="http://schemas.openxmlformats.org/drawingml/2006/main" xmlns:r="http://schemas.openxmlformats.org/officeDocument/2006/relationships" xmlns:p="http://schemas.openxmlformats.org/presentationml/2006/main">
-  <p:cSld>
-    <p:spTree>
-      <p:nvGrpSpPr>
-        <p:cNvPr id="1" name=""/>
-        <p:cNvGrpSpPr/>
-        <p:nvPr/>
-      </p:nvGrpSpPr>
-      <p:grpSpPr/>
       <p:pic>
         <p:nvPicPr>
-          <p:cNvPr id="4" name="图片 3"/>
+          <p:cNvPr id="7" name="图片 6"/>
           <p:cNvPicPr>
             <a:picLocks noChangeAspect="1"/>
           </p:cNvPicPr>
           <p:nvPr>
             <p:custDataLst>
-              <p:tags r:id="rId1"/>
+              <p:tags r:id="rId7"/>
             </p:custDataLst>
           </p:nvPr>
         </p:nvPicPr>
         <p:blipFill>
-          <a:blip r:embed="rId2"/>
+          <a:blip r:embed="rId8"/>
           <a:stretch>
             <a:fillRect/>
           </a:stretch>
         </p:blipFill>
         <p:spPr>
           <a:xfrm>
-            <a:off x="1435100" y="1416050"/>
-            <a:ext cx="9321800" cy="4025900"/>
+            <a:off x="0" y="800735"/>
+            <a:ext cx="3835400" cy="2806700"/>
           </a:xfrm>
           <a:prstGeom prst="rect">
             <a:avLst/>
@@ -6058,379 +5687,18 @@
       </p:pic>
       <p:sp>
         <p:nvSpPr>
-          <p:cNvPr id="5" name="文本框 4"/>
-          <p:cNvSpPr txBox="1"/>
-          <p:nvPr>
-            <p:custDataLst>
-              <p:tags r:id="rId3"/>
-            </p:custDataLst>
-          </p:nvPr>
-        </p:nvSpPr>
-        <p:spPr>
-          <a:xfrm>
-            <a:off x="3712845" y="1184275"/>
-            <a:ext cx="4954270" cy="398780"/>
-          </a:xfrm>
-          <a:prstGeom prst="rect">
-            <a:avLst/>
-          </a:prstGeom>
-          <a:noFill/>
-        </p:spPr>
-        <p:txBody>
-          <a:bodyPr wrap="square" rtlCol="0">
-            <a:spAutoFit/>
-          </a:bodyPr>
-          <a:p>
-            <a:r>
-              <a:rPr lang="zh-CN" altLang="en-US" sz="2000" b="1">
-                <a:latin typeface="微软雅黑" charset="0"/>
-                <a:ea typeface="微软雅黑" charset="0"/>
-              </a:rPr>
-              <a:t>用于为动态卷积根据输入特征分配权重</a:t>
-            </a:r>
-            <a:endParaRPr lang="zh-CN" altLang="en-US" sz="2000" b="1">
-              <a:latin typeface="微软雅黑" charset="0"/>
-              <a:ea typeface="微软雅黑" charset="0"/>
-            </a:endParaRPr>
-          </a:p>
-        </p:txBody>
-      </p:sp>
-      <p:sp>
-        <p:nvSpPr>
-          <p:cNvPr id="6" name="文本框 5"/>
-          <p:cNvSpPr txBox="1"/>
-          <p:nvPr>
-            <p:custDataLst>
-              <p:tags r:id="rId4"/>
-            </p:custDataLst>
-          </p:nvPr>
-        </p:nvSpPr>
-        <p:spPr>
-          <a:xfrm>
-            <a:off x="3628390" y="1622425"/>
-            <a:ext cx="4954270" cy="306705"/>
-          </a:xfrm>
-          <a:prstGeom prst="rect">
-            <a:avLst/>
-          </a:prstGeom>
-          <a:noFill/>
-        </p:spPr>
-        <p:txBody>
-          <a:bodyPr wrap="square" rtlCol="0">
-            <a:spAutoFit/>
-          </a:bodyPr>
-          <a:p>
-            <a:r>
-              <a:rPr lang="zh-CN" altLang="en-US" sz="1400" b="1">
-                <a:latin typeface="微软雅黑" charset="0"/>
-                <a:ea typeface="微软雅黑" charset="0"/>
-              </a:rPr>
-              <a:t>上面的部分关注全局信息，判断当前卷积核的重要</a:t>
-            </a:r>
-            <a:r>
-              <a:rPr lang="zh-CN" altLang="en-US" sz="1400" b="1">
-                <a:latin typeface="微软雅黑" charset="0"/>
-                <a:ea typeface="微软雅黑" charset="0"/>
-              </a:rPr>
-              <a:t>程度</a:t>
-            </a:r>
-            <a:endParaRPr lang="zh-CN" altLang="en-US" sz="1400" b="1">
-              <a:latin typeface="微软雅黑" charset="0"/>
-              <a:ea typeface="微软雅黑" charset="0"/>
-            </a:endParaRPr>
-          </a:p>
-        </p:txBody>
-      </p:sp>
-      <p:sp>
-        <p:nvSpPr>
-          <p:cNvPr id="7" name="文本框 6"/>
-          <p:cNvSpPr txBox="1"/>
-          <p:nvPr>
-            <p:custDataLst>
-              <p:tags r:id="rId5"/>
-            </p:custDataLst>
-          </p:nvPr>
-        </p:nvSpPr>
-        <p:spPr>
-          <a:xfrm>
-            <a:off x="3220720" y="5135245"/>
-            <a:ext cx="5750560" cy="306705"/>
-          </a:xfrm>
-          <a:prstGeom prst="rect">
-            <a:avLst/>
-          </a:prstGeom>
-          <a:noFill/>
-        </p:spPr>
-        <p:txBody>
-          <a:bodyPr wrap="square" rtlCol="0">
-            <a:spAutoFit/>
-          </a:bodyPr>
-          <a:p>
-            <a:r>
-              <a:rPr lang="zh-CN" altLang="en-US" sz="1400" b="1">
-                <a:latin typeface="微软雅黑" charset="0"/>
-                <a:ea typeface="微软雅黑" charset="0"/>
-              </a:rPr>
-              <a:t>上面的部分关注局部信息，判断当前卷积核的某个元素</a:t>
-            </a:r>
-            <a:r>
-              <a:rPr lang="zh-CN" altLang="en-US" sz="1400" b="1">
-                <a:latin typeface="微软雅黑" charset="0"/>
-                <a:ea typeface="微软雅黑" charset="0"/>
-              </a:rPr>
-              <a:t>的重要</a:t>
-            </a:r>
-            <a:r>
-              <a:rPr lang="zh-CN" altLang="en-US" sz="1400" b="1">
-                <a:latin typeface="微软雅黑" charset="0"/>
-                <a:ea typeface="微软雅黑" charset="0"/>
-              </a:rPr>
-              <a:t>程度</a:t>
-            </a:r>
-            <a:endParaRPr lang="zh-CN" altLang="en-US" sz="1400" b="1">
-              <a:latin typeface="微软雅黑" charset="0"/>
-              <a:ea typeface="微软雅黑" charset="0"/>
-            </a:endParaRPr>
-          </a:p>
-        </p:txBody>
-      </p:sp>
-    </p:spTree>
-  </p:cSld>
-  <p:clrMapOvr>
-    <a:masterClrMapping/>
-  </p:clrMapOvr>
-</p:sld>
-</file>
-
-<file path=ppt/slides/slide5.xml><?xml version="1.0" encoding="utf-8"?>
-<p:sld xmlns:a="http://schemas.openxmlformats.org/drawingml/2006/main" xmlns:r="http://schemas.openxmlformats.org/officeDocument/2006/relationships" xmlns:p="http://schemas.openxmlformats.org/presentationml/2006/main">
-  <p:cSld>
-    <p:spTree>
-      <p:nvGrpSpPr>
-        <p:cNvPr id="1" name=""/>
-        <p:cNvGrpSpPr/>
-        <p:nvPr/>
-      </p:nvGrpSpPr>
-      <p:grpSpPr/>
-      <p:pic>
-        <p:nvPicPr>
-          <p:cNvPr id="4" name="图片 3"/>
-          <p:cNvPicPr>
-            <a:picLocks noChangeAspect="1"/>
-          </p:cNvPicPr>
-          <p:nvPr>
-            <p:custDataLst>
-              <p:tags r:id="rId1"/>
-            </p:custDataLst>
-          </p:nvPr>
-        </p:nvPicPr>
-        <p:blipFill>
-          <a:blip r:embed="rId2"/>
-          <a:stretch>
-            <a:fillRect/>
-          </a:stretch>
-        </p:blipFill>
-        <p:spPr>
-          <a:xfrm>
-            <a:off x="2241550" y="1563370"/>
-            <a:ext cx="7005955" cy="4337050"/>
-          </a:xfrm>
-          <a:prstGeom prst="rect">
-            <a:avLst/>
-          </a:prstGeom>
-        </p:spPr>
-      </p:pic>
-      <p:sp>
-        <p:nvSpPr>
-          <p:cNvPr id="5" name="文本框 4"/>
-          <p:cNvSpPr txBox="1"/>
-          <p:nvPr>
-            <p:custDataLst>
-              <p:tags r:id="rId3"/>
-            </p:custDataLst>
-          </p:nvPr>
-        </p:nvSpPr>
-        <p:spPr>
-          <a:xfrm>
-            <a:off x="918845" y="2092960"/>
-            <a:ext cx="3771900" cy="306705"/>
-          </a:xfrm>
-          <a:prstGeom prst="rect">
-            <a:avLst/>
-          </a:prstGeom>
-          <a:noFill/>
-        </p:spPr>
-        <p:txBody>
-          <a:bodyPr wrap="square" rtlCol="0">
-            <a:spAutoFit/>
-          </a:bodyPr>
-          <a:p>
-            <a:r>
-              <a:rPr lang="zh-CN" altLang="en-US" sz="1400" b="1">
-                <a:latin typeface="微软雅黑" charset="0"/>
-                <a:ea typeface="微软雅黑" charset="0"/>
-              </a:rPr>
-              <a:t>将按照权重调整后的卷积核映射到频域</a:t>
-            </a:r>
-            <a:endParaRPr lang="zh-CN" altLang="en-US" sz="1400" b="1">
-              <a:latin typeface="微软雅黑" charset="0"/>
-              <a:ea typeface="微软雅黑" charset="0"/>
-            </a:endParaRPr>
-          </a:p>
-        </p:txBody>
-      </p:sp>
-      <p:sp>
-        <p:nvSpPr>
-          <p:cNvPr id="6" name="文本框 5"/>
-          <p:cNvSpPr txBox="1"/>
-          <p:nvPr>
-            <p:custDataLst>
-              <p:tags r:id="rId4"/>
-            </p:custDataLst>
-          </p:nvPr>
-        </p:nvSpPr>
-        <p:spPr>
-          <a:xfrm>
-            <a:off x="3014345" y="5900420"/>
-            <a:ext cx="3771900" cy="306705"/>
-          </a:xfrm>
-          <a:prstGeom prst="rect">
-            <a:avLst/>
-          </a:prstGeom>
-          <a:noFill/>
-        </p:spPr>
-        <p:txBody>
-          <a:bodyPr wrap="square" rtlCol="0">
-            <a:spAutoFit/>
-          </a:bodyPr>
-          <a:p>
-            <a:r>
-              <a:rPr lang="zh-CN" altLang="en-US" sz="1400" b="1">
-                <a:latin typeface="微软雅黑" charset="0"/>
-                <a:ea typeface="微软雅黑" charset="0"/>
-              </a:rPr>
-              <a:t>将</a:t>
-            </a:r>
-            <a:r>
-              <a:rPr lang="zh-CN" altLang="en-US" sz="1400" b="1">
-                <a:latin typeface="微软雅黑" charset="0"/>
-                <a:ea typeface="微软雅黑" charset="0"/>
-              </a:rPr>
-              <a:t>特征映射到频域</a:t>
-            </a:r>
-            <a:endParaRPr lang="zh-CN" altLang="en-US" sz="1400" b="1">
-              <a:latin typeface="微软雅黑" charset="0"/>
-              <a:ea typeface="微软雅黑" charset="0"/>
-            </a:endParaRPr>
-          </a:p>
-        </p:txBody>
-      </p:sp>
-      <p:sp>
-        <p:nvSpPr>
-          <p:cNvPr id="7" name="文本框 6"/>
-          <p:cNvSpPr txBox="1"/>
-          <p:nvPr>
-            <p:custDataLst>
-              <p:tags r:id="rId5"/>
-            </p:custDataLst>
-          </p:nvPr>
-        </p:nvSpPr>
-        <p:spPr>
-          <a:xfrm>
-            <a:off x="4371975" y="1372235"/>
-            <a:ext cx="2167890" cy="306705"/>
-          </a:xfrm>
-          <a:prstGeom prst="rect">
-            <a:avLst/>
-          </a:prstGeom>
-          <a:noFill/>
-        </p:spPr>
-        <p:txBody>
-          <a:bodyPr wrap="square" rtlCol="0">
-            <a:spAutoFit/>
-          </a:bodyPr>
-          <a:p>
-            <a:r>
-              <a:rPr lang="zh-CN" altLang="en-US" sz="1400" b="1">
-                <a:latin typeface="微软雅黑" charset="0"/>
-                <a:ea typeface="微软雅黑" charset="0"/>
-              </a:rPr>
-              <a:t>将按照不同频段进行</a:t>
-            </a:r>
-            <a:r>
-              <a:rPr lang="zh-CN" altLang="en-US" sz="1400" b="1">
-                <a:latin typeface="微软雅黑" charset="0"/>
-                <a:ea typeface="微软雅黑" charset="0"/>
-              </a:rPr>
-              <a:t>拆分</a:t>
-            </a:r>
-            <a:endParaRPr lang="zh-CN" altLang="en-US" sz="1400" b="1">
-              <a:latin typeface="微软雅黑" charset="0"/>
-              <a:ea typeface="微软雅黑" charset="0"/>
-            </a:endParaRPr>
-          </a:p>
-        </p:txBody>
-      </p:sp>
-      <p:sp>
-        <p:nvSpPr>
-          <p:cNvPr id="8" name="文本框 7"/>
-          <p:cNvSpPr txBox="1"/>
-          <p:nvPr>
-            <p:custDataLst>
-              <p:tags r:id="rId6"/>
-            </p:custDataLst>
-          </p:nvPr>
-        </p:nvSpPr>
-        <p:spPr>
-          <a:xfrm>
-            <a:off x="5633085" y="2276475"/>
-            <a:ext cx="2167890" cy="306705"/>
-          </a:xfrm>
-          <a:prstGeom prst="rect">
-            <a:avLst/>
-          </a:prstGeom>
-          <a:noFill/>
-        </p:spPr>
-        <p:txBody>
-          <a:bodyPr wrap="square" rtlCol="0">
-            <a:spAutoFit/>
-          </a:bodyPr>
-          <a:p>
-            <a:r>
-              <a:rPr lang="zh-CN" altLang="en-US" sz="1400" b="1">
-                <a:latin typeface="微软雅黑" charset="0"/>
-                <a:ea typeface="微软雅黑" charset="0"/>
-              </a:rPr>
-              <a:t>映射回空间</a:t>
-            </a:r>
-            <a:r>
-              <a:rPr lang="zh-CN" altLang="en-US" sz="1400" b="1">
-                <a:latin typeface="微软雅黑" charset="0"/>
-                <a:ea typeface="微软雅黑" charset="0"/>
-              </a:rPr>
-              <a:t>域</a:t>
-            </a:r>
-            <a:endParaRPr lang="zh-CN" altLang="en-US" sz="1400" b="1">
-              <a:latin typeface="微软雅黑" charset="0"/>
-              <a:ea typeface="微软雅黑" charset="0"/>
-            </a:endParaRPr>
-          </a:p>
-        </p:txBody>
-      </p:sp>
-      <p:sp>
-        <p:nvSpPr>
-          <p:cNvPr id="10" name="矩形: 圆角 36"/>
+          <p:cNvPr id="9" name="矩形: 圆角 36"/>
           <p:cNvSpPr/>
           <p:nvPr>
             <p:custDataLst>
-              <p:tags r:id="rId7"/>
+              <p:tags r:id="rId9"/>
             </p:custDataLst>
           </p:nvPr>
         </p:nvSpPr>
         <p:spPr>
           <a:xfrm rot="10800000" flipV="1">
-            <a:off x="3131820" y="2399665"/>
-            <a:ext cx="663575" cy="888365"/>
+            <a:off x="10601960" y="3429000"/>
+            <a:ext cx="1317625" cy="541655"/>
           </a:xfrm>
           <a:prstGeom prst="roundRect">
             <a:avLst>
@@ -6465,28 +5733,24 @@
           <a:bodyPr rtlCol="0" anchor="ctr"/>
           <a:p>
             <a:pPr algn="ctr"/>
-            <a:endParaRPr lang="zh-CN" altLang="en-US">
-              <a:solidFill>
-                <a:srgbClr val="C00000"/>
-              </a:solidFill>
-            </a:endParaRPr>
-          </a:p>
-        </p:txBody>
-      </p:sp>
-      <p:sp>
-        <p:nvSpPr>
-          <p:cNvPr id="9" name="矩形: 圆角 36"/>
+            <a:endParaRPr lang="zh-CN" altLang="en-US"/>
+          </a:p>
+        </p:txBody>
+      </p:sp>
+      <p:sp>
+        <p:nvSpPr>
+          <p:cNvPr id="8" name="矩形: 圆角 36"/>
           <p:cNvSpPr/>
           <p:nvPr>
             <p:custDataLst>
-              <p:tags r:id="rId8"/>
+              <p:tags r:id="rId10"/>
             </p:custDataLst>
           </p:nvPr>
         </p:nvSpPr>
         <p:spPr>
           <a:xfrm rot="10800000" flipV="1">
-            <a:off x="4027170" y="5126355"/>
-            <a:ext cx="663575" cy="619760"/>
+            <a:off x="9118600" y="1309370"/>
+            <a:ext cx="1317625" cy="541655"/>
           </a:xfrm>
           <a:prstGeom prst="roundRect">
             <a:avLst>
@@ -6521,28 +5785,24 @@
           <a:bodyPr rtlCol="0" anchor="ctr"/>
           <a:p>
             <a:pPr algn="ctr"/>
-            <a:endParaRPr lang="zh-CN" altLang="en-US">
-              <a:solidFill>
-                <a:srgbClr val="C00000"/>
-              </a:solidFill>
-            </a:endParaRPr>
-          </a:p>
-        </p:txBody>
-      </p:sp>
-      <p:sp>
-        <p:nvSpPr>
-          <p:cNvPr id="11" name="矩形: 圆角 36"/>
+            <a:endParaRPr lang="zh-CN" altLang="en-US"/>
+          </a:p>
+        </p:txBody>
+      </p:sp>
+      <p:sp>
+        <p:nvSpPr>
+          <p:cNvPr id="10" name="矩形: 圆角 36"/>
           <p:cNvSpPr/>
           <p:nvPr>
             <p:custDataLst>
-              <p:tags r:id="rId9"/>
+              <p:tags r:id="rId11"/>
             </p:custDataLst>
           </p:nvPr>
         </p:nvSpPr>
         <p:spPr>
           <a:xfrm rot="10800000" flipV="1">
-            <a:off x="4817745" y="1985645"/>
-            <a:ext cx="815340" cy="3032760"/>
+            <a:off x="6013450" y="2778760"/>
+            <a:ext cx="1497965" cy="541655"/>
           </a:xfrm>
           <a:prstGeom prst="roundRect">
             <a:avLst>
@@ -6577,298 +5837,24 @@
           <a:bodyPr rtlCol="0" anchor="ctr"/>
           <a:p>
             <a:pPr algn="ctr"/>
-            <a:endParaRPr lang="zh-CN" altLang="en-US">
-              <a:solidFill>
-                <a:srgbClr val="C00000"/>
-              </a:solidFill>
-            </a:endParaRPr>
-          </a:p>
-        </p:txBody>
-      </p:sp>
-      <p:sp>
-        <p:nvSpPr>
-          <p:cNvPr id="12" name="矩形: 圆角 36"/>
-          <p:cNvSpPr/>
-          <p:nvPr>
-            <p:custDataLst>
-              <p:tags r:id="rId10"/>
-            </p:custDataLst>
-          </p:nvPr>
-        </p:nvSpPr>
-        <p:spPr>
-          <a:xfrm rot="10800000" flipV="1">
-            <a:off x="5799455" y="2654300"/>
-            <a:ext cx="815340" cy="889000"/>
-          </a:xfrm>
-          <a:prstGeom prst="roundRect">
-            <a:avLst>
-              <a:gd name="adj" fmla="val 10039"/>
-            </a:avLst>
-          </a:prstGeom>
-          <a:noFill/>
-          <a:ln w="38100">
-            <a:solidFill>
-              <a:schemeClr val="tx1"/>
-            </a:solidFill>
-            <a:prstDash val="lgDash"/>
-          </a:ln>
-        </p:spPr>
-        <p:style>
-          <a:lnRef idx="2">
-            <a:schemeClr val="accent1">
-              <a:shade val="15000"/>
-            </a:schemeClr>
-          </a:lnRef>
-          <a:fillRef idx="1">
-            <a:schemeClr val="accent1"/>
-          </a:fillRef>
-          <a:effectRef idx="0">
-            <a:schemeClr val="accent1"/>
-          </a:effectRef>
-          <a:fontRef idx="minor">
-            <a:schemeClr val="lt1"/>
-          </a:fontRef>
-        </p:style>
-        <p:txBody>
-          <a:bodyPr rtlCol="0" anchor="ctr"/>
-          <a:p>
-            <a:pPr algn="ctr"/>
-            <a:endParaRPr lang="zh-CN" altLang="en-US">
-              <a:solidFill>
-                <a:srgbClr val="C00000"/>
-              </a:solidFill>
-            </a:endParaRPr>
-          </a:p>
-        </p:txBody>
-      </p:sp>
-    </p:spTree>
-  </p:cSld>
-  <p:clrMapOvr>
-    <a:masterClrMapping/>
-  </p:clrMapOvr>
-</p:sld>
-</file>
-
-<file path=ppt/slides/slide6.xml><?xml version="1.0" encoding="utf-8"?>
-<p:sld xmlns:a="http://schemas.openxmlformats.org/drawingml/2006/main" xmlns:r="http://schemas.openxmlformats.org/officeDocument/2006/relationships" xmlns:p="http://schemas.openxmlformats.org/presentationml/2006/main">
-  <p:cSld>
-    <p:spTree>
-      <p:nvGrpSpPr>
-        <p:cNvPr id="1" name=""/>
-        <p:cNvGrpSpPr/>
-        <p:nvPr/>
-      </p:nvGrpSpPr>
-      <p:grpSpPr/>
-      <p:pic>
-        <p:nvPicPr>
-          <p:cNvPr id="4" name="图片 3"/>
-          <p:cNvPicPr>
-            <a:picLocks noChangeAspect="1"/>
-          </p:cNvPicPr>
-          <p:nvPr>
-            <p:custDataLst>
-              <p:tags r:id="rId1"/>
-            </p:custDataLst>
-          </p:nvPr>
-        </p:nvPicPr>
-        <p:blipFill>
-          <a:blip r:embed="rId2"/>
-          <a:stretch>
-            <a:fillRect/>
-          </a:stretch>
-        </p:blipFill>
-        <p:spPr>
-          <a:xfrm>
-            <a:off x="2380615" y="2200910"/>
-            <a:ext cx="7098665" cy="2710815"/>
-          </a:xfrm>
-          <a:prstGeom prst="rect">
-            <a:avLst/>
-          </a:prstGeom>
-        </p:spPr>
-      </p:pic>
-      <p:pic>
-        <p:nvPicPr>
-          <p:cNvPr id="5" name="图片 4"/>
-          <p:cNvPicPr>
-            <a:picLocks noChangeAspect="1"/>
-          </p:cNvPicPr>
-          <p:nvPr>
-            <p:custDataLst>
-              <p:tags r:id="rId3"/>
-            </p:custDataLst>
-          </p:nvPr>
-        </p:nvPicPr>
-        <p:blipFill>
-          <a:blip r:embed="rId4"/>
-          <a:stretch>
-            <a:fillRect/>
-          </a:stretch>
-        </p:blipFill>
-        <p:spPr>
-          <a:xfrm>
-            <a:off x="474345" y="403225"/>
-            <a:ext cx="4848860" cy="1676400"/>
-          </a:xfrm>
-          <a:prstGeom prst="rect">
-            <a:avLst/>
-          </a:prstGeom>
-        </p:spPr>
-      </p:pic>
-      <p:pic>
-        <p:nvPicPr>
-          <p:cNvPr id="6" name="图片 5"/>
-          <p:cNvPicPr>
-            <a:picLocks noChangeAspect="1"/>
-          </p:cNvPicPr>
-          <p:nvPr>
-            <p:custDataLst>
-              <p:tags r:id="rId5"/>
-            </p:custDataLst>
-          </p:nvPr>
-        </p:nvPicPr>
-        <p:blipFill>
-          <a:blip r:embed="rId6"/>
-          <a:stretch>
-            <a:fillRect/>
-          </a:stretch>
-        </p:blipFill>
-        <p:spPr>
-          <a:xfrm>
-            <a:off x="3658870" y="5033010"/>
-            <a:ext cx="4228465" cy="1826260"/>
-          </a:xfrm>
-          <a:prstGeom prst="rect">
-            <a:avLst/>
-          </a:prstGeom>
-        </p:spPr>
-      </p:pic>
-      <p:sp>
-        <p:nvSpPr>
-          <p:cNvPr id="10" name="矩形: 圆角 36"/>
-          <p:cNvSpPr/>
-          <p:nvPr>
-            <p:custDataLst>
-              <p:tags r:id="rId7"/>
-            </p:custDataLst>
-          </p:nvPr>
-        </p:nvSpPr>
-        <p:spPr>
-          <a:xfrm rot="10800000" flipV="1">
-            <a:off x="2475865" y="2298065"/>
-            <a:ext cx="1835150" cy="1826260"/>
-          </a:xfrm>
-          <a:prstGeom prst="roundRect">
-            <a:avLst>
-              <a:gd name="adj" fmla="val 10039"/>
-            </a:avLst>
-          </a:prstGeom>
-          <a:noFill/>
-          <a:ln w="38100">
-            <a:solidFill>
-              <a:schemeClr val="tx1"/>
-            </a:solidFill>
-            <a:prstDash val="lgDash"/>
-          </a:ln>
-        </p:spPr>
-        <p:style>
-          <a:lnRef idx="2">
-            <a:schemeClr val="accent1">
-              <a:shade val="15000"/>
-            </a:schemeClr>
-          </a:lnRef>
-          <a:fillRef idx="1">
-            <a:schemeClr val="accent1"/>
-          </a:fillRef>
-          <a:effectRef idx="0">
-            <a:schemeClr val="accent1"/>
-          </a:effectRef>
-          <a:fontRef idx="minor">
-            <a:schemeClr val="lt1"/>
-          </a:fontRef>
-        </p:style>
-        <p:txBody>
-          <a:bodyPr rtlCol="0" anchor="ctr"/>
-          <a:p>
-            <a:pPr algn="ctr"/>
-            <a:endParaRPr lang="zh-CN" altLang="en-US">
-              <a:solidFill>
-                <a:srgbClr val="C00000"/>
-              </a:solidFill>
-            </a:endParaRPr>
-          </a:p>
-        </p:txBody>
-      </p:sp>
-      <p:sp>
-        <p:nvSpPr>
-          <p:cNvPr id="7" name="矩形: 圆角 36"/>
-          <p:cNvSpPr/>
-          <p:nvPr>
-            <p:custDataLst>
-              <p:tags r:id="rId8"/>
-            </p:custDataLst>
-          </p:nvPr>
-        </p:nvSpPr>
-        <p:spPr>
-          <a:xfrm rot="10800000" flipV="1">
-            <a:off x="4944745" y="2401570"/>
-            <a:ext cx="805815" cy="2131060"/>
-          </a:xfrm>
-          <a:prstGeom prst="roundRect">
-            <a:avLst>
-              <a:gd name="adj" fmla="val 10039"/>
-            </a:avLst>
-          </a:prstGeom>
-          <a:noFill/>
-          <a:ln w="38100">
-            <a:solidFill>
-              <a:schemeClr val="tx1"/>
-            </a:solidFill>
-            <a:prstDash val="lgDash"/>
-          </a:ln>
-        </p:spPr>
-        <p:style>
-          <a:lnRef idx="2">
-            <a:schemeClr val="accent1">
-              <a:shade val="15000"/>
-            </a:schemeClr>
-          </a:lnRef>
-          <a:fillRef idx="1">
-            <a:schemeClr val="accent1"/>
-          </a:fillRef>
-          <a:effectRef idx="0">
-            <a:schemeClr val="accent1"/>
-          </a:effectRef>
-          <a:fontRef idx="minor">
-            <a:schemeClr val="lt1"/>
-          </a:fontRef>
-        </p:style>
-        <p:txBody>
-          <a:bodyPr rtlCol="0" anchor="ctr"/>
-          <a:p>
-            <a:pPr algn="ctr"/>
-            <a:endParaRPr lang="zh-CN" altLang="en-US">
-              <a:solidFill>
-                <a:srgbClr val="C00000"/>
-              </a:solidFill>
-            </a:endParaRPr>
+            <a:endParaRPr lang="zh-CN" altLang="en-US"/>
           </a:p>
         </p:txBody>
       </p:sp>
       <p:cxnSp>
         <p:nvCxnSpPr>
-          <p:cNvPr id="8" name="直接连接符 7"/>
+          <p:cNvPr id="11" name="直接连接符 10"/>
           <p:cNvCxnSpPr/>
           <p:nvPr>
             <p:custDataLst>
-              <p:tags r:id="rId9"/>
+              <p:tags r:id="rId12"/>
             </p:custDataLst>
           </p:nvPr>
         </p:nvCxnSpPr>
         <p:spPr>
-          <a:xfrm>
-            <a:off x="666750" y="2015490"/>
-            <a:ext cx="1809115" cy="282575"/>
+          <a:xfrm flipH="1" flipV="1">
+            <a:off x="3769995" y="1090295"/>
+            <a:ext cx="2204085" cy="1709420"/>
           </a:xfrm>
           <a:prstGeom prst="line">
             <a:avLst/>
@@ -6896,18 +5882,18 @@
       </p:cxnSp>
       <p:cxnSp>
         <p:nvCxnSpPr>
-          <p:cNvPr id="9" name="直接连接符 8"/>
+          <p:cNvPr id="12" name="直接连接符 11"/>
           <p:cNvCxnSpPr/>
           <p:nvPr>
             <p:custDataLst>
-              <p:tags r:id="rId10"/>
+              <p:tags r:id="rId13"/>
             </p:custDataLst>
           </p:nvPr>
         </p:nvCxnSpPr>
         <p:spPr>
-          <a:xfrm flipV="1">
-            <a:off x="3735705" y="4532630"/>
-            <a:ext cx="1209040" cy="773430"/>
+          <a:xfrm flipH="1">
+            <a:off x="3684905" y="3251835"/>
+            <a:ext cx="2246630" cy="749300"/>
           </a:xfrm>
           <a:prstGeom prst="line">
             <a:avLst/>
@@ -6935,18 +5921,18 @@
       </p:cxnSp>
       <p:cxnSp>
         <p:nvCxnSpPr>
-          <p:cNvPr id="11" name="直接连接符 10"/>
+          <p:cNvPr id="13" name="直接连接符 12"/>
           <p:cNvCxnSpPr/>
           <p:nvPr>
             <p:custDataLst>
-              <p:tags r:id="rId11"/>
+              <p:tags r:id="rId14"/>
             </p:custDataLst>
           </p:nvPr>
         </p:nvCxnSpPr>
         <p:spPr>
-          <a:xfrm flipH="1" flipV="1">
-            <a:off x="5750560" y="4532630"/>
-            <a:ext cx="2025650" cy="832485"/>
+          <a:xfrm flipV="1">
+            <a:off x="5818505" y="1898015"/>
+            <a:ext cx="3300095" cy="2216150"/>
           </a:xfrm>
           <a:prstGeom prst="line">
             <a:avLst/>
@@ -6974,18 +5960,96 @@
       </p:cxnSp>
       <p:cxnSp>
         <p:nvCxnSpPr>
-          <p:cNvPr id="20" name="直接连接符 19"/>
+          <p:cNvPr id="14" name="直接连接符 13"/>
           <p:cNvCxnSpPr/>
           <p:nvPr>
             <p:custDataLst>
-              <p:tags r:id="rId12"/>
+              <p:tags r:id="rId15"/>
             </p:custDataLst>
           </p:nvPr>
         </p:nvCxnSpPr>
         <p:spPr>
-          <a:xfrm flipH="1">
-            <a:off x="4413885" y="1990090"/>
-            <a:ext cx="748665" cy="553085"/>
+          <a:xfrm flipV="1">
+            <a:off x="5875020" y="1898015"/>
+            <a:ext cx="4561205" cy="4787265"/>
+          </a:xfrm>
+          <a:prstGeom prst="line">
+            <a:avLst/>
+          </a:prstGeom>
+          <a:ln w="38100">
+            <a:solidFill>
+              <a:schemeClr val="tx1"/>
+            </a:solidFill>
+          </a:ln>
+        </p:spPr>
+        <p:style>
+          <a:lnRef idx="2">
+            <a:schemeClr val="accent1"/>
+          </a:lnRef>
+          <a:fillRef idx="0">
+            <a:srgbClr val="FFFFFF"/>
+          </a:fillRef>
+          <a:effectRef idx="0">
+            <a:srgbClr val="FFFFFF"/>
+          </a:effectRef>
+          <a:fontRef idx="minor">
+            <a:schemeClr val="tx1"/>
+          </a:fontRef>
+        </p:style>
+      </p:cxnSp>
+      <p:cxnSp>
+        <p:nvCxnSpPr>
+          <p:cNvPr id="15" name="直接连接符 14"/>
+          <p:cNvCxnSpPr/>
+          <p:nvPr>
+            <p:custDataLst>
+              <p:tags r:id="rId16"/>
+            </p:custDataLst>
+          </p:nvPr>
+        </p:nvCxnSpPr>
+        <p:spPr>
+          <a:xfrm flipV="1">
+            <a:off x="6157595" y="3970020"/>
+            <a:ext cx="4444365" cy="1283335"/>
+          </a:xfrm>
+          <a:prstGeom prst="line">
+            <a:avLst/>
+          </a:prstGeom>
+          <a:ln w="38100">
+            <a:solidFill>
+              <a:schemeClr val="tx1"/>
+            </a:solidFill>
+          </a:ln>
+        </p:spPr>
+        <p:style>
+          <a:lnRef idx="2">
+            <a:schemeClr val="accent1"/>
+          </a:lnRef>
+          <a:fillRef idx="0">
+            <a:srgbClr val="FFFFFF"/>
+          </a:fillRef>
+          <a:effectRef idx="0">
+            <a:srgbClr val="FFFFFF"/>
+          </a:effectRef>
+          <a:fontRef idx="minor">
+            <a:schemeClr val="tx1"/>
+          </a:fontRef>
+        </p:style>
+      </p:cxnSp>
+      <p:cxnSp>
+        <p:nvCxnSpPr>
+          <p:cNvPr id="16" name="直接连接符 15"/>
+          <p:cNvCxnSpPr/>
+          <p:nvPr>
+            <p:custDataLst>
+              <p:tags r:id="rId17"/>
+            </p:custDataLst>
+          </p:nvPr>
+        </p:nvCxnSpPr>
+        <p:spPr>
+          <a:xfrm flipH="1" flipV="1">
+            <a:off x="11919585" y="3970020"/>
+            <a:ext cx="87630" cy="1302385"/>
           </a:xfrm>
           <a:prstGeom prst="line">
             <a:avLst/>
@@ -7019,6 +6083,2399 @@
 </p:sld>
 </file>
 
+<file path=ppt/slides/slide15.xml><?xml version="1.0" encoding="utf-8"?>
+<p:sld xmlns:a="http://schemas.openxmlformats.org/drawingml/2006/main" xmlns:r="http://schemas.openxmlformats.org/officeDocument/2006/relationships" xmlns:p="http://schemas.openxmlformats.org/presentationml/2006/main">
+  <p:cSld>
+    <p:spTree>
+      <p:nvGrpSpPr>
+        <p:cNvPr id="1" name=""/>
+        <p:cNvGrpSpPr/>
+        <p:nvPr/>
+      </p:nvGrpSpPr>
+      <p:grpSpPr/>
+      <p:sp>
+        <p:nvSpPr>
+          <p:cNvPr id="2" name="标题 1"/>
+          <p:cNvSpPr>
+            <a:spLocks noGrp="1"/>
+          </p:cNvSpPr>
+          <p:nvPr>
+            <p:ph type="ctrTitle"/>
+          </p:nvPr>
+        </p:nvSpPr>
+        <p:spPr/>
+        <p:txBody>
+          <a:bodyPr/>
+          <a:p>
+            <a:r>
+              <a:rPr lang="en-US" altLang="zh-CN"/>
+              <a:t>STSN</a:t>
+            </a:r>
+            <a:endParaRPr lang="en-US" altLang="zh-CN"/>
+          </a:p>
+        </p:txBody>
+      </p:sp>
+      <p:sp>
+        <p:nvSpPr>
+          <p:cNvPr id="3" name="副标题 2"/>
+          <p:cNvSpPr>
+            <a:spLocks noGrp="1"/>
+          </p:cNvSpPr>
+          <p:nvPr>
+            <p:ph type="subTitle" idx="1"/>
+          </p:nvPr>
+        </p:nvSpPr>
+        <p:spPr/>
+        <p:txBody>
+          <a:bodyPr/>
+          <a:p>
+            <a:endParaRPr lang="zh-CN" altLang="en-US"/>
+          </a:p>
+        </p:txBody>
+      </p:sp>
+    </p:spTree>
+  </p:cSld>
+  <p:clrMapOvr>
+    <a:masterClrMapping/>
+  </p:clrMapOvr>
+</p:sld>
+</file>
+
+<file path=ppt/slides/slide16.xml><?xml version="1.0" encoding="utf-8"?>
+<p:sld xmlns:a="http://schemas.openxmlformats.org/drawingml/2006/main" xmlns:r="http://schemas.openxmlformats.org/officeDocument/2006/relationships" xmlns:p="http://schemas.openxmlformats.org/presentationml/2006/main">
+  <p:cSld>
+    <p:spTree>
+      <p:nvGrpSpPr>
+        <p:cNvPr id="1" name=""/>
+        <p:cNvGrpSpPr/>
+        <p:nvPr/>
+      </p:nvGrpSpPr>
+      <p:grpSpPr/>
+      <p:pic>
+        <p:nvPicPr>
+          <p:cNvPr id="4" name="图片 3"/>
+          <p:cNvPicPr>
+            <a:picLocks noChangeAspect="1"/>
+          </p:cNvPicPr>
+          <p:nvPr>
+            <p:custDataLst>
+              <p:tags r:id="rId1"/>
+            </p:custDataLst>
+          </p:nvPr>
+        </p:nvPicPr>
+        <p:blipFill>
+          <a:blip r:embed="rId2"/>
+          <a:stretch>
+            <a:fillRect/>
+          </a:stretch>
+        </p:blipFill>
+        <p:spPr>
+          <a:xfrm>
+            <a:off x="1294130" y="471805"/>
+            <a:ext cx="9222105" cy="4295775"/>
+          </a:xfrm>
+          <a:prstGeom prst="rect">
+            <a:avLst/>
+          </a:prstGeom>
+        </p:spPr>
+      </p:pic>
+      <p:sp>
+        <p:nvSpPr>
+          <p:cNvPr id="10" name="矩形: 圆角 36"/>
+          <p:cNvSpPr/>
+          <p:nvPr>
+            <p:custDataLst>
+              <p:tags r:id="rId3"/>
+            </p:custDataLst>
+          </p:nvPr>
+        </p:nvSpPr>
+        <p:spPr>
+          <a:xfrm rot="10800000" flipV="1">
+            <a:off x="5319395" y="2849880"/>
+            <a:ext cx="354330" cy="966470"/>
+          </a:xfrm>
+          <a:prstGeom prst="roundRect">
+            <a:avLst>
+              <a:gd name="adj" fmla="val 10039"/>
+            </a:avLst>
+          </a:prstGeom>
+          <a:noFill/>
+          <a:ln w="38100">
+            <a:solidFill>
+              <a:schemeClr val="tx1"/>
+            </a:solidFill>
+            <a:prstDash val="lgDash"/>
+          </a:ln>
+        </p:spPr>
+        <p:style>
+          <a:lnRef idx="2">
+            <a:schemeClr val="accent1">
+              <a:shade val="15000"/>
+            </a:schemeClr>
+          </a:lnRef>
+          <a:fillRef idx="1">
+            <a:schemeClr val="accent1"/>
+          </a:fillRef>
+          <a:effectRef idx="0">
+            <a:schemeClr val="accent1"/>
+          </a:effectRef>
+          <a:fontRef idx="minor">
+            <a:schemeClr val="lt1"/>
+          </a:fontRef>
+        </p:style>
+        <p:txBody>
+          <a:bodyPr rtlCol="0" anchor="ctr"/>
+          <a:p>
+            <a:pPr algn="ctr"/>
+            <a:endParaRPr lang="zh-CN" altLang="en-US"/>
+          </a:p>
+        </p:txBody>
+      </p:sp>
+      <p:sp>
+        <p:nvSpPr>
+          <p:cNvPr id="5" name="矩形: 圆角 36"/>
+          <p:cNvSpPr/>
+          <p:nvPr>
+            <p:custDataLst>
+              <p:tags r:id="rId4"/>
+            </p:custDataLst>
+          </p:nvPr>
+        </p:nvSpPr>
+        <p:spPr>
+          <a:xfrm rot="10800000" flipV="1">
+            <a:off x="6942455" y="1605915"/>
+            <a:ext cx="354330" cy="840105"/>
+          </a:xfrm>
+          <a:prstGeom prst="roundRect">
+            <a:avLst>
+              <a:gd name="adj" fmla="val 10039"/>
+            </a:avLst>
+          </a:prstGeom>
+          <a:noFill/>
+          <a:ln w="38100">
+            <a:solidFill>
+              <a:schemeClr val="tx1"/>
+            </a:solidFill>
+            <a:prstDash val="lgDash"/>
+          </a:ln>
+        </p:spPr>
+        <p:style>
+          <a:lnRef idx="2">
+            <a:schemeClr val="accent1">
+              <a:shade val="15000"/>
+            </a:schemeClr>
+          </a:lnRef>
+          <a:fillRef idx="1">
+            <a:schemeClr val="accent1"/>
+          </a:fillRef>
+          <a:effectRef idx="0">
+            <a:schemeClr val="accent1"/>
+          </a:effectRef>
+          <a:fontRef idx="minor">
+            <a:schemeClr val="lt1"/>
+          </a:fontRef>
+        </p:style>
+        <p:txBody>
+          <a:bodyPr rtlCol="0" anchor="ctr"/>
+          <a:p>
+            <a:pPr algn="ctr"/>
+            <a:endParaRPr lang="zh-CN" altLang="en-US"/>
+          </a:p>
+        </p:txBody>
+      </p:sp>
+      <p:sp>
+        <p:nvSpPr>
+          <p:cNvPr id="13" name="文本框 12"/>
+          <p:cNvSpPr txBox="1"/>
+          <p:nvPr>
+            <p:custDataLst>
+              <p:tags r:id="rId5"/>
+            </p:custDataLst>
+          </p:nvPr>
+        </p:nvSpPr>
+        <p:spPr>
+          <a:xfrm>
+            <a:off x="7889240" y="1872615"/>
+            <a:ext cx="1770380" cy="306705"/>
+          </a:xfrm>
+          <a:prstGeom prst="rect">
+            <a:avLst/>
+          </a:prstGeom>
+          <a:noFill/>
+        </p:spPr>
+        <p:txBody>
+          <a:bodyPr wrap="square" rtlCol="0">
+            <a:spAutoFit/>
+          </a:bodyPr>
+          <a:p>
+            <a:r>
+              <a:rPr lang="zh-CN" altLang="en-US" sz="1400" b="1">
+                <a:latin typeface="微软雅黑" charset="0"/>
+                <a:ea typeface="微软雅黑" charset="0"/>
+              </a:rPr>
+              <a:t>就是</a:t>
+            </a:r>
+            <a:r>
+              <a:rPr lang="zh-CN" altLang="en-US" sz="1400" b="1">
+                <a:latin typeface="微软雅黑" charset="0"/>
+                <a:ea typeface="微软雅黑" charset="0"/>
+              </a:rPr>
+              <a:t>逐元素</a:t>
+            </a:r>
+            <a:r>
+              <a:rPr lang="zh-CN" altLang="en-US" sz="1400" b="1">
+                <a:latin typeface="微软雅黑" charset="0"/>
+                <a:ea typeface="微软雅黑" charset="0"/>
+              </a:rPr>
+              <a:t>相乘</a:t>
+            </a:r>
+            <a:endParaRPr lang="zh-CN" altLang="en-US" sz="1400" b="1">
+              <a:latin typeface="微软雅黑" charset="0"/>
+              <a:ea typeface="微软雅黑" charset="0"/>
+            </a:endParaRPr>
+          </a:p>
+        </p:txBody>
+      </p:sp>
+      <p:pic>
+        <p:nvPicPr>
+          <p:cNvPr id="6" name="图片 5"/>
+          <p:cNvPicPr>
+            <a:picLocks noChangeAspect="1"/>
+          </p:cNvPicPr>
+          <p:nvPr>
+            <p:custDataLst>
+              <p:tags r:id="rId6"/>
+            </p:custDataLst>
+          </p:nvPr>
+        </p:nvPicPr>
+        <p:blipFill>
+          <a:blip r:embed="rId7"/>
+          <a:stretch>
+            <a:fillRect/>
+          </a:stretch>
+        </p:blipFill>
+        <p:spPr>
+          <a:xfrm>
+            <a:off x="2059305" y="4767580"/>
+            <a:ext cx="6688455" cy="2073275"/>
+          </a:xfrm>
+          <a:prstGeom prst="rect">
+            <a:avLst/>
+          </a:prstGeom>
+        </p:spPr>
+      </p:pic>
+      <p:sp>
+        <p:nvSpPr>
+          <p:cNvPr id="7" name="文本框 6"/>
+          <p:cNvSpPr txBox="1"/>
+          <p:nvPr>
+            <p:custDataLst>
+              <p:tags r:id="rId8"/>
+            </p:custDataLst>
+          </p:nvPr>
+        </p:nvSpPr>
+        <p:spPr>
+          <a:xfrm>
+            <a:off x="8747760" y="5828665"/>
+            <a:ext cx="3112135" cy="306070"/>
+          </a:xfrm>
+          <a:prstGeom prst="rect">
+            <a:avLst/>
+          </a:prstGeom>
+          <a:noFill/>
+        </p:spPr>
+        <p:txBody>
+          <a:bodyPr wrap="square" rtlCol="0">
+            <a:noAutofit/>
+          </a:bodyPr>
+          <a:p>
+            <a:r>
+              <a:rPr lang="zh-CN" altLang="en-US" sz="1400" b="1">
+                <a:latin typeface="微软雅黑" charset="0"/>
+                <a:ea typeface="微软雅黑" charset="0"/>
+              </a:rPr>
+              <a:t>自己文章里对</a:t>
+            </a:r>
+            <a:r>
+              <a:rPr lang="en-US" altLang="zh-CN" sz="1400" b="1">
+                <a:latin typeface="微软雅黑" charset="0"/>
+                <a:ea typeface="微软雅黑" charset="0"/>
+              </a:rPr>
+              <a:t>ESA</a:t>
+            </a:r>
+            <a:r>
+              <a:rPr lang="zh-CN" altLang="en-US" sz="1400" b="1">
+                <a:latin typeface="微软雅黑" charset="0"/>
+                <a:ea typeface="微软雅黑" charset="0"/>
+              </a:rPr>
+              <a:t>的介绍都没有，还是拿的原论文的</a:t>
+            </a:r>
+            <a:r>
+              <a:rPr lang="zh-CN" altLang="en-US" sz="1400" b="1">
+                <a:latin typeface="微软雅黑" charset="0"/>
+                <a:ea typeface="微软雅黑" charset="0"/>
+              </a:rPr>
+              <a:t>图</a:t>
+            </a:r>
+            <a:endParaRPr lang="zh-CN" altLang="en-US" sz="1400" b="1">
+              <a:latin typeface="微软雅黑" charset="0"/>
+              <a:ea typeface="微软雅黑" charset="0"/>
+            </a:endParaRPr>
+          </a:p>
+        </p:txBody>
+      </p:sp>
+      <p:cxnSp>
+        <p:nvCxnSpPr>
+          <p:cNvPr id="14" name="直接连接符 13"/>
+          <p:cNvCxnSpPr/>
+          <p:nvPr>
+            <p:custDataLst>
+              <p:tags r:id="rId9"/>
+            </p:custDataLst>
+          </p:nvPr>
+        </p:nvCxnSpPr>
+        <p:spPr>
+          <a:xfrm flipV="1">
+            <a:off x="2273300" y="3845560"/>
+            <a:ext cx="3052445" cy="1511935"/>
+          </a:xfrm>
+          <a:prstGeom prst="line">
+            <a:avLst/>
+          </a:prstGeom>
+          <a:ln w="38100">
+            <a:solidFill>
+              <a:schemeClr val="tx1"/>
+            </a:solidFill>
+          </a:ln>
+        </p:spPr>
+        <p:style>
+          <a:lnRef idx="2">
+            <a:schemeClr val="accent1"/>
+          </a:lnRef>
+          <a:fillRef idx="0">
+            <a:srgbClr val="FFFFFF"/>
+          </a:fillRef>
+          <a:effectRef idx="0">
+            <a:srgbClr val="FFFFFF"/>
+          </a:effectRef>
+          <a:fontRef idx="minor">
+            <a:schemeClr val="tx1"/>
+          </a:fontRef>
+        </p:style>
+      </p:cxnSp>
+      <p:cxnSp>
+        <p:nvCxnSpPr>
+          <p:cNvPr id="8" name="直接连接符 7"/>
+          <p:cNvCxnSpPr/>
+          <p:nvPr>
+            <p:custDataLst>
+              <p:tags r:id="rId10"/>
+            </p:custDataLst>
+          </p:nvPr>
+        </p:nvCxnSpPr>
+        <p:spPr>
+          <a:xfrm flipH="1" flipV="1">
+            <a:off x="5650230" y="3859530"/>
+            <a:ext cx="2882900" cy="1441450"/>
+          </a:xfrm>
+          <a:prstGeom prst="line">
+            <a:avLst/>
+          </a:prstGeom>
+          <a:ln w="38100">
+            <a:solidFill>
+              <a:schemeClr val="tx1"/>
+            </a:solidFill>
+          </a:ln>
+        </p:spPr>
+        <p:style>
+          <a:lnRef idx="2">
+            <a:schemeClr val="accent1"/>
+          </a:lnRef>
+          <a:fillRef idx="0">
+            <a:srgbClr val="FFFFFF"/>
+          </a:fillRef>
+          <a:effectRef idx="0">
+            <a:srgbClr val="FFFFFF"/>
+          </a:effectRef>
+          <a:fontRef idx="minor">
+            <a:schemeClr val="tx1"/>
+          </a:fontRef>
+        </p:style>
+      </p:cxnSp>
+    </p:spTree>
+  </p:cSld>
+  <p:clrMapOvr>
+    <a:masterClrMapping/>
+  </p:clrMapOvr>
+</p:sld>
+</file>
+
+<file path=ppt/slides/slide17.xml><?xml version="1.0" encoding="utf-8"?>
+<p:sld xmlns:a="http://schemas.openxmlformats.org/drawingml/2006/main" xmlns:r="http://schemas.openxmlformats.org/officeDocument/2006/relationships" xmlns:p="http://schemas.openxmlformats.org/presentationml/2006/main">
+  <p:cSld>
+    <p:spTree>
+      <p:nvGrpSpPr>
+        <p:cNvPr id="1" name=""/>
+        <p:cNvGrpSpPr/>
+        <p:nvPr/>
+      </p:nvGrpSpPr>
+      <p:grpSpPr/>
+      <p:sp>
+        <p:nvSpPr>
+          <p:cNvPr id="2" name="标题 1"/>
+          <p:cNvSpPr>
+            <a:spLocks noGrp="1"/>
+          </p:cNvSpPr>
+          <p:nvPr>
+            <p:ph type="ctrTitle"/>
+          </p:nvPr>
+        </p:nvSpPr>
+        <p:spPr/>
+        <p:txBody>
+          <a:bodyPr/>
+          <a:p>
+            <a:r>
+              <a:rPr lang="en-US" altLang="zh-CN"/>
+              <a:t>HNCT</a:t>
+            </a:r>
+            <a:endParaRPr lang="en-US" altLang="zh-CN"/>
+          </a:p>
+        </p:txBody>
+      </p:sp>
+      <p:sp>
+        <p:nvSpPr>
+          <p:cNvPr id="3" name="副标题 2"/>
+          <p:cNvSpPr>
+            <a:spLocks noGrp="1"/>
+          </p:cNvSpPr>
+          <p:nvPr>
+            <p:ph type="subTitle" idx="1"/>
+          </p:nvPr>
+        </p:nvSpPr>
+        <p:spPr/>
+        <p:txBody>
+          <a:bodyPr/>
+          <a:p>
+            <a:endParaRPr lang="zh-CN" altLang="en-US"/>
+          </a:p>
+        </p:txBody>
+      </p:sp>
+    </p:spTree>
+  </p:cSld>
+  <p:clrMapOvr>
+    <a:masterClrMapping/>
+  </p:clrMapOvr>
+</p:sld>
+</file>
+
+<file path=ppt/slides/slide18.xml><?xml version="1.0" encoding="utf-8"?>
+<p:sld xmlns:a="http://schemas.openxmlformats.org/drawingml/2006/main" xmlns:r="http://schemas.openxmlformats.org/officeDocument/2006/relationships" xmlns:p="http://schemas.openxmlformats.org/presentationml/2006/main">
+  <p:cSld>
+    <p:spTree>
+      <p:nvGrpSpPr>
+        <p:cNvPr id="1" name=""/>
+        <p:cNvGrpSpPr/>
+        <p:nvPr/>
+      </p:nvGrpSpPr>
+      <p:grpSpPr/>
+      <p:pic>
+        <p:nvPicPr>
+          <p:cNvPr id="4" name="图片 3"/>
+          <p:cNvPicPr>
+            <a:picLocks noChangeAspect="1"/>
+          </p:cNvPicPr>
+          <p:nvPr>
+            <p:custDataLst>
+              <p:tags r:id="rId1"/>
+            </p:custDataLst>
+          </p:nvPr>
+        </p:nvPicPr>
+        <p:blipFill>
+          <a:blip r:embed="rId2"/>
+          <a:stretch>
+            <a:fillRect/>
+          </a:stretch>
+        </p:blipFill>
+        <p:spPr>
+          <a:xfrm>
+            <a:off x="728980" y="0"/>
+            <a:ext cx="10734040" cy="6858000"/>
+          </a:xfrm>
+          <a:prstGeom prst="rect">
+            <a:avLst/>
+          </a:prstGeom>
+        </p:spPr>
+      </p:pic>
+    </p:spTree>
+  </p:cSld>
+  <p:clrMapOvr>
+    <a:masterClrMapping/>
+  </p:clrMapOvr>
+</p:sld>
+</file>
+
+<file path=ppt/slides/slide19.xml><?xml version="1.0" encoding="utf-8"?>
+<p:sld xmlns:a="http://schemas.openxmlformats.org/drawingml/2006/main" xmlns:r="http://schemas.openxmlformats.org/officeDocument/2006/relationships" xmlns:p="http://schemas.openxmlformats.org/presentationml/2006/main">
+  <p:cSld>
+    <p:spTree>
+      <p:nvGrpSpPr>
+        <p:cNvPr id="1" name=""/>
+        <p:cNvGrpSpPr/>
+        <p:nvPr/>
+      </p:nvGrpSpPr>
+      <p:grpSpPr/>
+      <p:sp>
+        <p:nvSpPr>
+          <p:cNvPr id="2" name="标题 1"/>
+          <p:cNvSpPr>
+            <a:spLocks noGrp="1"/>
+          </p:cNvSpPr>
+          <p:nvPr>
+            <p:ph type="ctrTitle"/>
+          </p:nvPr>
+        </p:nvSpPr>
+        <p:spPr/>
+        <p:txBody>
+          <a:bodyPr/>
+          <a:p>
+            <a:r>
+              <a:rPr lang="en-US" altLang="zh-CN"/>
+              <a:t>SRConvNet</a:t>
+            </a:r>
+            <a:endParaRPr lang="en-US" altLang="zh-CN"/>
+          </a:p>
+        </p:txBody>
+      </p:sp>
+      <p:sp>
+        <p:nvSpPr>
+          <p:cNvPr id="3" name="副标题 2"/>
+          <p:cNvSpPr>
+            <a:spLocks noGrp="1"/>
+          </p:cNvSpPr>
+          <p:nvPr>
+            <p:ph type="subTitle" idx="1"/>
+          </p:nvPr>
+        </p:nvSpPr>
+        <p:spPr/>
+        <p:txBody>
+          <a:bodyPr/>
+          <a:p>
+            <a:endParaRPr lang="zh-CN" altLang="en-US"/>
+          </a:p>
+        </p:txBody>
+      </p:sp>
+    </p:spTree>
+  </p:cSld>
+  <p:clrMapOvr>
+    <a:masterClrMapping/>
+  </p:clrMapOvr>
+</p:sld>
+</file>
+
+<file path=ppt/slides/slide2.xml><?xml version="1.0" encoding="utf-8"?>
+<p:sld xmlns:a="http://schemas.openxmlformats.org/drawingml/2006/main" xmlns:r="http://schemas.openxmlformats.org/officeDocument/2006/relationships" xmlns:p="http://schemas.openxmlformats.org/presentationml/2006/main">
+  <p:cSld>
+    <p:spTree>
+      <p:nvGrpSpPr>
+        <p:cNvPr id="1" name=""/>
+        <p:cNvGrpSpPr/>
+        <p:nvPr/>
+      </p:nvGrpSpPr>
+      <p:grpSpPr/>
+      <p:sp>
+        <p:nvSpPr>
+          <p:cNvPr id="2" name="标题 1"/>
+          <p:cNvSpPr>
+            <a:spLocks noGrp="1"/>
+          </p:cNvSpPr>
+          <p:nvPr>
+            <p:ph type="ctrTitle"/>
+          </p:nvPr>
+        </p:nvSpPr>
+        <p:spPr/>
+        <p:txBody>
+          <a:bodyPr/>
+          <a:p>
+            <a:r>
+              <a:rPr lang="en-US" altLang="zh-CN"/>
+              <a:t>FD-Conv</a:t>
+            </a:r>
+            <a:endParaRPr lang="en-US" altLang="zh-CN"/>
+          </a:p>
+        </p:txBody>
+      </p:sp>
+      <p:sp>
+        <p:nvSpPr>
+          <p:cNvPr id="3" name="副标题 2"/>
+          <p:cNvSpPr>
+            <a:spLocks noGrp="1"/>
+          </p:cNvSpPr>
+          <p:nvPr>
+            <p:ph type="subTitle" idx="1"/>
+          </p:nvPr>
+        </p:nvSpPr>
+        <p:spPr/>
+        <p:txBody>
+          <a:bodyPr/>
+          <a:p>
+            <a:endParaRPr lang="zh-CN" altLang="en-US"/>
+          </a:p>
+        </p:txBody>
+      </p:sp>
+    </p:spTree>
+  </p:cSld>
+  <p:clrMapOvr>
+    <a:masterClrMapping/>
+  </p:clrMapOvr>
+</p:sld>
+</file>
+
+<file path=ppt/slides/slide20.xml><?xml version="1.0" encoding="utf-8"?>
+<p:sld xmlns:a="http://schemas.openxmlformats.org/drawingml/2006/main" xmlns:r="http://schemas.openxmlformats.org/officeDocument/2006/relationships" xmlns:p="http://schemas.openxmlformats.org/presentationml/2006/main">
+  <p:cSld>
+    <p:spTree>
+      <p:nvGrpSpPr>
+        <p:cNvPr id="1" name=""/>
+        <p:cNvGrpSpPr/>
+        <p:nvPr/>
+      </p:nvGrpSpPr>
+      <p:grpSpPr/>
+      <p:pic>
+        <p:nvPicPr>
+          <p:cNvPr id="5" name="图片 4"/>
+          <p:cNvPicPr>
+            <a:picLocks noChangeAspect="1"/>
+          </p:cNvPicPr>
+          <p:nvPr>
+            <p:custDataLst>
+              <p:tags r:id="rId1"/>
+            </p:custDataLst>
+          </p:nvPr>
+        </p:nvPicPr>
+        <p:blipFill>
+          <a:blip r:embed="rId2"/>
+          <a:stretch>
+            <a:fillRect/>
+          </a:stretch>
+        </p:blipFill>
+        <p:spPr>
+          <a:xfrm>
+            <a:off x="0" y="0"/>
+            <a:ext cx="9098915" cy="4411980"/>
+          </a:xfrm>
+          <a:prstGeom prst="rect">
+            <a:avLst/>
+          </a:prstGeom>
+        </p:spPr>
+      </p:pic>
+      <p:sp>
+        <p:nvSpPr>
+          <p:cNvPr id="7" name="文本框 6"/>
+          <p:cNvSpPr txBox="1"/>
+          <p:nvPr>
+            <p:custDataLst>
+              <p:tags r:id="rId3"/>
+            </p:custDataLst>
+          </p:nvPr>
+        </p:nvSpPr>
+        <p:spPr>
+          <a:xfrm>
+            <a:off x="2049780" y="417195"/>
+            <a:ext cx="1896745" cy="236855"/>
+          </a:xfrm>
+          <a:prstGeom prst="rect">
+            <a:avLst/>
+          </a:prstGeom>
+          <a:noFill/>
+        </p:spPr>
+        <p:txBody>
+          <a:bodyPr wrap="square" rtlCol="0">
+            <a:noAutofit/>
+          </a:bodyPr>
+          <a:p>
+            <a:r>
+              <a:rPr lang="zh-CN" altLang="en-US" sz="1400" b="1">
+                <a:latin typeface="微软雅黑" charset="0"/>
+                <a:ea typeface="微软雅黑" charset="0"/>
+              </a:rPr>
+              <a:t>结果融合双线性</a:t>
+            </a:r>
+            <a:r>
+              <a:rPr lang="zh-CN" altLang="en-US" sz="1400" b="1">
+                <a:latin typeface="微软雅黑" charset="0"/>
+                <a:ea typeface="微软雅黑" charset="0"/>
+              </a:rPr>
+              <a:t>差值</a:t>
+            </a:r>
+            <a:endParaRPr lang="zh-CN" altLang="en-US" sz="1400" b="1">
+              <a:latin typeface="微软雅黑" charset="0"/>
+              <a:ea typeface="微软雅黑" charset="0"/>
+            </a:endParaRPr>
+          </a:p>
+        </p:txBody>
+      </p:sp>
+      <p:sp>
+        <p:nvSpPr>
+          <p:cNvPr id="6" name="文本框 5"/>
+          <p:cNvSpPr txBox="1"/>
+          <p:nvPr>
+            <p:custDataLst>
+              <p:tags r:id="rId4"/>
+            </p:custDataLst>
+          </p:nvPr>
+        </p:nvSpPr>
+        <p:spPr>
+          <a:xfrm>
+            <a:off x="919480" y="3429000"/>
+            <a:ext cx="1896745" cy="236855"/>
+          </a:xfrm>
+          <a:prstGeom prst="rect">
+            <a:avLst/>
+          </a:prstGeom>
+          <a:noFill/>
+        </p:spPr>
+        <p:txBody>
+          <a:bodyPr wrap="square" rtlCol="0">
+            <a:noAutofit/>
+          </a:bodyPr>
+          <a:p>
+            <a:r>
+              <a:rPr lang="zh-CN" altLang="en-US" sz="1400" b="1">
+                <a:latin typeface="微软雅黑" charset="0"/>
+                <a:ea typeface="微软雅黑" charset="0"/>
+              </a:rPr>
+              <a:t>频域作为</a:t>
+            </a:r>
+            <a:r>
+              <a:rPr lang="en-US" altLang="zh-CN" sz="1400" b="1">
+                <a:latin typeface="微软雅黑" charset="0"/>
+                <a:ea typeface="微软雅黑" charset="0"/>
+              </a:rPr>
+              <a:t>A</a:t>
+            </a:r>
+            <a:r>
+              <a:rPr lang="zh-CN" altLang="en-US" sz="1400" b="1">
+                <a:latin typeface="微软雅黑" charset="0"/>
+                <a:ea typeface="微软雅黑" charset="0"/>
+              </a:rPr>
+              <a:t>矩阵</a:t>
+            </a:r>
+            <a:endParaRPr lang="zh-CN" altLang="en-US" sz="1400" b="1">
+              <a:latin typeface="微软雅黑" charset="0"/>
+              <a:ea typeface="微软雅黑" charset="0"/>
+            </a:endParaRPr>
+          </a:p>
+        </p:txBody>
+      </p:sp>
+      <p:sp>
+        <p:nvSpPr>
+          <p:cNvPr id="8" name="文本框 7"/>
+          <p:cNvSpPr txBox="1"/>
+          <p:nvPr>
+            <p:custDataLst>
+              <p:tags r:id="rId5"/>
+            </p:custDataLst>
+          </p:nvPr>
+        </p:nvSpPr>
+        <p:spPr>
+          <a:xfrm>
+            <a:off x="919480" y="1923415"/>
+            <a:ext cx="1896745" cy="236855"/>
+          </a:xfrm>
+          <a:prstGeom prst="rect">
+            <a:avLst/>
+          </a:prstGeom>
+          <a:noFill/>
+        </p:spPr>
+        <p:txBody>
+          <a:bodyPr wrap="square" rtlCol="0">
+            <a:noAutofit/>
+          </a:bodyPr>
+          <a:p>
+            <a:r>
+              <a:rPr lang="zh-CN" altLang="en-US" sz="1400" b="1">
+                <a:latin typeface="微软雅黑" charset="0"/>
+                <a:ea typeface="微软雅黑" charset="0"/>
+              </a:rPr>
+              <a:t>空间域作为</a:t>
+            </a:r>
+            <a:r>
+              <a:rPr lang="en-US" altLang="zh-CN" sz="1400" b="1">
+                <a:latin typeface="微软雅黑" charset="0"/>
+                <a:ea typeface="微软雅黑" charset="0"/>
+              </a:rPr>
+              <a:t>V</a:t>
+            </a:r>
+            <a:r>
+              <a:rPr lang="zh-CN" altLang="en-US" sz="1400" b="1">
+                <a:latin typeface="微软雅黑" charset="0"/>
+                <a:ea typeface="微软雅黑" charset="0"/>
+              </a:rPr>
+              <a:t>矩阵</a:t>
+            </a:r>
+            <a:endParaRPr lang="zh-CN" altLang="en-US" sz="1400" b="1">
+              <a:latin typeface="微软雅黑" charset="0"/>
+              <a:ea typeface="微软雅黑" charset="0"/>
+            </a:endParaRPr>
+          </a:p>
+        </p:txBody>
+      </p:sp>
+      <p:pic>
+        <p:nvPicPr>
+          <p:cNvPr id="9" name="图片 8"/>
+          <p:cNvPicPr>
+            <a:picLocks noChangeAspect="1"/>
+          </p:cNvPicPr>
+          <p:nvPr>
+            <p:custDataLst>
+              <p:tags r:id="rId6"/>
+            </p:custDataLst>
+          </p:nvPr>
+        </p:nvPicPr>
+        <p:blipFill>
+          <a:blip r:embed="rId7"/>
+          <a:stretch>
+            <a:fillRect/>
+          </a:stretch>
+        </p:blipFill>
+        <p:spPr>
+          <a:xfrm>
+            <a:off x="7804785" y="4411980"/>
+            <a:ext cx="4132580" cy="2395220"/>
+          </a:xfrm>
+          <a:prstGeom prst="rect">
+            <a:avLst/>
+          </a:prstGeom>
+        </p:spPr>
+      </p:pic>
+      <p:sp>
+        <p:nvSpPr>
+          <p:cNvPr id="10" name="矩形: 圆角 36"/>
+          <p:cNvSpPr/>
+          <p:nvPr>
+            <p:custDataLst>
+              <p:tags r:id="rId8"/>
+            </p:custDataLst>
+          </p:nvPr>
+        </p:nvSpPr>
+        <p:spPr>
+          <a:xfrm rot="10800000" flipV="1">
+            <a:off x="7254875" y="2033270"/>
+            <a:ext cx="1667510" cy="473075"/>
+          </a:xfrm>
+          <a:prstGeom prst="roundRect">
+            <a:avLst>
+              <a:gd name="adj" fmla="val 10039"/>
+            </a:avLst>
+          </a:prstGeom>
+          <a:noFill/>
+          <a:ln w="38100">
+            <a:solidFill>
+              <a:schemeClr val="tx1"/>
+            </a:solidFill>
+            <a:prstDash val="lgDash"/>
+          </a:ln>
+        </p:spPr>
+        <p:style>
+          <a:lnRef idx="2">
+            <a:schemeClr val="accent1">
+              <a:shade val="15000"/>
+            </a:schemeClr>
+          </a:lnRef>
+          <a:fillRef idx="1">
+            <a:schemeClr val="accent1"/>
+          </a:fillRef>
+          <a:effectRef idx="0">
+            <a:schemeClr val="accent1"/>
+          </a:effectRef>
+          <a:fontRef idx="minor">
+            <a:schemeClr val="lt1"/>
+          </a:fontRef>
+        </p:style>
+        <p:txBody>
+          <a:bodyPr rtlCol="0" anchor="ctr"/>
+          <a:p>
+            <a:pPr algn="ctr"/>
+            <a:endParaRPr lang="zh-CN" altLang="en-US"/>
+          </a:p>
+        </p:txBody>
+      </p:sp>
+      <p:sp>
+        <p:nvSpPr>
+          <p:cNvPr id="11" name="文本框 10"/>
+          <p:cNvSpPr txBox="1"/>
+          <p:nvPr>
+            <p:custDataLst>
+              <p:tags r:id="rId9"/>
+            </p:custDataLst>
+          </p:nvPr>
+        </p:nvSpPr>
+        <p:spPr>
+          <a:xfrm>
+            <a:off x="9806940" y="2050415"/>
+            <a:ext cx="1896745" cy="236855"/>
+          </a:xfrm>
+          <a:prstGeom prst="rect">
+            <a:avLst/>
+          </a:prstGeom>
+          <a:noFill/>
+        </p:spPr>
+        <p:txBody>
+          <a:bodyPr wrap="square" rtlCol="0">
+            <a:noAutofit/>
+          </a:bodyPr>
+          <a:p>
+            <a:r>
+              <a:rPr lang="zh-CN" altLang="en-US" sz="1400" b="1">
+                <a:latin typeface="微软雅黑" charset="0"/>
+                <a:ea typeface="微软雅黑" charset="0"/>
+              </a:rPr>
+              <a:t>运用组</a:t>
+            </a:r>
+            <a:r>
+              <a:rPr lang="en-US" altLang="zh-CN" sz="1400" b="1">
+                <a:latin typeface="微软雅黑" charset="0"/>
+                <a:ea typeface="微软雅黑" charset="0"/>
+              </a:rPr>
+              <a:t>+</a:t>
+            </a:r>
+            <a:r>
+              <a:rPr lang="zh-CN" altLang="en-US" sz="1400" b="1">
+                <a:latin typeface="微软雅黑" charset="0"/>
+                <a:ea typeface="微软雅黑" charset="0"/>
+              </a:rPr>
+              <a:t>动态</a:t>
+            </a:r>
+            <a:r>
+              <a:rPr lang="zh-CN" altLang="en-US" sz="1400" b="1">
+                <a:latin typeface="微软雅黑" charset="0"/>
+                <a:ea typeface="微软雅黑" charset="0"/>
+              </a:rPr>
+              <a:t>卷积</a:t>
+            </a:r>
+            <a:endParaRPr lang="zh-CN" altLang="en-US" sz="1400" b="1">
+              <a:latin typeface="微软雅黑" charset="0"/>
+              <a:ea typeface="微软雅黑" charset="0"/>
+            </a:endParaRPr>
+          </a:p>
+        </p:txBody>
+      </p:sp>
+      <p:cxnSp>
+        <p:nvCxnSpPr>
+          <p:cNvPr id="12" name="直接连接符 11"/>
+          <p:cNvCxnSpPr/>
+          <p:nvPr>
+            <p:custDataLst>
+              <p:tags r:id="rId10"/>
+            </p:custDataLst>
+          </p:nvPr>
+        </p:nvCxnSpPr>
+        <p:spPr>
+          <a:xfrm flipH="1" flipV="1">
+            <a:off x="7257415" y="2573655"/>
+            <a:ext cx="537210" cy="2006600"/>
+          </a:xfrm>
+          <a:prstGeom prst="line">
+            <a:avLst/>
+          </a:prstGeom>
+          <a:ln w="38100">
+            <a:solidFill>
+              <a:schemeClr val="tx1"/>
+            </a:solidFill>
+          </a:ln>
+        </p:spPr>
+        <p:style>
+          <a:lnRef idx="2">
+            <a:schemeClr val="accent1"/>
+          </a:lnRef>
+          <a:fillRef idx="0">
+            <a:srgbClr val="FFFFFF"/>
+          </a:fillRef>
+          <a:effectRef idx="0">
+            <a:srgbClr val="FFFFFF"/>
+          </a:effectRef>
+          <a:fontRef idx="minor">
+            <a:schemeClr val="tx1"/>
+          </a:fontRef>
+        </p:style>
+      </p:cxnSp>
+      <p:cxnSp>
+        <p:nvCxnSpPr>
+          <p:cNvPr id="13" name="直接连接符 12"/>
+          <p:cNvCxnSpPr/>
+          <p:nvPr>
+            <p:custDataLst>
+              <p:tags r:id="rId11"/>
+            </p:custDataLst>
+          </p:nvPr>
+        </p:nvCxnSpPr>
+        <p:spPr>
+          <a:xfrm flipH="1" flipV="1">
+            <a:off x="8922385" y="2405380"/>
+            <a:ext cx="2941320" cy="1948815"/>
+          </a:xfrm>
+          <a:prstGeom prst="line">
+            <a:avLst/>
+          </a:prstGeom>
+          <a:ln w="38100">
+            <a:solidFill>
+              <a:schemeClr val="tx1"/>
+            </a:solidFill>
+          </a:ln>
+        </p:spPr>
+        <p:style>
+          <a:lnRef idx="2">
+            <a:schemeClr val="accent1"/>
+          </a:lnRef>
+          <a:fillRef idx="0">
+            <a:srgbClr val="FFFFFF"/>
+          </a:fillRef>
+          <a:effectRef idx="0">
+            <a:srgbClr val="FFFFFF"/>
+          </a:effectRef>
+          <a:fontRef idx="minor">
+            <a:schemeClr val="tx1"/>
+          </a:fontRef>
+        </p:style>
+      </p:cxnSp>
+    </p:spTree>
+  </p:cSld>
+  <p:clrMapOvr>
+    <a:masterClrMapping/>
+  </p:clrMapOvr>
+</p:sld>
+</file>
+
+<file path=ppt/slides/slide3.xml><?xml version="1.0" encoding="utf-8"?>
+<p:sld xmlns:a="http://schemas.openxmlformats.org/drawingml/2006/main" xmlns:r="http://schemas.openxmlformats.org/officeDocument/2006/relationships" xmlns:p="http://schemas.openxmlformats.org/presentationml/2006/main">
+  <p:cSld>
+    <p:spTree>
+      <p:nvGrpSpPr>
+        <p:cNvPr id="1" name=""/>
+        <p:cNvGrpSpPr/>
+        <p:nvPr/>
+      </p:nvGrpSpPr>
+      <p:grpSpPr/>
+      <p:pic>
+        <p:nvPicPr>
+          <p:cNvPr id="4" name="图片 3"/>
+          <p:cNvPicPr>
+            <a:picLocks noChangeAspect="1"/>
+          </p:cNvPicPr>
+          <p:nvPr>
+            <p:custDataLst>
+              <p:tags r:id="rId1"/>
+            </p:custDataLst>
+          </p:nvPr>
+        </p:nvPicPr>
+        <p:blipFill>
+          <a:blip r:embed="rId2"/>
+          <a:stretch>
+            <a:fillRect/>
+          </a:stretch>
+        </p:blipFill>
+        <p:spPr>
+          <a:xfrm>
+            <a:off x="457200" y="1479550"/>
+            <a:ext cx="11277600" cy="3898900"/>
+          </a:xfrm>
+          <a:prstGeom prst="rect">
+            <a:avLst/>
+          </a:prstGeom>
+        </p:spPr>
+      </p:pic>
+      <p:sp>
+        <p:nvSpPr>
+          <p:cNvPr id="5" name="文本框 4"/>
+          <p:cNvSpPr txBox="1"/>
+          <p:nvPr/>
+        </p:nvSpPr>
+        <p:spPr>
+          <a:xfrm>
+            <a:off x="187325" y="1167765"/>
+            <a:ext cx="4954270" cy="306705"/>
+          </a:xfrm>
+          <a:prstGeom prst="rect">
+            <a:avLst/>
+          </a:prstGeom>
+          <a:noFill/>
+        </p:spPr>
+        <p:txBody>
+          <a:bodyPr wrap="square" rtlCol="0">
+            <a:spAutoFit/>
+          </a:bodyPr>
+          <a:p>
+            <a:r>
+              <a:rPr lang="zh-CN" altLang="en-US" sz="1400" b="1">
+                <a:latin typeface="微软雅黑" charset="0"/>
+                <a:ea typeface="微软雅黑" charset="0"/>
+              </a:rPr>
+              <a:t>可视化一步卷积操作在频域中所有可学习的参数</a:t>
+            </a:r>
+            <a:endParaRPr lang="zh-CN" altLang="en-US" sz="1400" b="1">
+              <a:latin typeface="微软雅黑" charset="0"/>
+              <a:ea typeface="微软雅黑" charset="0"/>
+            </a:endParaRPr>
+          </a:p>
+        </p:txBody>
+      </p:sp>
+      <p:sp>
+        <p:nvSpPr>
+          <p:cNvPr id="6" name="文本框 5"/>
+          <p:cNvSpPr txBox="1"/>
+          <p:nvPr>
+            <p:custDataLst>
+              <p:tags r:id="rId3"/>
+            </p:custDataLst>
+          </p:nvPr>
+        </p:nvSpPr>
+        <p:spPr>
+          <a:xfrm>
+            <a:off x="3195320" y="5378450"/>
+            <a:ext cx="3502025" cy="737235"/>
+          </a:xfrm>
+          <a:prstGeom prst="rect">
+            <a:avLst/>
+          </a:prstGeom>
+          <a:noFill/>
+        </p:spPr>
+        <p:txBody>
+          <a:bodyPr wrap="square" rtlCol="0">
+            <a:spAutoFit/>
+          </a:bodyPr>
+          <a:p>
+            <a:r>
+              <a:rPr lang="zh-CN" altLang="en-US" sz="1400" b="1">
+                <a:latin typeface="微软雅黑" charset="0"/>
+                <a:ea typeface="微软雅黑" charset="0"/>
+              </a:rPr>
+              <a:t>假设本卷积核只关注低频信息</a:t>
+            </a:r>
+            <a:r>
+              <a:rPr lang="en-US" altLang="zh-CN" sz="1400" b="1">
+                <a:latin typeface="微软雅黑" charset="0"/>
+                <a:ea typeface="微软雅黑" charset="0"/>
+              </a:rPr>
+              <a:t>(</a:t>
+            </a:r>
+            <a:r>
+              <a:rPr lang="zh-CN" altLang="en-US" sz="1400" b="1">
+                <a:latin typeface="微软雅黑" charset="0"/>
+                <a:ea typeface="微软雅黑" charset="0"/>
+              </a:rPr>
+              <a:t>蓝色部分</a:t>
+            </a:r>
+            <a:r>
+              <a:rPr lang="en-US" altLang="zh-CN" sz="1400" b="1">
+                <a:latin typeface="微软雅黑" charset="0"/>
+                <a:ea typeface="微软雅黑" charset="0"/>
+              </a:rPr>
+              <a:t>)</a:t>
+            </a:r>
+            <a:br>
+              <a:rPr lang="en-US" altLang="zh-CN" sz="1400" b="1">
+                <a:latin typeface="微软雅黑" charset="0"/>
+                <a:ea typeface="微软雅黑" charset="0"/>
+              </a:rPr>
+            </a:br>
+            <a:r>
+              <a:rPr lang="zh-CN" altLang="en-US" sz="1400" b="1">
+                <a:latin typeface="微软雅黑" charset="0"/>
+                <a:ea typeface="微软雅黑" charset="0"/>
+              </a:rPr>
+              <a:t>那么将高频信息</a:t>
+            </a:r>
+            <a:r>
+              <a:rPr lang="en-US" altLang="zh-CN" sz="1400" b="1">
+                <a:latin typeface="微软雅黑" charset="0"/>
+                <a:ea typeface="微软雅黑" charset="0"/>
+              </a:rPr>
+              <a:t>(</a:t>
+            </a:r>
+            <a:r>
+              <a:rPr lang="zh-CN" altLang="en-US" sz="1400" b="1">
+                <a:latin typeface="微软雅黑" charset="0"/>
+                <a:ea typeface="微软雅黑" charset="0"/>
+              </a:rPr>
+              <a:t>黄色</a:t>
+            </a:r>
+            <a:r>
+              <a:rPr lang="en-US" altLang="zh-CN" sz="1400" b="1">
+                <a:latin typeface="微软雅黑" charset="0"/>
+                <a:ea typeface="微软雅黑" charset="0"/>
+              </a:rPr>
+              <a:t>)</a:t>
+            </a:r>
+            <a:r>
+              <a:rPr lang="zh-CN" altLang="en-US" sz="1400" b="1">
+                <a:latin typeface="微软雅黑" charset="0"/>
+                <a:ea typeface="微软雅黑" charset="0"/>
+              </a:rPr>
+              <a:t>置为</a:t>
+            </a:r>
+            <a:r>
+              <a:rPr lang="en-US" altLang="zh-CN" sz="1400" b="1">
+                <a:latin typeface="微软雅黑" charset="0"/>
+                <a:ea typeface="微软雅黑" charset="0"/>
+              </a:rPr>
+              <a:t>0(</a:t>
+            </a:r>
+            <a:r>
+              <a:rPr lang="zh-CN" altLang="en-US" sz="1400" b="1">
+                <a:latin typeface="微软雅黑" charset="0"/>
+                <a:ea typeface="微软雅黑" charset="0"/>
+              </a:rPr>
+              <a:t>白色</a:t>
+            </a:r>
+            <a:r>
+              <a:rPr lang="en-US" altLang="zh-CN" sz="1400" b="1">
+                <a:latin typeface="微软雅黑" charset="0"/>
+                <a:ea typeface="微软雅黑" charset="0"/>
+              </a:rPr>
+              <a:t>)</a:t>
+            </a:r>
+            <a:br>
+              <a:rPr lang="en-US" altLang="zh-CN" sz="1400" b="1">
+                <a:latin typeface="微软雅黑" charset="0"/>
+                <a:ea typeface="微软雅黑" charset="0"/>
+              </a:rPr>
+            </a:br>
+            <a:r>
+              <a:rPr lang="zh-CN" altLang="en-US" sz="1400" b="1">
+                <a:latin typeface="微软雅黑" charset="0"/>
+                <a:ea typeface="微软雅黑" charset="0"/>
+              </a:rPr>
+              <a:t>低频信息</a:t>
+            </a:r>
+            <a:r>
+              <a:rPr lang="zh-CN" altLang="en-US" sz="1400" b="1">
+                <a:latin typeface="微软雅黑" charset="0"/>
+                <a:ea typeface="微软雅黑" charset="0"/>
+              </a:rPr>
+              <a:t>不变</a:t>
+            </a:r>
+            <a:endParaRPr lang="zh-CN" altLang="en-US" sz="1400" b="1">
+              <a:latin typeface="微软雅黑" charset="0"/>
+              <a:ea typeface="微软雅黑" charset="0"/>
+            </a:endParaRPr>
+          </a:p>
+        </p:txBody>
+      </p:sp>
+      <p:sp>
+        <p:nvSpPr>
+          <p:cNvPr id="7" name="文本框 6"/>
+          <p:cNvSpPr txBox="1"/>
+          <p:nvPr>
+            <p:custDataLst>
+              <p:tags r:id="rId4"/>
+            </p:custDataLst>
+          </p:nvPr>
+        </p:nvSpPr>
+        <p:spPr>
+          <a:xfrm>
+            <a:off x="6285230" y="861060"/>
+            <a:ext cx="2705735" cy="306705"/>
+          </a:xfrm>
+          <a:prstGeom prst="rect">
+            <a:avLst/>
+          </a:prstGeom>
+          <a:noFill/>
+        </p:spPr>
+        <p:txBody>
+          <a:bodyPr wrap="square" rtlCol="0">
+            <a:spAutoFit/>
+          </a:bodyPr>
+          <a:p>
+            <a:r>
+              <a:rPr lang="zh-CN" altLang="en-US" sz="1400" b="1">
+                <a:latin typeface="微软雅黑" charset="0"/>
+                <a:ea typeface="微软雅黑" charset="0"/>
+              </a:rPr>
+              <a:t>通过</a:t>
+            </a:r>
+            <a:r>
+              <a:rPr lang="en-US" altLang="zh-CN" sz="1400" b="1">
+                <a:latin typeface="微软雅黑" charset="0"/>
+                <a:ea typeface="微软雅黑" charset="0"/>
+              </a:rPr>
+              <a:t>iDFT</a:t>
+            </a:r>
+            <a:r>
+              <a:rPr lang="zh-CN" altLang="en-US" sz="1400" b="1">
+                <a:latin typeface="微软雅黑" charset="0"/>
+                <a:ea typeface="微软雅黑" charset="0"/>
+              </a:rPr>
+              <a:t>将频域映射回</a:t>
+            </a:r>
+            <a:r>
+              <a:rPr lang="zh-CN" altLang="en-US" sz="1400" b="1">
+                <a:latin typeface="微软雅黑" charset="0"/>
+                <a:ea typeface="微软雅黑" charset="0"/>
+              </a:rPr>
+              <a:t>空间域</a:t>
+            </a:r>
+            <a:endParaRPr lang="zh-CN" altLang="en-US" sz="1400" b="1">
+              <a:latin typeface="微软雅黑" charset="0"/>
+              <a:ea typeface="微软雅黑" charset="0"/>
+            </a:endParaRPr>
+          </a:p>
+        </p:txBody>
+      </p:sp>
+      <p:sp>
+        <p:nvSpPr>
+          <p:cNvPr id="8" name="文本框 7"/>
+          <p:cNvSpPr txBox="1"/>
+          <p:nvPr>
+            <p:custDataLst>
+              <p:tags r:id="rId5"/>
+            </p:custDataLst>
+          </p:nvPr>
+        </p:nvSpPr>
+        <p:spPr>
+          <a:xfrm>
+            <a:off x="9117965" y="5071745"/>
+            <a:ext cx="2705735" cy="306705"/>
+          </a:xfrm>
+          <a:prstGeom prst="rect">
+            <a:avLst/>
+          </a:prstGeom>
+          <a:noFill/>
+        </p:spPr>
+        <p:txBody>
+          <a:bodyPr wrap="square" rtlCol="0">
+            <a:spAutoFit/>
+          </a:bodyPr>
+          <a:p>
+            <a:r>
+              <a:rPr lang="zh-CN" altLang="en-US" sz="1400" b="1">
+                <a:latin typeface="微软雅黑" charset="0"/>
+                <a:ea typeface="微软雅黑" charset="0"/>
+              </a:rPr>
+              <a:t>重新拆分拼接位</a:t>
+            </a:r>
+            <a:r>
+              <a:rPr lang="zh-CN" altLang="en-US" sz="1400" b="1">
+                <a:latin typeface="微软雅黑" charset="0"/>
+                <a:ea typeface="微软雅黑" charset="0"/>
+              </a:rPr>
+              <a:t>卷积核</a:t>
+            </a:r>
+            <a:endParaRPr lang="zh-CN" altLang="en-US" sz="1400" b="1">
+              <a:latin typeface="微软雅黑" charset="0"/>
+              <a:ea typeface="微软雅黑" charset="0"/>
+            </a:endParaRPr>
+          </a:p>
+        </p:txBody>
+      </p:sp>
+    </p:spTree>
+  </p:cSld>
+  <p:clrMapOvr>
+    <a:masterClrMapping/>
+  </p:clrMapOvr>
+</p:sld>
+</file>
+
+<file path=ppt/slides/slide4.xml><?xml version="1.0" encoding="utf-8"?>
+<p:sld xmlns:a="http://schemas.openxmlformats.org/drawingml/2006/main" xmlns:r="http://schemas.openxmlformats.org/officeDocument/2006/relationships" xmlns:p="http://schemas.openxmlformats.org/presentationml/2006/main">
+  <p:cSld>
+    <p:spTree>
+      <p:nvGrpSpPr>
+        <p:cNvPr id="1" name=""/>
+        <p:cNvGrpSpPr/>
+        <p:nvPr/>
+      </p:nvGrpSpPr>
+      <p:grpSpPr/>
+      <p:pic>
+        <p:nvPicPr>
+          <p:cNvPr id="4" name="图片 3"/>
+          <p:cNvPicPr>
+            <a:picLocks noChangeAspect="1"/>
+          </p:cNvPicPr>
+          <p:nvPr>
+            <p:custDataLst>
+              <p:tags r:id="rId1"/>
+            </p:custDataLst>
+          </p:nvPr>
+        </p:nvPicPr>
+        <p:blipFill>
+          <a:blip r:embed="rId2"/>
+          <a:stretch>
+            <a:fillRect/>
+          </a:stretch>
+        </p:blipFill>
+        <p:spPr>
+          <a:xfrm>
+            <a:off x="1435100" y="1416050"/>
+            <a:ext cx="9321800" cy="4025900"/>
+          </a:xfrm>
+          <a:prstGeom prst="rect">
+            <a:avLst/>
+          </a:prstGeom>
+        </p:spPr>
+      </p:pic>
+      <p:sp>
+        <p:nvSpPr>
+          <p:cNvPr id="5" name="文本框 4"/>
+          <p:cNvSpPr txBox="1"/>
+          <p:nvPr>
+            <p:custDataLst>
+              <p:tags r:id="rId3"/>
+            </p:custDataLst>
+          </p:nvPr>
+        </p:nvSpPr>
+        <p:spPr>
+          <a:xfrm>
+            <a:off x="3712845" y="1184275"/>
+            <a:ext cx="4954270" cy="398780"/>
+          </a:xfrm>
+          <a:prstGeom prst="rect">
+            <a:avLst/>
+          </a:prstGeom>
+          <a:noFill/>
+        </p:spPr>
+        <p:txBody>
+          <a:bodyPr wrap="square" rtlCol="0">
+            <a:spAutoFit/>
+          </a:bodyPr>
+          <a:p>
+            <a:r>
+              <a:rPr lang="zh-CN" altLang="en-US" sz="2000" b="1">
+                <a:latin typeface="微软雅黑" charset="0"/>
+                <a:ea typeface="微软雅黑" charset="0"/>
+              </a:rPr>
+              <a:t>用于为动态卷积根据输入特征分配权重</a:t>
+            </a:r>
+            <a:endParaRPr lang="zh-CN" altLang="en-US" sz="2000" b="1">
+              <a:latin typeface="微软雅黑" charset="0"/>
+              <a:ea typeface="微软雅黑" charset="0"/>
+            </a:endParaRPr>
+          </a:p>
+        </p:txBody>
+      </p:sp>
+      <p:sp>
+        <p:nvSpPr>
+          <p:cNvPr id="6" name="文本框 5"/>
+          <p:cNvSpPr txBox="1"/>
+          <p:nvPr>
+            <p:custDataLst>
+              <p:tags r:id="rId4"/>
+            </p:custDataLst>
+          </p:nvPr>
+        </p:nvSpPr>
+        <p:spPr>
+          <a:xfrm>
+            <a:off x="3628390" y="1622425"/>
+            <a:ext cx="4954270" cy="306705"/>
+          </a:xfrm>
+          <a:prstGeom prst="rect">
+            <a:avLst/>
+          </a:prstGeom>
+          <a:noFill/>
+        </p:spPr>
+        <p:txBody>
+          <a:bodyPr wrap="square" rtlCol="0">
+            <a:spAutoFit/>
+          </a:bodyPr>
+          <a:p>
+            <a:r>
+              <a:rPr lang="zh-CN" altLang="en-US" sz="1400" b="1">
+                <a:latin typeface="微软雅黑" charset="0"/>
+                <a:ea typeface="微软雅黑" charset="0"/>
+              </a:rPr>
+              <a:t>上面的部分关注全局信息，判断当前卷积核的重要</a:t>
+            </a:r>
+            <a:r>
+              <a:rPr lang="zh-CN" altLang="en-US" sz="1400" b="1">
+                <a:latin typeface="微软雅黑" charset="0"/>
+                <a:ea typeface="微软雅黑" charset="0"/>
+              </a:rPr>
+              <a:t>程度</a:t>
+            </a:r>
+            <a:endParaRPr lang="zh-CN" altLang="en-US" sz="1400" b="1">
+              <a:latin typeface="微软雅黑" charset="0"/>
+              <a:ea typeface="微软雅黑" charset="0"/>
+            </a:endParaRPr>
+          </a:p>
+        </p:txBody>
+      </p:sp>
+      <p:sp>
+        <p:nvSpPr>
+          <p:cNvPr id="7" name="文本框 6"/>
+          <p:cNvSpPr txBox="1"/>
+          <p:nvPr>
+            <p:custDataLst>
+              <p:tags r:id="rId5"/>
+            </p:custDataLst>
+          </p:nvPr>
+        </p:nvSpPr>
+        <p:spPr>
+          <a:xfrm>
+            <a:off x="3220720" y="5135245"/>
+            <a:ext cx="5750560" cy="306705"/>
+          </a:xfrm>
+          <a:prstGeom prst="rect">
+            <a:avLst/>
+          </a:prstGeom>
+          <a:noFill/>
+        </p:spPr>
+        <p:txBody>
+          <a:bodyPr wrap="square" rtlCol="0">
+            <a:spAutoFit/>
+          </a:bodyPr>
+          <a:p>
+            <a:r>
+              <a:rPr lang="zh-CN" altLang="en-US" sz="1400" b="1">
+                <a:latin typeface="微软雅黑" charset="0"/>
+                <a:ea typeface="微软雅黑" charset="0"/>
+              </a:rPr>
+              <a:t>上面的部分关注局部信息，判断当前卷积核的某个元素</a:t>
+            </a:r>
+            <a:r>
+              <a:rPr lang="zh-CN" altLang="en-US" sz="1400" b="1">
+                <a:latin typeface="微软雅黑" charset="0"/>
+                <a:ea typeface="微软雅黑" charset="0"/>
+              </a:rPr>
+              <a:t>的重要</a:t>
+            </a:r>
+            <a:r>
+              <a:rPr lang="zh-CN" altLang="en-US" sz="1400" b="1">
+                <a:latin typeface="微软雅黑" charset="0"/>
+                <a:ea typeface="微软雅黑" charset="0"/>
+              </a:rPr>
+              <a:t>程度</a:t>
+            </a:r>
+            <a:endParaRPr lang="zh-CN" altLang="en-US" sz="1400" b="1">
+              <a:latin typeface="微软雅黑" charset="0"/>
+              <a:ea typeface="微软雅黑" charset="0"/>
+            </a:endParaRPr>
+          </a:p>
+        </p:txBody>
+      </p:sp>
+    </p:spTree>
+  </p:cSld>
+  <p:clrMapOvr>
+    <a:masterClrMapping/>
+  </p:clrMapOvr>
+</p:sld>
+</file>
+
+<file path=ppt/slides/slide5.xml><?xml version="1.0" encoding="utf-8"?>
+<p:sld xmlns:a="http://schemas.openxmlformats.org/drawingml/2006/main" xmlns:r="http://schemas.openxmlformats.org/officeDocument/2006/relationships" xmlns:p="http://schemas.openxmlformats.org/presentationml/2006/main">
+  <p:cSld>
+    <p:spTree>
+      <p:nvGrpSpPr>
+        <p:cNvPr id="1" name=""/>
+        <p:cNvGrpSpPr/>
+        <p:nvPr/>
+      </p:nvGrpSpPr>
+      <p:grpSpPr/>
+      <p:pic>
+        <p:nvPicPr>
+          <p:cNvPr id="4" name="图片 3"/>
+          <p:cNvPicPr>
+            <a:picLocks noChangeAspect="1"/>
+          </p:cNvPicPr>
+          <p:nvPr>
+            <p:custDataLst>
+              <p:tags r:id="rId1"/>
+            </p:custDataLst>
+          </p:nvPr>
+        </p:nvPicPr>
+        <p:blipFill>
+          <a:blip r:embed="rId2"/>
+          <a:stretch>
+            <a:fillRect/>
+          </a:stretch>
+        </p:blipFill>
+        <p:spPr>
+          <a:xfrm>
+            <a:off x="2241550" y="1563370"/>
+            <a:ext cx="7005955" cy="4337050"/>
+          </a:xfrm>
+          <a:prstGeom prst="rect">
+            <a:avLst/>
+          </a:prstGeom>
+        </p:spPr>
+      </p:pic>
+      <p:sp>
+        <p:nvSpPr>
+          <p:cNvPr id="5" name="文本框 4"/>
+          <p:cNvSpPr txBox="1"/>
+          <p:nvPr>
+            <p:custDataLst>
+              <p:tags r:id="rId3"/>
+            </p:custDataLst>
+          </p:nvPr>
+        </p:nvSpPr>
+        <p:spPr>
+          <a:xfrm>
+            <a:off x="918845" y="2092960"/>
+            <a:ext cx="3771900" cy="306705"/>
+          </a:xfrm>
+          <a:prstGeom prst="rect">
+            <a:avLst/>
+          </a:prstGeom>
+          <a:noFill/>
+        </p:spPr>
+        <p:txBody>
+          <a:bodyPr wrap="square" rtlCol="0">
+            <a:spAutoFit/>
+          </a:bodyPr>
+          <a:p>
+            <a:r>
+              <a:rPr lang="zh-CN" altLang="en-US" sz="1400" b="1">
+                <a:latin typeface="微软雅黑" charset="0"/>
+                <a:ea typeface="微软雅黑" charset="0"/>
+              </a:rPr>
+              <a:t>将按照权重调整后的卷积核映射到频域</a:t>
+            </a:r>
+            <a:endParaRPr lang="zh-CN" altLang="en-US" sz="1400" b="1">
+              <a:latin typeface="微软雅黑" charset="0"/>
+              <a:ea typeface="微软雅黑" charset="0"/>
+            </a:endParaRPr>
+          </a:p>
+        </p:txBody>
+      </p:sp>
+      <p:sp>
+        <p:nvSpPr>
+          <p:cNvPr id="6" name="文本框 5"/>
+          <p:cNvSpPr txBox="1"/>
+          <p:nvPr>
+            <p:custDataLst>
+              <p:tags r:id="rId4"/>
+            </p:custDataLst>
+          </p:nvPr>
+        </p:nvSpPr>
+        <p:spPr>
+          <a:xfrm>
+            <a:off x="3014345" y="5900420"/>
+            <a:ext cx="3771900" cy="306705"/>
+          </a:xfrm>
+          <a:prstGeom prst="rect">
+            <a:avLst/>
+          </a:prstGeom>
+          <a:noFill/>
+        </p:spPr>
+        <p:txBody>
+          <a:bodyPr wrap="square" rtlCol="0">
+            <a:spAutoFit/>
+          </a:bodyPr>
+          <a:p>
+            <a:r>
+              <a:rPr lang="zh-CN" altLang="en-US" sz="1400" b="1">
+                <a:latin typeface="微软雅黑" charset="0"/>
+                <a:ea typeface="微软雅黑" charset="0"/>
+              </a:rPr>
+              <a:t>将</a:t>
+            </a:r>
+            <a:r>
+              <a:rPr lang="zh-CN" altLang="en-US" sz="1400" b="1">
+                <a:latin typeface="微软雅黑" charset="0"/>
+                <a:ea typeface="微软雅黑" charset="0"/>
+              </a:rPr>
+              <a:t>特征映射到频域</a:t>
+            </a:r>
+            <a:endParaRPr lang="zh-CN" altLang="en-US" sz="1400" b="1">
+              <a:latin typeface="微软雅黑" charset="0"/>
+              <a:ea typeface="微软雅黑" charset="0"/>
+            </a:endParaRPr>
+          </a:p>
+        </p:txBody>
+      </p:sp>
+      <p:sp>
+        <p:nvSpPr>
+          <p:cNvPr id="7" name="文本框 6"/>
+          <p:cNvSpPr txBox="1"/>
+          <p:nvPr>
+            <p:custDataLst>
+              <p:tags r:id="rId5"/>
+            </p:custDataLst>
+          </p:nvPr>
+        </p:nvSpPr>
+        <p:spPr>
+          <a:xfrm>
+            <a:off x="4371975" y="1372235"/>
+            <a:ext cx="2167890" cy="306705"/>
+          </a:xfrm>
+          <a:prstGeom prst="rect">
+            <a:avLst/>
+          </a:prstGeom>
+          <a:noFill/>
+        </p:spPr>
+        <p:txBody>
+          <a:bodyPr wrap="square" rtlCol="0">
+            <a:spAutoFit/>
+          </a:bodyPr>
+          <a:p>
+            <a:r>
+              <a:rPr lang="zh-CN" altLang="en-US" sz="1400" b="1">
+                <a:latin typeface="微软雅黑" charset="0"/>
+                <a:ea typeface="微软雅黑" charset="0"/>
+              </a:rPr>
+              <a:t>将按照不同频段进行</a:t>
+            </a:r>
+            <a:r>
+              <a:rPr lang="zh-CN" altLang="en-US" sz="1400" b="1">
+                <a:latin typeface="微软雅黑" charset="0"/>
+                <a:ea typeface="微软雅黑" charset="0"/>
+              </a:rPr>
+              <a:t>拆分</a:t>
+            </a:r>
+            <a:endParaRPr lang="zh-CN" altLang="en-US" sz="1400" b="1">
+              <a:latin typeface="微软雅黑" charset="0"/>
+              <a:ea typeface="微软雅黑" charset="0"/>
+            </a:endParaRPr>
+          </a:p>
+        </p:txBody>
+      </p:sp>
+      <p:sp>
+        <p:nvSpPr>
+          <p:cNvPr id="8" name="文本框 7"/>
+          <p:cNvSpPr txBox="1"/>
+          <p:nvPr>
+            <p:custDataLst>
+              <p:tags r:id="rId6"/>
+            </p:custDataLst>
+          </p:nvPr>
+        </p:nvSpPr>
+        <p:spPr>
+          <a:xfrm>
+            <a:off x="5633085" y="2276475"/>
+            <a:ext cx="2167890" cy="306705"/>
+          </a:xfrm>
+          <a:prstGeom prst="rect">
+            <a:avLst/>
+          </a:prstGeom>
+          <a:noFill/>
+        </p:spPr>
+        <p:txBody>
+          <a:bodyPr wrap="square" rtlCol="0">
+            <a:spAutoFit/>
+          </a:bodyPr>
+          <a:p>
+            <a:r>
+              <a:rPr lang="zh-CN" altLang="en-US" sz="1400" b="1">
+                <a:latin typeface="微软雅黑" charset="0"/>
+                <a:ea typeface="微软雅黑" charset="0"/>
+              </a:rPr>
+              <a:t>映射回空间</a:t>
+            </a:r>
+            <a:r>
+              <a:rPr lang="zh-CN" altLang="en-US" sz="1400" b="1">
+                <a:latin typeface="微软雅黑" charset="0"/>
+                <a:ea typeface="微软雅黑" charset="0"/>
+              </a:rPr>
+              <a:t>域</a:t>
+            </a:r>
+            <a:endParaRPr lang="zh-CN" altLang="en-US" sz="1400" b="1">
+              <a:latin typeface="微软雅黑" charset="0"/>
+              <a:ea typeface="微软雅黑" charset="0"/>
+            </a:endParaRPr>
+          </a:p>
+        </p:txBody>
+      </p:sp>
+      <p:sp>
+        <p:nvSpPr>
+          <p:cNvPr id="10" name="矩形: 圆角 36"/>
+          <p:cNvSpPr/>
+          <p:nvPr>
+            <p:custDataLst>
+              <p:tags r:id="rId7"/>
+            </p:custDataLst>
+          </p:nvPr>
+        </p:nvSpPr>
+        <p:spPr>
+          <a:xfrm rot="10800000" flipV="1">
+            <a:off x="3131820" y="2399665"/>
+            <a:ext cx="663575" cy="888365"/>
+          </a:xfrm>
+          <a:prstGeom prst="roundRect">
+            <a:avLst>
+              <a:gd name="adj" fmla="val 10039"/>
+            </a:avLst>
+          </a:prstGeom>
+          <a:noFill/>
+          <a:ln w="38100">
+            <a:solidFill>
+              <a:schemeClr val="tx1"/>
+            </a:solidFill>
+            <a:prstDash val="lgDash"/>
+          </a:ln>
+        </p:spPr>
+        <p:style>
+          <a:lnRef idx="2">
+            <a:schemeClr val="accent1">
+              <a:shade val="15000"/>
+            </a:schemeClr>
+          </a:lnRef>
+          <a:fillRef idx="1">
+            <a:schemeClr val="accent1"/>
+          </a:fillRef>
+          <a:effectRef idx="0">
+            <a:schemeClr val="accent1"/>
+          </a:effectRef>
+          <a:fontRef idx="minor">
+            <a:schemeClr val="lt1"/>
+          </a:fontRef>
+        </p:style>
+        <p:txBody>
+          <a:bodyPr rtlCol="0" anchor="ctr"/>
+          <a:p>
+            <a:pPr algn="ctr"/>
+            <a:endParaRPr lang="zh-CN" altLang="en-US">
+              <a:solidFill>
+                <a:srgbClr val="C00000"/>
+              </a:solidFill>
+            </a:endParaRPr>
+          </a:p>
+        </p:txBody>
+      </p:sp>
+      <p:sp>
+        <p:nvSpPr>
+          <p:cNvPr id="9" name="矩形: 圆角 36"/>
+          <p:cNvSpPr/>
+          <p:nvPr>
+            <p:custDataLst>
+              <p:tags r:id="rId8"/>
+            </p:custDataLst>
+          </p:nvPr>
+        </p:nvSpPr>
+        <p:spPr>
+          <a:xfrm rot="10800000" flipV="1">
+            <a:off x="4027170" y="5126355"/>
+            <a:ext cx="663575" cy="619760"/>
+          </a:xfrm>
+          <a:prstGeom prst="roundRect">
+            <a:avLst>
+              <a:gd name="adj" fmla="val 10039"/>
+            </a:avLst>
+          </a:prstGeom>
+          <a:noFill/>
+          <a:ln w="38100">
+            <a:solidFill>
+              <a:schemeClr val="tx1"/>
+            </a:solidFill>
+            <a:prstDash val="lgDash"/>
+          </a:ln>
+        </p:spPr>
+        <p:style>
+          <a:lnRef idx="2">
+            <a:schemeClr val="accent1">
+              <a:shade val="15000"/>
+            </a:schemeClr>
+          </a:lnRef>
+          <a:fillRef idx="1">
+            <a:schemeClr val="accent1"/>
+          </a:fillRef>
+          <a:effectRef idx="0">
+            <a:schemeClr val="accent1"/>
+          </a:effectRef>
+          <a:fontRef idx="minor">
+            <a:schemeClr val="lt1"/>
+          </a:fontRef>
+        </p:style>
+        <p:txBody>
+          <a:bodyPr rtlCol="0" anchor="ctr"/>
+          <a:p>
+            <a:pPr algn="ctr"/>
+            <a:endParaRPr lang="zh-CN" altLang="en-US">
+              <a:solidFill>
+                <a:srgbClr val="C00000"/>
+              </a:solidFill>
+            </a:endParaRPr>
+          </a:p>
+        </p:txBody>
+      </p:sp>
+      <p:sp>
+        <p:nvSpPr>
+          <p:cNvPr id="11" name="矩形: 圆角 36"/>
+          <p:cNvSpPr/>
+          <p:nvPr>
+            <p:custDataLst>
+              <p:tags r:id="rId9"/>
+            </p:custDataLst>
+          </p:nvPr>
+        </p:nvSpPr>
+        <p:spPr>
+          <a:xfrm rot="10800000" flipV="1">
+            <a:off x="4817745" y="1985645"/>
+            <a:ext cx="815340" cy="3032760"/>
+          </a:xfrm>
+          <a:prstGeom prst="roundRect">
+            <a:avLst>
+              <a:gd name="adj" fmla="val 10039"/>
+            </a:avLst>
+          </a:prstGeom>
+          <a:noFill/>
+          <a:ln w="38100">
+            <a:solidFill>
+              <a:schemeClr val="tx1"/>
+            </a:solidFill>
+            <a:prstDash val="lgDash"/>
+          </a:ln>
+        </p:spPr>
+        <p:style>
+          <a:lnRef idx="2">
+            <a:schemeClr val="accent1">
+              <a:shade val="15000"/>
+            </a:schemeClr>
+          </a:lnRef>
+          <a:fillRef idx="1">
+            <a:schemeClr val="accent1"/>
+          </a:fillRef>
+          <a:effectRef idx="0">
+            <a:schemeClr val="accent1"/>
+          </a:effectRef>
+          <a:fontRef idx="minor">
+            <a:schemeClr val="lt1"/>
+          </a:fontRef>
+        </p:style>
+        <p:txBody>
+          <a:bodyPr rtlCol="0" anchor="ctr"/>
+          <a:p>
+            <a:pPr algn="ctr"/>
+            <a:endParaRPr lang="zh-CN" altLang="en-US">
+              <a:solidFill>
+                <a:srgbClr val="C00000"/>
+              </a:solidFill>
+            </a:endParaRPr>
+          </a:p>
+        </p:txBody>
+      </p:sp>
+      <p:sp>
+        <p:nvSpPr>
+          <p:cNvPr id="12" name="矩形: 圆角 36"/>
+          <p:cNvSpPr/>
+          <p:nvPr>
+            <p:custDataLst>
+              <p:tags r:id="rId10"/>
+            </p:custDataLst>
+          </p:nvPr>
+        </p:nvSpPr>
+        <p:spPr>
+          <a:xfrm rot="10800000" flipV="1">
+            <a:off x="5799455" y="2654300"/>
+            <a:ext cx="815340" cy="889000"/>
+          </a:xfrm>
+          <a:prstGeom prst="roundRect">
+            <a:avLst>
+              <a:gd name="adj" fmla="val 10039"/>
+            </a:avLst>
+          </a:prstGeom>
+          <a:noFill/>
+          <a:ln w="38100">
+            <a:solidFill>
+              <a:schemeClr val="tx1"/>
+            </a:solidFill>
+            <a:prstDash val="lgDash"/>
+          </a:ln>
+        </p:spPr>
+        <p:style>
+          <a:lnRef idx="2">
+            <a:schemeClr val="accent1">
+              <a:shade val="15000"/>
+            </a:schemeClr>
+          </a:lnRef>
+          <a:fillRef idx="1">
+            <a:schemeClr val="accent1"/>
+          </a:fillRef>
+          <a:effectRef idx="0">
+            <a:schemeClr val="accent1"/>
+          </a:effectRef>
+          <a:fontRef idx="minor">
+            <a:schemeClr val="lt1"/>
+          </a:fontRef>
+        </p:style>
+        <p:txBody>
+          <a:bodyPr rtlCol="0" anchor="ctr"/>
+          <a:p>
+            <a:pPr algn="ctr"/>
+            <a:endParaRPr lang="zh-CN" altLang="en-US">
+              <a:solidFill>
+                <a:srgbClr val="C00000"/>
+              </a:solidFill>
+            </a:endParaRPr>
+          </a:p>
+        </p:txBody>
+      </p:sp>
+    </p:spTree>
+  </p:cSld>
+  <p:clrMapOvr>
+    <a:masterClrMapping/>
+  </p:clrMapOvr>
+</p:sld>
+</file>
+
+<file path=ppt/slides/slide6.xml><?xml version="1.0" encoding="utf-8"?>
+<p:sld xmlns:a="http://schemas.openxmlformats.org/drawingml/2006/main" xmlns:r="http://schemas.openxmlformats.org/officeDocument/2006/relationships" xmlns:p="http://schemas.openxmlformats.org/presentationml/2006/main">
+  <p:cSld>
+    <p:spTree>
+      <p:nvGrpSpPr>
+        <p:cNvPr id="1" name=""/>
+        <p:cNvGrpSpPr/>
+        <p:nvPr/>
+      </p:nvGrpSpPr>
+      <p:grpSpPr/>
+      <p:pic>
+        <p:nvPicPr>
+          <p:cNvPr id="4" name="图片 3"/>
+          <p:cNvPicPr>
+            <a:picLocks noChangeAspect="1"/>
+          </p:cNvPicPr>
+          <p:nvPr>
+            <p:custDataLst>
+              <p:tags r:id="rId1"/>
+            </p:custDataLst>
+          </p:nvPr>
+        </p:nvPicPr>
+        <p:blipFill>
+          <a:blip r:embed="rId2"/>
+          <a:stretch>
+            <a:fillRect/>
+          </a:stretch>
+        </p:blipFill>
+        <p:spPr>
+          <a:xfrm>
+            <a:off x="2380615" y="2200910"/>
+            <a:ext cx="7098665" cy="2710815"/>
+          </a:xfrm>
+          <a:prstGeom prst="rect">
+            <a:avLst/>
+          </a:prstGeom>
+        </p:spPr>
+      </p:pic>
+      <p:pic>
+        <p:nvPicPr>
+          <p:cNvPr id="5" name="图片 4"/>
+          <p:cNvPicPr>
+            <a:picLocks noChangeAspect="1"/>
+          </p:cNvPicPr>
+          <p:nvPr>
+            <p:custDataLst>
+              <p:tags r:id="rId3"/>
+            </p:custDataLst>
+          </p:nvPr>
+        </p:nvPicPr>
+        <p:blipFill>
+          <a:blip r:embed="rId4"/>
+          <a:stretch>
+            <a:fillRect/>
+          </a:stretch>
+        </p:blipFill>
+        <p:spPr>
+          <a:xfrm>
+            <a:off x="474345" y="403225"/>
+            <a:ext cx="4848860" cy="1676400"/>
+          </a:xfrm>
+          <a:prstGeom prst="rect">
+            <a:avLst/>
+          </a:prstGeom>
+        </p:spPr>
+      </p:pic>
+      <p:pic>
+        <p:nvPicPr>
+          <p:cNvPr id="6" name="图片 5"/>
+          <p:cNvPicPr>
+            <a:picLocks noChangeAspect="1"/>
+          </p:cNvPicPr>
+          <p:nvPr>
+            <p:custDataLst>
+              <p:tags r:id="rId5"/>
+            </p:custDataLst>
+          </p:nvPr>
+        </p:nvPicPr>
+        <p:blipFill>
+          <a:blip r:embed="rId6"/>
+          <a:stretch>
+            <a:fillRect/>
+          </a:stretch>
+        </p:blipFill>
+        <p:spPr>
+          <a:xfrm>
+            <a:off x="3658870" y="5033010"/>
+            <a:ext cx="4228465" cy="1826260"/>
+          </a:xfrm>
+          <a:prstGeom prst="rect">
+            <a:avLst/>
+          </a:prstGeom>
+        </p:spPr>
+      </p:pic>
+      <p:sp>
+        <p:nvSpPr>
+          <p:cNvPr id="10" name="矩形: 圆角 36"/>
+          <p:cNvSpPr/>
+          <p:nvPr>
+            <p:custDataLst>
+              <p:tags r:id="rId7"/>
+            </p:custDataLst>
+          </p:nvPr>
+        </p:nvSpPr>
+        <p:spPr>
+          <a:xfrm rot="10800000" flipV="1">
+            <a:off x="2475865" y="2298065"/>
+            <a:ext cx="1835150" cy="1826260"/>
+          </a:xfrm>
+          <a:prstGeom prst="roundRect">
+            <a:avLst>
+              <a:gd name="adj" fmla="val 10039"/>
+            </a:avLst>
+          </a:prstGeom>
+          <a:noFill/>
+          <a:ln w="38100">
+            <a:solidFill>
+              <a:schemeClr val="tx1"/>
+            </a:solidFill>
+            <a:prstDash val="lgDash"/>
+          </a:ln>
+        </p:spPr>
+        <p:style>
+          <a:lnRef idx="2">
+            <a:schemeClr val="accent1">
+              <a:shade val="15000"/>
+            </a:schemeClr>
+          </a:lnRef>
+          <a:fillRef idx="1">
+            <a:schemeClr val="accent1"/>
+          </a:fillRef>
+          <a:effectRef idx="0">
+            <a:schemeClr val="accent1"/>
+          </a:effectRef>
+          <a:fontRef idx="minor">
+            <a:schemeClr val="lt1"/>
+          </a:fontRef>
+        </p:style>
+        <p:txBody>
+          <a:bodyPr rtlCol="0" anchor="ctr"/>
+          <a:p>
+            <a:pPr algn="ctr"/>
+            <a:endParaRPr lang="zh-CN" altLang="en-US">
+              <a:solidFill>
+                <a:srgbClr val="C00000"/>
+              </a:solidFill>
+            </a:endParaRPr>
+          </a:p>
+        </p:txBody>
+      </p:sp>
+      <p:sp>
+        <p:nvSpPr>
+          <p:cNvPr id="7" name="矩形: 圆角 36"/>
+          <p:cNvSpPr/>
+          <p:nvPr>
+            <p:custDataLst>
+              <p:tags r:id="rId8"/>
+            </p:custDataLst>
+          </p:nvPr>
+        </p:nvSpPr>
+        <p:spPr>
+          <a:xfrm rot="10800000" flipV="1">
+            <a:off x="4944745" y="2401570"/>
+            <a:ext cx="805815" cy="2131060"/>
+          </a:xfrm>
+          <a:prstGeom prst="roundRect">
+            <a:avLst>
+              <a:gd name="adj" fmla="val 10039"/>
+            </a:avLst>
+          </a:prstGeom>
+          <a:noFill/>
+          <a:ln w="38100">
+            <a:solidFill>
+              <a:schemeClr val="tx1"/>
+            </a:solidFill>
+            <a:prstDash val="lgDash"/>
+          </a:ln>
+        </p:spPr>
+        <p:style>
+          <a:lnRef idx="2">
+            <a:schemeClr val="accent1">
+              <a:shade val="15000"/>
+            </a:schemeClr>
+          </a:lnRef>
+          <a:fillRef idx="1">
+            <a:schemeClr val="accent1"/>
+          </a:fillRef>
+          <a:effectRef idx="0">
+            <a:schemeClr val="accent1"/>
+          </a:effectRef>
+          <a:fontRef idx="minor">
+            <a:schemeClr val="lt1"/>
+          </a:fontRef>
+        </p:style>
+        <p:txBody>
+          <a:bodyPr rtlCol="0" anchor="ctr"/>
+          <a:p>
+            <a:pPr algn="ctr"/>
+            <a:endParaRPr lang="zh-CN" altLang="en-US">
+              <a:solidFill>
+                <a:srgbClr val="C00000"/>
+              </a:solidFill>
+            </a:endParaRPr>
+          </a:p>
+        </p:txBody>
+      </p:sp>
+      <p:cxnSp>
+        <p:nvCxnSpPr>
+          <p:cNvPr id="8" name="直接连接符 7"/>
+          <p:cNvCxnSpPr/>
+          <p:nvPr>
+            <p:custDataLst>
+              <p:tags r:id="rId9"/>
+            </p:custDataLst>
+          </p:nvPr>
+        </p:nvCxnSpPr>
+        <p:spPr>
+          <a:xfrm>
+            <a:off x="666750" y="2015490"/>
+            <a:ext cx="1809115" cy="282575"/>
+          </a:xfrm>
+          <a:prstGeom prst="line">
+            <a:avLst/>
+          </a:prstGeom>
+          <a:ln w="38100">
+            <a:solidFill>
+              <a:schemeClr val="tx1"/>
+            </a:solidFill>
+          </a:ln>
+        </p:spPr>
+        <p:style>
+          <a:lnRef idx="2">
+            <a:schemeClr val="accent1"/>
+          </a:lnRef>
+          <a:fillRef idx="0">
+            <a:srgbClr val="FFFFFF"/>
+          </a:fillRef>
+          <a:effectRef idx="0">
+            <a:srgbClr val="FFFFFF"/>
+          </a:effectRef>
+          <a:fontRef idx="minor">
+            <a:schemeClr val="tx1"/>
+          </a:fontRef>
+        </p:style>
+      </p:cxnSp>
+      <p:cxnSp>
+        <p:nvCxnSpPr>
+          <p:cNvPr id="9" name="直接连接符 8"/>
+          <p:cNvCxnSpPr/>
+          <p:nvPr>
+            <p:custDataLst>
+              <p:tags r:id="rId10"/>
+            </p:custDataLst>
+          </p:nvPr>
+        </p:nvCxnSpPr>
+        <p:spPr>
+          <a:xfrm flipV="1">
+            <a:off x="3735705" y="4532630"/>
+            <a:ext cx="1209040" cy="773430"/>
+          </a:xfrm>
+          <a:prstGeom prst="line">
+            <a:avLst/>
+          </a:prstGeom>
+          <a:ln w="38100">
+            <a:solidFill>
+              <a:schemeClr val="tx1"/>
+            </a:solidFill>
+          </a:ln>
+        </p:spPr>
+        <p:style>
+          <a:lnRef idx="2">
+            <a:schemeClr val="accent1"/>
+          </a:lnRef>
+          <a:fillRef idx="0">
+            <a:srgbClr val="FFFFFF"/>
+          </a:fillRef>
+          <a:effectRef idx="0">
+            <a:srgbClr val="FFFFFF"/>
+          </a:effectRef>
+          <a:fontRef idx="minor">
+            <a:schemeClr val="tx1"/>
+          </a:fontRef>
+        </p:style>
+      </p:cxnSp>
+      <p:cxnSp>
+        <p:nvCxnSpPr>
+          <p:cNvPr id="11" name="直接连接符 10"/>
+          <p:cNvCxnSpPr/>
+          <p:nvPr>
+            <p:custDataLst>
+              <p:tags r:id="rId11"/>
+            </p:custDataLst>
+          </p:nvPr>
+        </p:nvCxnSpPr>
+        <p:spPr>
+          <a:xfrm flipH="1" flipV="1">
+            <a:off x="5750560" y="4532630"/>
+            <a:ext cx="2025650" cy="832485"/>
+          </a:xfrm>
+          <a:prstGeom prst="line">
+            <a:avLst/>
+          </a:prstGeom>
+          <a:ln w="38100">
+            <a:solidFill>
+              <a:schemeClr val="tx1"/>
+            </a:solidFill>
+          </a:ln>
+        </p:spPr>
+        <p:style>
+          <a:lnRef idx="2">
+            <a:schemeClr val="accent1"/>
+          </a:lnRef>
+          <a:fillRef idx="0">
+            <a:srgbClr val="FFFFFF"/>
+          </a:fillRef>
+          <a:effectRef idx="0">
+            <a:srgbClr val="FFFFFF"/>
+          </a:effectRef>
+          <a:fontRef idx="minor">
+            <a:schemeClr val="tx1"/>
+          </a:fontRef>
+        </p:style>
+      </p:cxnSp>
+      <p:cxnSp>
+        <p:nvCxnSpPr>
+          <p:cNvPr id="20" name="直接连接符 19"/>
+          <p:cNvCxnSpPr/>
+          <p:nvPr>
+            <p:custDataLst>
+              <p:tags r:id="rId12"/>
+            </p:custDataLst>
+          </p:nvPr>
+        </p:nvCxnSpPr>
+        <p:spPr>
+          <a:xfrm flipH="1">
+            <a:off x="4413885" y="1990090"/>
+            <a:ext cx="748665" cy="553085"/>
+          </a:xfrm>
+          <a:prstGeom prst="line">
+            <a:avLst/>
+          </a:prstGeom>
+          <a:ln w="38100">
+            <a:solidFill>
+              <a:schemeClr val="tx1"/>
+            </a:solidFill>
+          </a:ln>
+        </p:spPr>
+        <p:style>
+          <a:lnRef idx="2">
+            <a:schemeClr val="accent1"/>
+          </a:lnRef>
+          <a:fillRef idx="0">
+            <a:srgbClr val="FFFFFF"/>
+          </a:fillRef>
+          <a:effectRef idx="0">
+            <a:srgbClr val="FFFFFF"/>
+          </a:effectRef>
+          <a:fontRef idx="minor">
+            <a:schemeClr val="tx1"/>
+          </a:fontRef>
+        </p:style>
+      </p:cxnSp>
+    </p:spTree>
+  </p:cSld>
+  <p:clrMapOvr>
+    <a:masterClrMapping/>
+  </p:clrMapOvr>
+</p:sld>
+</file>
+
 <file path=ppt/slides/slide7.xml><?xml version="1.0" encoding="utf-8"?>
 <p:sld xmlns:a="http://schemas.openxmlformats.org/drawingml/2006/main" xmlns:r="http://schemas.openxmlformats.org/officeDocument/2006/relationships" xmlns:p="http://schemas.openxmlformats.org/presentationml/2006/main">
   <p:cSld>
@@ -7588,6 +9045,54 @@
 </p:tagLst>
 </file>
 
+<file path=ppt/tags/tag100.xml><?xml version="1.0" encoding="utf-8"?>
+<p:tagLst xmlns:p="http://schemas.openxmlformats.org/presentationml/2006/main">
+  <p:tag name="KSO_WM_BEAUTIFY_FLAG" val=""/>
+</p:tagLst>
+</file>
+
+<file path=ppt/tags/tag101.xml><?xml version="1.0" encoding="utf-8"?>
+<p:tagLst xmlns:p="http://schemas.openxmlformats.org/presentationml/2006/main">
+  <p:tag name="KSO_WM_BEAUTIFY_FLAG" val=""/>
+</p:tagLst>
+</file>
+
+<file path=ppt/tags/tag102.xml><?xml version="1.0" encoding="utf-8"?>
+<p:tagLst xmlns:p="http://schemas.openxmlformats.org/presentationml/2006/main">
+  <p:tag name="KSO_WM_BEAUTIFY_FLAG" val=""/>
+</p:tagLst>
+</file>
+
+<file path=ppt/tags/tag103.xml><?xml version="1.0" encoding="utf-8"?>
+<p:tagLst xmlns:p="http://schemas.openxmlformats.org/presentationml/2006/main">
+  <p:tag name="KSO_WM_BEAUTIFY_FLAG" val=""/>
+</p:tagLst>
+</file>
+
+<file path=ppt/tags/tag104.xml><?xml version="1.0" encoding="utf-8"?>
+<p:tagLst xmlns:p="http://schemas.openxmlformats.org/presentationml/2006/main">
+  <p:tag name="KSO_WM_BEAUTIFY_FLAG" val=""/>
+</p:tagLst>
+</file>
+
+<file path=ppt/tags/tag105.xml><?xml version="1.0" encoding="utf-8"?>
+<p:tagLst xmlns:p="http://schemas.openxmlformats.org/presentationml/2006/main">
+  <p:tag name="KSO_WM_BEAUTIFY_FLAG" val=""/>
+</p:tagLst>
+</file>
+
+<file path=ppt/tags/tag106.xml><?xml version="1.0" encoding="utf-8"?>
+<p:tagLst xmlns:p="http://schemas.openxmlformats.org/presentationml/2006/main">
+  <p:tag name="KSO_WM_BEAUTIFY_FLAG" val=""/>
+</p:tagLst>
+</file>
+
+<file path=ppt/tags/tag107.xml><?xml version="1.0" encoding="utf-8"?>
+<p:tagLst xmlns:p="http://schemas.openxmlformats.org/presentationml/2006/main">
+  <p:tag name="KSO_WM_BEAUTIFY_FLAG" val=""/>
+</p:tagLst>
+</file>
+
 <file path=ppt/tags/tag11.xml><?xml version="1.0" encoding="utf-8"?>
 <p:tagLst xmlns:p="http://schemas.openxmlformats.org/presentationml/2006/main">
   <p:tag name="KSO_WM_BEAUTIFY_FLAG" val=""/>
@@ -8032,13 +9537,139 @@
 </p:tagLst>
 </file>
 
+<file path=ppt/tags/tag79.xml><?xml version="1.0" encoding="utf-8"?>
+<p:tagLst xmlns:p="http://schemas.openxmlformats.org/presentationml/2006/main">
+  <p:tag name="KSO_WM_BEAUTIFY_FLAG" val=""/>
+</p:tagLst>
+</file>
+
 <file path=ppt/tags/tag8.xml><?xml version="1.0" encoding="utf-8"?>
 <p:tagLst xmlns:p="http://schemas.openxmlformats.org/presentationml/2006/main">
   <p:tag name="KSO_WM_BEAUTIFY_FLAG" val=""/>
 </p:tagLst>
 </file>
 
+<file path=ppt/tags/tag80.xml><?xml version="1.0" encoding="utf-8"?>
+<p:tagLst xmlns:p="http://schemas.openxmlformats.org/presentationml/2006/main">
+  <p:tag name="KSO_WM_BEAUTIFY_FLAG" val=""/>
+</p:tagLst>
+</file>
+
+<file path=ppt/tags/tag81.xml><?xml version="1.0" encoding="utf-8"?>
+<p:tagLst xmlns:p="http://schemas.openxmlformats.org/presentationml/2006/main">
+  <p:tag name="KSO_WM_BEAUTIFY_FLAG" val=""/>
+</p:tagLst>
+</file>
+
+<file path=ppt/tags/tag82.xml><?xml version="1.0" encoding="utf-8"?>
+<p:tagLst xmlns:p="http://schemas.openxmlformats.org/presentationml/2006/main">
+  <p:tag name="KSO_WM_BEAUTIFY_FLAG" val=""/>
+</p:tagLst>
+</file>
+
+<file path=ppt/tags/tag83.xml><?xml version="1.0" encoding="utf-8"?>
+<p:tagLst xmlns:p="http://schemas.openxmlformats.org/presentationml/2006/main">
+  <p:tag name="KSO_WM_BEAUTIFY_FLAG" val=""/>
+</p:tagLst>
+</file>
+
+<file path=ppt/tags/tag84.xml><?xml version="1.0" encoding="utf-8"?>
+<p:tagLst xmlns:p="http://schemas.openxmlformats.org/presentationml/2006/main">
+  <p:tag name="KSO_WM_BEAUTIFY_FLAG" val=""/>
+</p:tagLst>
+</file>
+
+<file path=ppt/tags/tag85.xml><?xml version="1.0" encoding="utf-8"?>
+<p:tagLst xmlns:p="http://schemas.openxmlformats.org/presentationml/2006/main">
+  <p:tag name="KSO_WM_BEAUTIFY_FLAG" val=""/>
+</p:tagLst>
+</file>
+
+<file path=ppt/tags/tag86.xml><?xml version="1.0" encoding="utf-8"?>
+<p:tagLst xmlns:p="http://schemas.openxmlformats.org/presentationml/2006/main">
+  <p:tag name="KSO_WM_BEAUTIFY_FLAG" val=""/>
+</p:tagLst>
+</file>
+
+<file path=ppt/tags/tag87.xml><?xml version="1.0" encoding="utf-8"?>
+<p:tagLst xmlns:p="http://schemas.openxmlformats.org/presentationml/2006/main">
+  <p:tag name="KSO_WM_BEAUTIFY_FLAG" val=""/>
+</p:tagLst>
+</file>
+
+<file path=ppt/tags/tag88.xml><?xml version="1.0" encoding="utf-8"?>
+<p:tagLst xmlns:p="http://schemas.openxmlformats.org/presentationml/2006/main">
+  <p:tag name="KSO_WM_BEAUTIFY_FLAG" val=""/>
+</p:tagLst>
+</file>
+
+<file path=ppt/tags/tag89.xml><?xml version="1.0" encoding="utf-8"?>
+<p:tagLst xmlns:p="http://schemas.openxmlformats.org/presentationml/2006/main">
+  <p:tag name="KSO_WM_BEAUTIFY_FLAG" val=""/>
+</p:tagLst>
+</file>
+
 <file path=ppt/tags/tag9.xml><?xml version="1.0" encoding="utf-8"?>
+<p:tagLst xmlns:p="http://schemas.openxmlformats.org/presentationml/2006/main">
+  <p:tag name="KSO_WM_BEAUTIFY_FLAG" val=""/>
+</p:tagLst>
+</file>
+
+<file path=ppt/tags/tag90.xml><?xml version="1.0" encoding="utf-8"?>
+<p:tagLst xmlns:p="http://schemas.openxmlformats.org/presentationml/2006/main">
+  <p:tag name="KSO_WM_BEAUTIFY_FLAG" val=""/>
+</p:tagLst>
+</file>
+
+<file path=ppt/tags/tag91.xml><?xml version="1.0" encoding="utf-8"?>
+<p:tagLst xmlns:p="http://schemas.openxmlformats.org/presentationml/2006/main">
+  <p:tag name="KSO_WM_BEAUTIFY_FLAG" val=""/>
+</p:tagLst>
+</file>
+
+<file path=ppt/tags/tag92.xml><?xml version="1.0" encoding="utf-8"?>
+<p:tagLst xmlns:p="http://schemas.openxmlformats.org/presentationml/2006/main">
+  <p:tag name="KSO_WM_BEAUTIFY_FLAG" val=""/>
+</p:tagLst>
+</file>
+
+<file path=ppt/tags/tag93.xml><?xml version="1.0" encoding="utf-8"?>
+<p:tagLst xmlns:p="http://schemas.openxmlformats.org/presentationml/2006/main">
+  <p:tag name="KSO_WM_BEAUTIFY_FLAG" val=""/>
+</p:tagLst>
+</file>
+
+<file path=ppt/tags/tag94.xml><?xml version="1.0" encoding="utf-8"?>
+<p:tagLst xmlns:p="http://schemas.openxmlformats.org/presentationml/2006/main">
+  <p:tag name="KSO_WM_BEAUTIFY_FLAG" val=""/>
+</p:tagLst>
+</file>
+
+<file path=ppt/tags/tag95.xml><?xml version="1.0" encoding="utf-8"?>
+<p:tagLst xmlns:p="http://schemas.openxmlformats.org/presentationml/2006/main">
+  <p:tag name="KSO_WM_BEAUTIFY_FLAG" val=""/>
+</p:tagLst>
+</file>
+
+<file path=ppt/tags/tag96.xml><?xml version="1.0" encoding="utf-8"?>
+<p:tagLst xmlns:p="http://schemas.openxmlformats.org/presentationml/2006/main">
+  <p:tag name="KSO_WM_BEAUTIFY_FLAG" val=""/>
+</p:tagLst>
+</file>
+
+<file path=ppt/tags/tag97.xml><?xml version="1.0" encoding="utf-8"?>
+<p:tagLst xmlns:p="http://schemas.openxmlformats.org/presentationml/2006/main">
+  <p:tag name="KSO_WM_BEAUTIFY_FLAG" val=""/>
+</p:tagLst>
+</file>
+
+<file path=ppt/tags/tag98.xml><?xml version="1.0" encoding="utf-8"?>
+<p:tagLst xmlns:p="http://schemas.openxmlformats.org/presentationml/2006/main">
+  <p:tag name="KSO_WM_BEAUTIFY_FLAG" val=""/>
+</p:tagLst>
+</file>
+
+<file path=ppt/tags/tag99.xml><?xml version="1.0" encoding="utf-8"?>
 <p:tagLst xmlns:p="http://schemas.openxmlformats.org/presentationml/2006/main">
   <p:tag name="KSO_WM_BEAUTIFY_FLAG" val=""/>
 </p:tagLst>

</xml_diff>